<commit_message>
Addition to the ppt. Not final on my part, but starting ideas.
</commit_message>
<xml_diff>
--- a/babbage/powerpoint/Group18 Presentation.pptx
+++ b/babbage/powerpoint/Group18 Presentation.pptx
@@ -1,6 +1,6 @@
 
 <file path=ppt/presentation.xml><?xml version="1.0" encoding="utf-8"?>
-<p:presentation xmlns:a="http://schemas.openxmlformats.org/drawingml/2006/main" xmlns:r="http://schemas.openxmlformats.org/officeDocument/2006/relationships" xmlns:p="http://schemas.openxmlformats.org/presentationml/2006/main" saveSubsetFonts="1">
+<p:presentation xmlns:a="http://schemas.openxmlformats.org/drawingml/2006/main" xmlns:r="http://schemas.openxmlformats.org/officeDocument/2006/relationships" xmlns:mc="http://schemas.openxmlformats.org/markup-compatibility/2006" xmlns:mv="urn:schemas-microsoft-com:mac:vml" xmlns:p="http://schemas.openxmlformats.org/presentationml/2006/main" mc:Ignorable="mv" mc:PreserveAttributes="mv:*" saveSubsetFonts="1">
   <p:sldMasterIdLst>
     <p:sldMasterId id="2147483648" r:id="rId1"/>
   </p:sldMasterIdLst>
@@ -9,6 +9,7 @@
     <p:sldId id="259" r:id="rId3"/>
     <p:sldId id="257" r:id="rId4"/>
     <p:sldId id="258" r:id="rId5"/>
+    <p:sldId id="260" r:id="rId6"/>
   </p:sldIdLst>
   <p:sldSz cx="9144000" cy="6858000" type="screen4x3"/>
   <p:notesSz cx="6858000" cy="9144000"/>
@@ -109,7 +110,7 @@
   </p:defaultTextStyle>
   <p:extLst>
     <p:ext uri="{521415D9-36F7-43E2-AB2F-B90AF26B5E84}">
-      <p14:sectionLst xmlns:p14="http://schemas.microsoft.com/office/powerpoint/2010/main">
+      <p14:sectionLst xmlns:p14="http://schemas.microsoft.com/office/powerpoint/2010/main" xmlns:p="http://schemas.openxmlformats.org/presentationml/2006/main" xmlns:r="http://schemas.openxmlformats.org/officeDocument/2006/relationships" xmlns:a="http://schemas.openxmlformats.org/drawingml/2006/main" xmlns="">
         <p14:section name="Opening" id="{891F661E-DE42-5B49-BA88-1D4106BE2C4B}">
           <p14:sldIdLst>
             <p14:sldId id="256"/>
@@ -133,7 +134,7 @@
 </file>
 
 <file path=ppt/slideLayouts/slideLayout1.xml><?xml version="1.0" encoding="utf-8"?>
-<p:sldLayout xmlns:a="http://schemas.openxmlformats.org/drawingml/2006/main" xmlns:r="http://schemas.openxmlformats.org/officeDocument/2006/relationships" xmlns:p="http://schemas.openxmlformats.org/presentationml/2006/main" type="title" preserve="1">
+<p:sldLayout xmlns:a="http://schemas.openxmlformats.org/drawingml/2006/main" xmlns:r="http://schemas.openxmlformats.org/officeDocument/2006/relationships" xmlns:mc="http://schemas.openxmlformats.org/markup-compatibility/2006" xmlns:mv="urn:schemas-microsoft-com:mac:vml" xmlns:p="http://schemas.openxmlformats.org/presentationml/2006/main" mc:Ignorable="mv" mc:PreserveAttributes="mv:*" type="title" preserve="1">
   <p:cSld name="Title Slide">
     <p:spTree>
       <p:nvGrpSpPr>
@@ -313,7 +314,8 @@
           <a:p>
             <a:fld id="{6BFECD78-3C8E-49F2-8FAB-59489D168ABB}" type="datetimeFigureOut">
               <a:rPr lang="en-US" smtClean="0"/>
-              <a:t>11/24/14</a:t>
+              <a:pPr/>
+              <a:t>11/29/14</a:t>
             </a:fld>
             <a:endParaRPr lang="en-US"/>
           </a:p>
@@ -355,6 +357,7 @@
           <a:p>
             <a:fld id="{0FB56013-B943-42BA-886F-6F9D4EB85E9D}" type="slidenum">
               <a:rPr lang="en-US" smtClean="0"/>
+              <a:pPr/>
               <a:t>‹#›</a:t>
             </a:fld>
             <a:endParaRPr lang="en-US"/>
@@ -364,7 +367,7 @@
     </p:spTree>
     <p:extLst>
       <p:ext uri="{BB962C8B-B14F-4D97-AF65-F5344CB8AC3E}">
-        <p14:creationId xmlns:p14="http://schemas.microsoft.com/office/powerpoint/2010/main" val="2702019936"/>
+        <p14:creationId xmlns:p14="http://schemas.microsoft.com/office/powerpoint/2010/main" xmlns:p="http://schemas.openxmlformats.org/presentationml/2006/main" xmlns:r="http://schemas.openxmlformats.org/officeDocument/2006/relationships" xmlns:a="http://schemas.openxmlformats.org/drawingml/2006/main" xmlns="" val="2702019936"/>
       </p:ext>
     </p:extLst>
   </p:cSld>
@@ -375,7 +378,7 @@
 </file>
 
 <file path=ppt/slideLayouts/slideLayout10.xml><?xml version="1.0" encoding="utf-8"?>
-<p:sldLayout xmlns:a="http://schemas.openxmlformats.org/drawingml/2006/main" xmlns:r="http://schemas.openxmlformats.org/officeDocument/2006/relationships" xmlns:p="http://schemas.openxmlformats.org/presentationml/2006/main" type="vertTx" preserve="1">
+<p:sldLayout xmlns:a="http://schemas.openxmlformats.org/drawingml/2006/main" xmlns:r="http://schemas.openxmlformats.org/officeDocument/2006/relationships" xmlns:mc="http://schemas.openxmlformats.org/markup-compatibility/2006" xmlns:mv="urn:schemas-microsoft-com:mac:vml" xmlns:p="http://schemas.openxmlformats.org/presentationml/2006/main" mc:Ignorable="mv" mc:PreserveAttributes="mv:*" type="vertTx" preserve="1">
   <p:cSld name="Title and Vertical Text">
     <p:spTree>
       <p:nvGrpSpPr>
@@ -483,7 +486,8 @@
           <a:p>
             <a:fld id="{6BFECD78-3C8E-49F2-8FAB-59489D168ABB}" type="datetimeFigureOut">
               <a:rPr lang="en-US" smtClean="0"/>
-              <a:t>11/24/14</a:t>
+              <a:pPr/>
+              <a:t>11/29/14</a:t>
             </a:fld>
             <a:endParaRPr lang="en-US"/>
           </a:p>
@@ -525,6 +529,7 @@
           <a:p>
             <a:fld id="{0FB56013-B943-42BA-886F-6F9D4EB85E9D}" type="slidenum">
               <a:rPr lang="en-US" smtClean="0"/>
+              <a:pPr/>
               <a:t>‹#›</a:t>
             </a:fld>
             <a:endParaRPr lang="en-US"/>
@@ -534,7 +539,7 @@
     </p:spTree>
     <p:extLst>
       <p:ext uri="{BB962C8B-B14F-4D97-AF65-F5344CB8AC3E}">
-        <p14:creationId xmlns:p14="http://schemas.microsoft.com/office/powerpoint/2010/main" val="2949498235"/>
+        <p14:creationId xmlns:p14="http://schemas.microsoft.com/office/powerpoint/2010/main" xmlns:p="http://schemas.openxmlformats.org/presentationml/2006/main" xmlns:r="http://schemas.openxmlformats.org/officeDocument/2006/relationships" xmlns:a="http://schemas.openxmlformats.org/drawingml/2006/main" xmlns="" val="2949498235"/>
       </p:ext>
     </p:extLst>
   </p:cSld>
@@ -545,7 +550,7 @@
 </file>
 
 <file path=ppt/slideLayouts/slideLayout11.xml><?xml version="1.0" encoding="utf-8"?>
-<p:sldLayout xmlns:a="http://schemas.openxmlformats.org/drawingml/2006/main" xmlns:r="http://schemas.openxmlformats.org/officeDocument/2006/relationships" xmlns:p="http://schemas.openxmlformats.org/presentationml/2006/main" type="vertTitleAndTx" preserve="1">
+<p:sldLayout xmlns:a="http://schemas.openxmlformats.org/drawingml/2006/main" xmlns:r="http://schemas.openxmlformats.org/officeDocument/2006/relationships" xmlns:mc="http://schemas.openxmlformats.org/markup-compatibility/2006" xmlns:mv="urn:schemas-microsoft-com:mac:vml" xmlns:p="http://schemas.openxmlformats.org/presentationml/2006/main" mc:Ignorable="mv" mc:PreserveAttributes="mv:*" type="vertTitleAndTx" preserve="1">
   <p:cSld name="Vertical Title and Text">
     <p:spTree>
       <p:nvGrpSpPr>
@@ -663,7 +668,8 @@
           <a:p>
             <a:fld id="{6BFECD78-3C8E-49F2-8FAB-59489D168ABB}" type="datetimeFigureOut">
               <a:rPr lang="en-US" smtClean="0"/>
-              <a:t>11/24/14</a:t>
+              <a:pPr/>
+              <a:t>11/29/14</a:t>
             </a:fld>
             <a:endParaRPr lang="en-US"/>
           </a:p>
@@ -705,6 +711,7 @@
           <a:p>
             <a:fld id="{0FB56013-B943-42BA-886F-6F9D4EB85E9D}" type="slidenum">
               <a:rPr lang="en-US" smtClean="0"/>
+              <a:pPr/>
               <a:t>‹#›</a:t>
             </a:fld>
             <a:endParaRPr lang="en-US"/>
@@ -714,7 +721,7 @@
     </p:spTree>
     <p:extLst>
       <p:ext uri="{BB962C8B-B14F-4D97-AF65-F5344CB8AC3E}">
-        <p14:creationId xmlns:p14="http://schemas.microsoft.com/office/powerpoint/2010/main" val="1427941222"/>
+        <p14:creationId xmlns:p14="http://schemas.microsoft.com/office/powerpoint/2010/main" xmlns:p="http://schemas.openxmlformats.org/presentationml/2006/main" xmlns:r="http://schemas.openxmlformats.org/officeDocument/2006/relationships" xmlns:a="http://schemas.openxmlformats.org/drawingml/2006/main" xmlns="" val="1427941222"/>
       </p:ext>
     </p:extLst>
   </p:cSld>
@@ -725,7 +732,7 @@
 </file>
 
 <file path=ppt/slideLayouts/slideLayout2.xml><?xml version="1.0" encoding="utf-8"?>
-<p:sldLayout xmlns:a="http://schemas.openxmlformats.org/drawingml/2006/main" xmlns:r="http://schemas.openxmlformats.org/officeDocument/2006/relationships" xmlns:p="http://schemas.openxmlformats.org/presentationml/2006/main" type="obj" preserve="1">
+<p:sldLayout xmlns:a="http://schemas.openxmlformats.org/drawingml/2006/main" xmlns:r="http://schemas.openxmlformats.org/officeDocument/2006/relationships" xmlns:mc="http://schemas.openxmlformats.org/markup-compatibility/2006" xmlns:mv="urn:schemas-microsoft-com:mac:vml" xmlns:p="http://schemas.openxmlformats.org/presentationml/2006/main" mc:Ignorable="mv" mc:PreserveAttributes="mv:*" type="obj" preserve="1">
   <p:cSld name="Title and Content">
     <p:spTree>
       <p:nvGrpSpPr>
@@ -833,7 +840,8 @@
           <a:p>
             <a:fld id="{6BFECD78-3C8E-49F2-8FAB-59489D168ABB}" type="datetimeFigureOut">
               <a:rPr lang="en-US" smtClean="0"/>
-              <a:t>11/24/14</a:t>
+              <a:pPr/>
+              <a:t>11/29/14</a:t>
             </a:fld>
             <a:endParaRPr lang="en-US"/>
           </a:p>
@@ -875,6 +883,7 @@
           <a:p>
             <a:fld id="{0FB56013-B943-42BA-886F-6F9D4EB85E9D}" type="slidenum">
               <a:rPr lang="en-US" smtClean="0"/>
+              <a:pPr/>
               <a:t>‹#›</a:t>
             </a:fld>
             <a:endParaRPr lang="en-US"/>
@@ -884,7 +893,7 @@
     </p:spTree>
     <p:extLst>
       <p:ext uri="{BB962C8B-B14F-4D97-AF65-F5344CB8AC3E}">
-        <p14:creationId xmlns:p14="http://schemas.microsoft.com/office/powerpoint/2010/main" val="2275933374"/>
+        <p14:creationId xmlns:p14="http://schemas.microsoft.com/office/powerpoint/2010/main" xmlns:p="http://schemas.openxmlformats.org/presentationml/2006/main" xmlns:r="http://schemas.openxmlformats.org/officeDocument/2006/relationships" xmlns:a="http://schemas.openxmlformats.org/drawingml/2006/main" xmlns="" val="2275933374"/>
       </p:ext>
     </p:extLst>
   </p:cSld>
@@ -895,7 +904,7 @@
 </file>
 
 <file path=ppt/slideLayouts/slideLayout3.xml><?xml version="1.0" encoding="utf-8"?>
-<p:sldLayout xmlns:a="http://schemas.openxmlformats.org/drawingml/2006/main" xmlns:r="http://schemas.openxmlformats.org/officeDocument/2006/relationships" xmlns:p="http://schemas.openxmlformats.org/presentationml/2006/main" type="secHead" preserve="1">
+<p:sldLayout xmlns:a="http://schemas.openxmlformats.org/drawingml/2006/main" xmlns:r="http://schemas.openxmlformats.org/officeDocument/2006/relationships" xmlns:mc="http://schemas.openxmlformats.org/markup-compatibility/2006" xmlns:mv="urn:schemas-microsoft-com:mac:vml" xmlns:p="http://schemas.openxmlformats.org/presentationml/2006/main" mc:Ignorable="mv" mc:PreserveAttributes="mv:*" type="secHead" preserve="1">
   <p:cSld name="Section Header">
     <p:spTree>
       <p:nvGrpSpPr>
@@ -1079,7 +1088,8 @@
           <a:p>
             <a:fld id="{6BFECD78-3C8E-49F2-8FAB-59489D168ABB}" type="datetimeFigureOut">
               <a:rPr lang="en-US" smtClean="0"/>
-              <a:t>11/24/14</a:t>
+              <a:pPr/>
+              <a:t>11/29/14</a:t>
             </a:fld>
             <a:endParaRPr lang="en-US"/>
           </a:p>
@@ -1121,6 +1131,7 @@
           <a:p>
             <a:fld id="{0FB56013-B943-42BA-886F-6F9D4EB85E9D}" type="slidenum">
               <a:rPr lang="en-US" smtClean="0"/>
+              <a:pPr/>
               <a:t>‹#›</a:t>
             </a:fld>
             <a:endParaRPr lang="en-US"/>
@@ -1130,7 +1141,7 @@
     </p:spTree>
     <p:extLst>
       <p:ext uri="{BB962C8B-B14F-4D97-AF65-F5344CB8AC3E}">
-        <p14:creationId xmlns:p14="http://schemas.microsoft.com/office/powerpoint/2010/main" val="1798952600"/>
+        <p14:creationId xmlns:p14="http://schemas.microsoft.com/office/powerpoint/2010/main" xmlns:p="http://schemas.openxmlformats.org/presentationml/2006/main" xmlns:r="http://schemas.openxmlformats.org/officeDocument/2006/relationships" xmlns:a="http://schemas.openxmlformats.org/drawingml/2006/main" xmlns="" val="1798952600"/>
       </p:ext>
     </p:extLst>
   </p:cSld>
@@ -1141,7 +1152,7 @@
 </file>
 
 <file path=ppt/slideLayouts/slideLayout4.xml><?xml version="1.0" encoding="utf-8"?>
-<p:sldLayout xmlns:a="http://schemas.openxmlformats.org/drawingml/2006/main" xmlns:r="http://schemas.openxmlformats.org/officeDocument/2006/relationships" xmlns:p="http://schemas.openxmlformats.org/presentationml/2006/main" type="twoObj" preserve="1">
+<p:sldLayout xmlns:a="http://schemas.openxmlformats.org/drawingml/2006/main" xmlns:r="http://schemas.openxmlformats.org/officeDocument/2006/relationships" xmlns:mc="http://schemas.openxmlformats.org/markup-compatibility/2006" xmlns:mv="urn:schemas-microsoft-com:mac:vml" xmlns:p="http://schemas.openxmlformats.org/presentationml/2006/main" mc:Ignorable="mv" mc:PreserveAttributes="mv:*" type="twoObj" preserve="1">
   <p:cSld name="Two Content">
     <p:spTree>
       <p:nvGrpSpPr>
@@ -1367,7 +1378,8 @@
           <a:p>
             <a:fld id="{6BFECD78-3C8E-49F2-8FAB-59489D168ABB}" type="datetimeFigureOut">
               <a:rPr lang="en-US" smtClean="0"/>
-              <a:t>11/24/14</a:t>
+              <a:pPr/>
+              <a:t>11/29/14</a:t>
             </a:fld>
             <a:endParaRPr lang="en-US"/>
           </a:p>
@@ -1409,6 +1421,7 @@
           <a:p>
             <a:fld id="{0FB56013-B943-42BA-886F-6F9D4EB85E9D}" type="slidenum">
               <a:rPr lang="en-US" smtClean="0"/>
+              <a:pPr/>
               <a:t>‹#›</a:t>
             </a:fld>
             <a:endParaRPr lang="en-US"/>
@@ -1418,7 +1431,7 @@
     </p:spTree>
     <p:extLst>
       <p:ext uri="{BB962C8B-B14F-4D97-AF65-F5344CB8AC3E}">
-        <p14:creationId xmlns:p14="http://schemas.microsoft.com/office/powerpoint/2010/main" val="1034301619"/>
+        <p14:creationId xmlns:p14="http://schemas.microsoft.com/office/powerpoint/2010/main" xmlns:p="http://schemas.openxmlformats.org/presentationml/2006/main" xmlns:r="http://schemas.openxmlformats.org/officeDocument/2006/relationships" xmlns:a="http://schemas.openxmlformats.org/drawingml/2006/main" xmlns="" val="1034301619"/>
       </p:ext>
     </p:extLst>
   </p:cSld>
@@ -1429,7 +1442,7 @@
 </file>
 
 <file path=ppt/slideLayouts/slideLayout5.xml><?xml version="1.0" encoding="utf-8"?>
-<p:sldLayout xmlns:a="http://schemas.openxmlformats.org/drawingml/2006/main" xmlns:r="http://schemas.openxmlformats.org/officeDocument/2006/relationships" xmlns:p="http://schemas.openxmlformats.org/presentationml/2006/main" type="twoTxTwoObj" preserve="1">
+<p:sldLayout xmlns:a="http://schemas.openxmlformats.org/drawingml/2006/main" xmlns:r="http://schemas.openxmlformats.org/officeDocument/2006/relationships" xmlns:mc="http://schemas.openxmlformats.org/markup-compatibility/2006" xmlns:mv="urn:schemas-microsoft-com:mac:vml" xmlns:p="http://schemas.openxmlformats.org/presentationml/2006/main" mc:Ignorable="mv" mc:PreserveAttributes="mv:*" type="twoTxTwoObj" preserve="1">
   <p:cSld name="Comparison">
     <p:spTree>
       <p:nvGrpSpPr>
@@ -1789,7 +1802,8 @@
           <a:p>
             <a:fld id="{6BFECD78-3C8E-49F2-8FAB-59489D168ABB}" type="datetimeFigureOut">
               <a:rPr lang="en-US" smtClean="0"/>
-              <a:t>11/24/14</a:t>
+              <a:pPr/>
+              <a:t>11/29/14</a:t>
             </a:fld>
             <a:endParaRPr lang="en-US"/>
           </a:p>
@@ -1831,6 +1845,7 @@
           <a:p>
             <a:fld id="{0FB56013-B943-42BA-886F-6F9D4EB85E9D}" type="slidenum">
               <a:rPr lang="en-US" smtClean="0"/>
+              <a:pPr/>
               <a:t>‹#›</a:t>
             </a:fld>
             <a:endParaRPr lang="en-US"/>
@@ -1840,7 +1855,7 @@
     </p:spTree>
     <p:extLst>
       <p:ext uri="{BB962C8B-B14F-4D97-AF65-F5344CB8AC3E}">
-        <p14:creationId xmlns:p14="http://schemas.microsoft.com/office/powerpoint/2010/main" val="1417940929"/>
+        <p14:creationId xmlns:p14="http://schemas.microsoft.com/office/powerpoint/2010/main" xmlns:p="http://schemas.openxmlformats.org/presentationml/2006/main" xmlns:r="http://schemas.openxmlformats.org/officeDocument/2006/relationships" xmlns:a="http://schemas.openxmlformats.org/drawingml/2006/main" xmlns="" val="1417940929"/>
       </p:ext>
     </p:extLst>
   </p:cSld>
@@ -1851,7 +1866,7 @@
 </file>
 
 <file path=ppt/slideLayouts/slideLayout6.xml><?xml version="1.0" encoding="utf-8"?>
-<p:sldLayout xmlns:a="http://schemas.openxmlformats.org/drawingml/2006/main" xmlns:r="http://schemas.openxmlformats.org/officeDocument/2006/relationships" xmlns:p="http://schemas.openxmlformats.org/presentationml/2006/main" type="titleOnly" preserve="1">
+<p:sldLayout xmlns:a="http://schemas.openxmlformats.org/drawingml/2006/main" xmlns:r="http://schemas.openxmlformats.org/officeDocument/2006/relationships" xmlns:mc="http://schemas.openxmlformats.org/markup-compatibility/2006" xmlns:mv="urn:schemas-microsoft-com:mac:vml" xmlns:p="http://schemas.openxmlformats.org/presentationml/2006/main" mc:Ignorable="mv" mc:PreserveAttributes="mv:*" type="titleOnly" preserve="1">
   <p:cSld name="Title Only">
     <p:spTree>
       <p:nvGrpSpPr>
@@ -1907,7 +1922,8 @@
           <a:p>
             <a:fld id="{6BFECD78-3C8E-49F2-8FAB-59489D168ABB}" type="datetimeFigureOut">
               <a:rPr lang="en-US" smtClean="0"/>
-              <a:t>11/24/14</a:t>
+              <a:pPr/>
+              <a:t>11/29/14</a:t>
             </a:fld>
             <a:endParaRPr lang="en-US"/>
           </a:p>
@@ -1949,6 +1965,7 @@
           <a:p>
             <a:fld id="{0FB56013-B943-42BA-886F-6F9D4EB85E9D}" type="slidenum">
               <a:rPr lang="en-US" smtClean="0"/>
+              <a:pPr/>
               <a:t>‹#›</a:t>
             </a:fld>
             <a:endParaRPr lang="en-US"/>
@@ -1958,7 +1975,7 @@
     </p:spTree>
     <p:extLst>
       <p:ext uri="{BB962C8B-B14F-4D97-AF65-F5344CB8AC3E}">
-        <p14:creationId xmlns:p14="http://schemas.microsoft.com/office/powerpoint/2010/main" val="656067729"/>
+        <p14:creationId xmlns:p14="http://schemas.microsoft.com/office/powerpoint/2010/main" xmlns:p="http://schemas.openxmlformats.org/presentationml/2006/main" xmlns:r="http://schemas.openxmlformats.org/officeDocument/2006/relationships" xmlns:a="http://schemas.openxmlformats.org/drawingml/2006/main" xmlns="" val="656067729"/>
       </p:ext>
     </p:extLst>
   </p:cSld>
@@ -1969,7 +1986,7 @@
 </file>
 
 <file path=ppt/slideLayouts/slideLayout7.xml><?xml version="1.0" encoding="utf-8"?>
-<p:sldLayout xmlns:a="http://schemas.openxmlformats.org/drawingml/2006/main" xmlns:r="http://schemas.openxmlformats.org/officeDocument/2006/relationships" xmlns:p="http://schemas.openxmlformats.org/presentationml/2006/main" type="blank" preserve="1">
+<p:sldLayout xmlns:a="http://schemas.openxmlformats.org/drawingml/2006/main" xmlns:r="http://schemas.openxmlformats.org/officeDocument/2006/relationships" xmlns:mc="http://schemas.openxmlformats.org/markup-compatibility/2006" xmlns:mv="urn:schemas-microsoft-com:mac:vml" xmlns:p="http://schemas.openxmlformats.org/presentationml/2006/main" mc:Ignorable="mv" mc:PreserveAttributes="mv:*" type="blank" preserve="1">
   <p:cSld name="Blank">
     <p:spTree>
       <p:nvGrpSpPr>
@@ -2002,7 +2019,8 @@
           <a:p>
             <a:fld id="{6BFECD78-3C8E-49F2-8FAB-59489D168ABB}" type="datetimeFigureOut">
               <a:rPr lang="en-US" smtClean="0"/>
-              <a:t>11/24/14</a:t>
+              <a:pPr/>
+              <a:t>11/29/14</a:t>
             </a:fld>
             <a:endParaRPr lang="en-US"/>
           </a:p>
@@ -2044,6 +2062,7 @@
           <a:p>
             <a:fld id="{0FB56013-B943-42BA-886F-6F9D4EB85E9D}" type="slidenum">
               <a:rPr lang="en-US" smtClean="0"/>
+              <a:pPr/>
               <a:t>‹#›</a:t>
             </a:fld>
             <a:endParaRPr lang="en-US"/>
@@ -2053,7 +2072,7 @@
     </p:spTree>
     <p:extLst>
       <p:ext uri="{BB962C8B-B14F-4D97-AF65-F5344CB8AC3E}">
-        <p14:creationId xmlns:p14="http://schemas.microsoft.com/office/powerpoint/2010/main" val="1249128790"/>
+        <p14:creationId xmlns:p14="http://schemas.microsoft.com/office/powerpoint/2010/main" xmlns:p="http://schemas.openxmlformats.org/presentationml/2006/main" xmlns:r="http://schemas.openxmlformats.org/officeDocument/2006/relationships" xmlns:a="http://schemas.openxmlformats.org/drawingml/2006/main" xmlns="" val="1249128790"/>
       </p:ext>
     </p:extLst>
   </p:cSld>
@@ -2064,7 +2083,7 @@
 </file>
 
 <file path=ppt/slideLayouts/slideLayout8.xml><?xml version="1.0" encoding="utf-8"?>
-<p:sldLayout xmlns:a="http://schemas.openxmlformats.org/drawingml/2006/main" xmlns:r="http://schemas.openxmlformats.org/officeDocument/2006/relationships" xmlns:p="http://schemas.openxmlformats.org/presentationml/2006/main" type="objTx" preserve="1">
+<p:sldLayout xmlns:a="http://schemas.openxmlformats.org/drawingml/2006/main" xmlns:r="http://schemas.openxmlformats.org/officeDocument/2006/relationships" xmlns:mc="http://schemas.openxmlformats.org/markup-compatibility/2006" xmlns:mv="urn:schemas-microsoft-com:mac:vml" xmlns:p="http://schemas.openxmlformats.org/presentationml/2006/main" mc:Ignorable="mv" mc:PreserveAttributes="mv:*" type="objTx" preserve="1">
   <p:cSld name="Content with Caption">
     <p:spTree>
       <p:nvGrpSpPr>
@@ -2279,7 +2298,8 @@
           <a:p>
             <a:fld id="{6BFECD78-3C8E-49F2-8FAB-59489D168ABB}" type="datetimeFigureOut">
               <a:rPr lang="en-US" smtClean="0"/>
-              <a:t>11/24/14</a:t>
+              <a:pPr/>
+              <a:t>11/29/14</a:t>
             </a:fld>
             <a:endParaRPr lang="en-US"/>
           </a:p>
@@ -2321,6 +2341,7 @@
           <a:p>
             <a:fld id="{0FB56013-B943-42BA-886F-6F9D4EB85E9D}" type="slidenum">
               <a:rPr lang="en-US" smtClean="0"/>
+              <a:pPr/>
               <a:t>‹#›</a:t>
             </a:fld>
             <a:endParaRPr lang="en-US"/>
@@ -2330,7 +2351,7 @@
     </p:spTree>
     <p:extLst>
       <p:ext uri="{BB962C8B-B14F-4D97-AF65-F5344CB8AC3E}">
-        <p14:creationId xmlns:p14="http://schemas.microsoft.com/office/powerpoint/2010/main" val="2730116199"/>
+        <p14:creationId xmlns:p14="http://schemas.microsoft.com/office/powerpoint/2010/main" xmlns:p="http://schemas.openxmlformats.org/presentationml/2006/main" xmlns:r="http://schemas.openxmlformats.org/officeDocument/2006/relationships" xmlns:a="http://schemas.openxmlformats.org/drawingml/2006/main" xmlns="" val="2730116199"/>
       </p:ext>
     </p:extLst>
   </p:cSld>
@@ -2341,7 +2362,7 @@
 </file>
 
 <file path=ppt/slideLayouts/slideLayout9.xml><?xml version="1.0" encoding="utf-8"?>
-<p:sldLayout xmlns:a="http://schemas.openxmlformats.org/drawingml/2006/main" xmlns:r="http://schemas.openxmlformats.org/officeDocument/2006/relationships" xmlns:p="http://schemas.openxmlformats.org/presentationml/2006/main" type="picTx" preserve="1">
+<p:sldLayout xmlns:a="http://schemas.openxmlformats.org/drawingml/2006/main" xmlns:r="http://schemas.openxmlformats.org/officeDocument/2006/relationships" xmlns:mc="http://schemas.openxmlformats.org/markup-compatibility/2006" xmlns:mv="urn:schemas-microsoft-com:mac:vml" xmlns:p="http://schemas.openxmlformats.org/presentationml/2006/main" mc:Ignorable="mv" mc:PreserveAttributes="mv:*" type="picTx" preserve="1">
   <p:cSld name="Picture with Caption">
     <p:spTree>
       <p:nvGrpSpPr>
@@ -2536,7 +2557,8 @@
           <a:p>
             <a:fld id="{6BFECD78-3C8E-49F2-8FAB-59489D168ABB}" type="datetimeFigureOut">
               <a:rPr lang="en-US" smtClean="0"/>
-              <a:t>11/24/14</a:t>
+              <a:pPr/>
+              <a:t>11/29/14</a:t>
             </a:fld>
             <a:endParaRPr lang="en-US"/>
           </a:p>
@@ -2578,6 +2600,7 @@
           <a:p>
             <a:fld id="{0FB56013-B943-42BA-886F-6F9D4EB85E9D}" type="slidenum">
               <a:rPr lang="en-US" smtClean="0"/>
+              <a:pPr/>
               <a:t>‹#›</a:t>
             </a:fld>
             <a:endParaRPr lang="en-US"/>
@@ -2587,7 +2610,7 @@
     </p:spTree>
     <p:extLst>
       <p:ext uri="{BB962C8B-B14F-4D97-AF65-F5344CB8AC3E}">
-        <p14:creationId xmlns:p14="http://schemas.microsoft.com/office/powerpoint/2010/main" val="506574558"/>
+        <p14:creationId xmlns:p14="http://schemas.microsoft.com/office/powerpoint/2010/main" xmlns:p="http://schemas.openxmlformats.org/presentationml/2006/main" xmlns:r="http://schemas.openxmlformats.org/officeDocument/2006/relationships" xmlns:a="http://schemas.openxmlformats.org/drawingml/2006/main" xmlns="" val="506574558"/>
       </p:ext>
     </p:extLst>
   </p:cSld>
@@ -2598,7 +2621,7 @@
 </file>
 
 <file path=ppt/slideMasters/slideMaster1.xml><?xml version="1.0" encoding="utf-8"?>
-<p:sldMaster xmlns:a="http://schemas.openxmlformats.org/drawingml/2006/main" xmlns:r="http://schemas.openxmlformats.org/officeDocument/2006/relationships" xmlns:p="http://schemas.openxmlformats.org/presentationml/2006/main">
+<p:sldMaster xmlns:a="http://schemas.openxmlformats.org/drawingml/2006/main" xmlns:r="http://schemas.openxmlformats.org/officeDocument/2006/relationships" xmlns:mc="http://schemas.openxmlformats.org/markup-compatibility/2006" xmlns:mv="urn:schemas-microsoft-com:mac:vml" xmlns:p="http://schemas.openxmlformats.org/presentationml/2006/main" mc:Ignorable="mv" mc:PreserveAttributes="mv:*">
   <p:cSld>
     <p:bg>
       <p:bgPr>
@@ -2755,7 +2778,7 @@
             <a:fld id="{6BFECD78-3C8E-49F2-8FAB-59489D168ABB}" type="datetimeFigureOut">
               <a:rPr lang="en-US" smtClean="0"/>
               <a:pPr/>
-              <a:t>11/24/14</a:t>
+              <a:t>11/29/14</a:t>
             </a:fld>
             <a:endParaRPr lang="en-US"/>
           </a:p>
@@ -2839,7 +2862,7 @@
     </p:spTree>
     <p:extLst>
       <p:ext uri="{BB962C8B-B14F-4D97-AF65-F5344CB8AC3E}">
-        <p14:creationId xmlns:p14="http://schemas.microsoft.com/office/powerpoint/2010/main" val="2557711237"/>
+        <p14:creationId xmlns:p14="http://schemas.microsoft.com/office/powerpoint/2010/main" xmlns:p="http://schemas.openxmlformats.org/presentationml/2006/main" xmlns:r="http://schemas.openxmlformats.org/officeDocument/2006/relationships" xmlns:a="http://schemas.openxmlformats.org/drawingml/2006/main" xmlns="" val="2557711237"/>
       </p:ext>
     </p:extLst>
   </p:cSld>
@@ -3111,7 +3134,7 @@
 </file>
 
 <file path=ppt/slides/slide1.xml><?xml version="1.0" encoding="utf-8"?>
-<p:sld xmlns:a="http://schemas.openxmlformats.org/drawingml/2006/main" xmlns:r="http://schemas.openxmlformats.org/officeDocument/2006/relationships" xmlns:p="http://schemas.openxmlformats.org/presentationml/2006/main">
+<p:sld xmlns:a="http://schemas.openxmlformats.org/drawingml/2006/main" xmlns:r="http://schemas.openxmlformats.org/officeDocument/2006/relationships" xmlns:mc="http://schemas.openxmlformats.org/markup-compatibility/2006" xmlns:mv="urn:schemas-microsoft-com:mac:vml" xmlns:p="http://schemas.openxmlformats.org/presentationml/2006/main" mc:Ignorable="mv" mc:PreserveAttributes="mv:*">
   <p:cSld>
     <p:spTree>
       <p:nvGrpSpPr>
@@ -3191,7 +3214,7 @@
     </p:spTree>
     <p:extLst>
       <p:ext uri="{BB962C8B-B14F-4D97-AF65-F5344CB8AC3E}">
-        <p14:creationId xmlns:p14="http://schemas.microsoft.com/office/powerpoint/2010/main" val="1728261021"/>
+        <p14:creationId xmlns:p14="http://schemas.microsoft.com/office/powerpoint/2010/main" xmlns:p="http://schemas.openxmlformats.org/presentationml/2006/main" xmlns:r="http://schemas.openxmlformats.org/officeDocument/2006/relationships" xmlns:a="http://schemas.openxmlformats.org/drawingml/2006/main" xmlns="" val="1728261021"/>
       </p:ext>
     </p:extLst>
   </p:cSld>
@@ -3201,7 +3224,7 @@
   <p:timing>
     <p:tnLst>
       <p:par>
-        <p:cTn xmlns:p14="http://schemas.microsoft.com/office/powerpoint/2010/main" id="1" dur="indefinite" restart="never" nodeType="tmRoot"/>
+        <p:cTn id="1" dur="indefinite" restart="never" nodeType="tmRoot"/>
       </p:par>
     </p:tnLst>
   </p:timing>
@@ -3209,7 +3232,7 @@
 </file>
 
 <file path=ppt/slides/slide2.xml><?xml version="1.0" encoding="utf-8"?>
-<p:sld xmlns:a="http://schemas.openxmlformats.org/drawingml/2006/main" xmlns:r="http://schemas.openxmlformats.org/officeDocument/2006/relationships" xmlns:p="http://schemas.openxmlformats.org/presentationml/2006/main">
+<p:sld xmlns:a="http://schemas.openxmlformats.org/drawingml/2006/main" xmlns:r="http://schemas.openxmlformats.org/officeDocument/2006/relationships" xmlns:mc="http://schemas.openxmlformats.org/markup-compatibility/2006" xmlns:mv="urn:schemas-microsoft-com:mac:vml" xmlns:p="http://schemas.openxmlformats.org/presentationml/2006/main" mc:Ignorable="mv" mc:PreserveAttributes="mv:*">
   <p:cSld>
     <p:spTree>
       <p:nvGrpSpPr>
@@ -3415,7 +3438,7 @@
           <a:blip r:embed="rId2">
             <a:extLst>
               <a:ext uri="{28A0092B-C50C-407E-A947-70E740481C1C}">
-                <a14:useLocalDpi xmlns:a14="http://schemas.microsoft.com/office/drawing/2010/main" val="0"/>
+                <a14:useLocalDpi xmlns:a14="http://schemas.microsoft.com/office/drawing/2010/main" xmlns:p="http://schemas.openxmlformats.org/presentationml/2006/main" xmlns:r="http://schemas.openxmlformats.org/officeDocument/2006/relationships" xmlns:a="http://schemas.openxmlformats.org/drawingml/2006/main" xmlns="" val="0"/>
               </a:ext>
             </a:extLst>
           </a:blip>
@@ -3444,7 +3467,7 @@
           <a:blip r:embed="rId3">
             <a:extLst>
               <a:ext uri="{28A0092B-C50C-407E-A947-70E740481C1C}">
-                <a14:useLocalDpi xmlns:a14="http://schemas.microsoft.com/office/drawing/2010/main" val="0"/>
+                <a14:useLocalDpi xmlns:a14="http://schemas.microsoft.com/office/drawing/2010/main" xmlns:p="http://schemas.openxmlformats.org/presentationml/2006/main" xmlns:r="http://schemas.openxmlformats.org/officeDocument/2006/relationships" xmlns:a="http://schemas.openxmlformats.org/drawingml/2006/main" xmlns="" val="0"/>
               </a:ext>
             </a:extLst>
           </a:blip>
@@ -3464,7 +3487,7 @@
     </p:spTree>
     <p:extLst>
       <p:ext uri="{BB962C8B-B14F-4D97-AF65-F5344CB8AC3E}">
-        <p14:creationId xmlns:p14="http://schemas.microsoft.com/office/powerpoint/2010/main" val="3051097567"/>
+        <p14:creationId xmlns:p14="http://schemas.microsoft.com/office/powerpoint/2010/main" xmlns:p="http://schemas.openxmlformats.org/presentationml/2006/main" xmlns:r="http://schemas.openxmlformats.org/officeDocument/2006/relationships" xmlns:a="http://schemas.openxmlformats.org/drawingml/2006/main" xmlns="" val="3051097567"/>
       </p:ext>
     </p:extLst>
   </p:cSld>
@@ -3474,7 +3497,7 @@
   <p:timing>
     <p:tnLst>
       <p:par>
-        <p:cTn xmlns:p14="http://schemas.microsoft.com/office/powerpoint/2010/main" id="1" dur="indefinite" restart="never" nodeType="tmRoot">
+        <p:cTn id="1" dur="indefinite" restart="never" nodeType="tmRoot">
           <p:childTnLst>
             <p:seq concurrent="1" nextAc="seek">
               <p:cTn id="2" dur="indefinite" nodeType="mainSeq">
@@ -4190,7 +4213,7 @@
 </file>
 
 <file path=ppt/slides/slide3.xml><?xml version="1.0" encoding="utf-8"?>
-<p:sld xmlns:a="http://schemas.openxmlformats.org/drawingml/2006/main" xmlns:r="http://schemas.openxmlformats.org/officeDocument/2006/relationships" xmlns:p="http://schemas.openxmlformats.org/presentationml/2006/main">
+<p:sld xmlns:a="http://schemas.openxmlformats.org/drawingml/2006/main" xmlns:r="http://schemas.openxmlformats.org/officeDocument/2006/relationships" xmlns:mc="http://schemas.openxmlformats.org/markup-compatibility/2006" xmlns:mv="urn:schemas-microsoft-com:mac:vml" xmlns:p="http://schemas.openxmlformats.org/presentationml/2006/main" mc:Ignorable="mv" mc:PreserveAttributes="mv:*">
   <p:cSld>
     <p:spTree>
       <p:nvGrpSpPr>
@@ -4218,7 +4241,7 @@
           <a:blip r:embed="rId2" cstate="print">
             <a:extLst>
               <a:ext uri="{28A0092B-C50C-407E-A947-70E740481C1C}">
-                <a14:useLocalDpi xmlns:a14="http://schemas.microsoft.com/office/drawing/2010/main" val="0"/>
+                <a14:useLocalDpi xmlns:a14="http://schemas.microsoft.com/office/drawing/2010/main" xmlns:p="http://schemas.openxmlformats.org/presentationml/2006/main" xmlns:r="http://schemas.openxmlformats.org/officeDocument/2006/relationships" xmlns:a="http://schemas.openxmlformats.org/drawingml/2006/main" xmlns="" val="0"/>
               </a:ext>
             </a:extLst>
           </a:blip>
@@ -4238,7 +4261,7 @@
     </p:spTree>
     <p:extLst>
       <p:ext uri="{BB962C8B-B14F-4D97-AF65-F5344CB8AC3E}">
-        <p14:creationId xmlns:p14="http://schemas.microsoft.com/office/powerpoint/2010/main" val="3820048524"/>
+        <p14:creationId xmlns:p14="http://schemas.microsoft.com/office/powerpoint/2010/main" xmlns:p="http://schemas.openxmlformats.org/presentationml/2006/main" xmlns:r="http://schemas.openxmlformats.org/officeDocument/2006/relationships" xmlns:a="http://schemas.openxmlformats.org/drawingml/2006/main" xmlns="" val="3820048524"/>
       </p:ext>
     </p:extLst>
   </p:cSld>
@@ -4248,7 +4271,7 @@
   <p:timing>
     <p:tnLst>
       <p:par>
-        <p:cTn xmlns:p14="http://schemas.microsoft.com/office/powerpoint/2010/main" id="1" dur="indefinite" restart="never" nodeType="tmRoot"/>
+        <p:cTn id="1" dur="indefinite" restart="never" nodeType="tmRoot"/>
       </p:par>
     </p:tnLst>
   </p:timing>
@@ -4256,7 +4279,7 @@
 </file>
 
 <file path=ppt/slides/slide4.xml><?xml version="1.0" encoding="utf-8"?>
-<p:sld xmlns:a="http://schemas.openxmlformats.org/drawingml/2006/main" xmlns:r="http://schemas.openxmlformats.org/officeDocument/2006/relationships" xmlns:p="http://schemas.openxmlformats.org/presentationml/2006/main">
+<p:sld xmlns:a="http://schemas.openxmlformats.org/drawingml/2006/main" xmlns:r="http://schemas.openxmlformats.org/officeDocument/2006/relationships" xmlns:mc="http://schemas.openxmlformats.org/markup-compatibility/2006" xmlns:mv="urn:schemas-microsoft-com:mac:vml" xmlns:p="http://schemas.openxmlformats.org/presentationml/2006/main" mc:Ignorable="mv" mc:PreserveAttributes="mv:*">
   <p:cSld>
     <p:spTree>
       <p:nvGrpSpPr>
@@ -4314,7 +4337,7 @@
           <a:blip r:embed="rId2">
             <a:extLst>
               <a:ext uri="{28A0092B-C50C-407E-A947-70E740481C1C}">
-                <a14:useLocalDpi xmlns:a14="http://schemas.microsoft.com/office/drawing/2010/main" val="0"/>
+                <a14:useLocalDpi xmlns:a14="http://schemas.microsoft.com/office/drawing/2010/main" xmlns:p="http://schemas.openxmlformats.org/presentationml/2006/main" xmlns:r="http://schemas.openxmlformats.org/officeDocument/2006/relationships" xmlns:a="http://schemas.openxmlformats.org/drawingml/2006/main" xmlns="" val="0"/>
               </a:ext>
             </a:extLst>
           </a:blip>
@@ -4344,7 +4367,7 @@
           <a:blip r:embed="rId2">
             <a:extLst>
               <a:ext uri="{28A0092B-C50C-407E-A947-70E740481C1C}">
-                <a14:useLocalDpi xmlns:a14="http://schemas.microsoft.com/office/drawing/2010/main" val="0"/>
+                <a14:useLocalDpi xmlns:a14="http://schemas.microsoft.com/office/drawing/2010/main" xmlns:p="http://schemas.openxmlformats.org/presentationml/2006/main" xmlns:r="http://schemas.openxmlformats.org/officeDocument/2006/relationships" xmlns:a="http://schemas.openxmlformats.org/drawingml/2006/main" xmlns="" val="0"/>
               </a:ext>
             </a:extLst>
           </a:blip>
@@ -4373,7 +4396,7 @@
           <a:blip r:embed="rId2">
             <a:extLst>
               <a:ext uri="{28A0092B-C50C-407E-A947-70E740481C1C}">
-                <a14:useLocalDpi xmlns:a14="http://schemas.microsoft.com/office/drawing/2010/main" val="0"/>
+                <a14:useLocalDpi xmlns:a14="http://schemas.microsoft.com/office/drawing/2010/main" xmlns:p="http://schemas.openxmlformats.org/presentationml/2006/main" xmlns:r="http://schemas.openxmlformats.org/officeDocument/2006/relationships" xmlns:a="http://schemas.openxmlformats.org/drawingml/2006/main" xmlns="" val="0"/>
               </a:ext>
             </a:extLst>
           </a:blip>
@@ -4765,7 +4788,7 @@
     </p:spTree>
     <p:extLst>
       <p:ext uri="{BB962C8B-B14F-4D97-AF65-F5344CB8AC3E}">
-        <p14:creationId xmlns:p14="http://schemas.microsoft.com/office/powerpoint/2010/main" val="4028300545"/>
+        <p14:creationId xmlns:p14="http://schemas.microsoft.com/office/powerpoint/2010/main" xmlns:p="http://schemas.openxmlformats.org/presentationml/2006/main" xmlns:r="http://schemas.openxmlformats.org/officeDocument/2006/relationships" xmlns:a="http://schemas.openxmlformats.org/drawingml/2006/main" xmlns="" val="4028300545"/>
       </p:ext>
     </p:extLst>
   </p:cSld>
@@ -4775,7 +4798,7 @@
   <p:timing>
     <p:tnLst>
       <p:par>
-        <p:cTn xmlns:p14="http://schemas.microsoft.com/office/powerpoint/2010/main" id="1" dur="indefinite" restart="never" nodeType="tmRoot">
+        <p:cTn id="1" dur="indefinite" restart="never" nodeType="tmRoot">
           <p:childTnLst>
             <p:seq concurrent="1" nextAc="seek">
               <p:cTn id="2" dur="indefinite" nodeType="mainSeq">
@@ -5441,6 +5464,116 @@
 </p:sld>
 </file>
 
+<file path=ppt/slides/slide5.xml><?xml version="1.0" encoding="utf-8"?>
+<p:sld xmlns:a="http://schemas.openxmlformats.org/drawingml/2006/main" xmlns:r="http://schemas.openxmlformats.org/officeDocument/2006/relationships" xmlns:mc="http://schemas.openxmlformats.org/markup-compatibility/2006" xmlns:mv="urn:schemas-microsoft-com:mac:vml" xmlns:p="http://schemas.openxmlformats.org/presentationml/2006/main" mc:Ignorable="mv" mc:PreserveAttributes="mv:*">
+  <p:cSld>
+    <p:spTree>
+      <p:nvGrpSpPr>
+        <p:cNvPr id="1" name=""/>
+        <p:cNvGrpSpPr/>
+        <p:nvPr/>
+      </p:nvGrpSpPr>
+      <p:grpSpPr>
+        <a:xfrm>
+          <a:off x="0" y="0"/>
+          <a:ext cx="0" cy="0"/>
+          <a:chOff x="0" y="0"/>
+          <a:chExt cx="0" cy="0"/>
+        </a:xfrm>
+      </p:grpSpPr>
+      <p:sp>
+        <p:nvSpPr>
+          <p:cNvPr id="4" name="Text Placeholder 3"/>
+          <p:cNvSpPr>
+            <a:spLocks noGrp="1"/>
+          </p:cNvSpPr>
+          <p:nvPr>
+            <p:ph type="body" sz="half" idx="2"/>
+          </p:nvPr>
+        </p:nvSpPr>
+        <p:spPr>
+          <a:xfrm>
+            <a:off x="457202" y="1435102"/>
+            <a:ext cx="8497277" cy="4691063"/>
+          </a:xfrm>
+        </p:spPr>
+        <p:txBody>
+          <a:bodyPr/>
+          <a:lstStyle/>
+          <a:p>
+            <a:r>
+              <a:rPr lang="en-US" dirty="0" smtClean="0"/>
+              <a:t>Lost and Found (</a:t>
+            </a:r>
+            <a:r>
+              <a:rPr lang="en-US" smtClean="0"/>
+              <a:t>starting out):</a:t>
+            </a:r>
+            <a:endParaRPr lang="en-US" dirty="0" smtClean="0"/>
+          </a:p>
+          <a:p>
+            <a:endParaRPr lang="en-US" dirty="0" smtClean="0"/>
+          </a:p>
+          <a:p>
+            <a:r>
+              <a:rPr lang="en-US" dirty="0" smtClean="0"/>
+              <a:t>LDAP credential connections for </a:t>
+            </a:r>
+            <a:r>
+              <a:rPr lang="en-US" dirty="0" err="1" smtClean="0"/>
+              <a:t>Mizzou</a:t>
+            </a:r>
+            <a:r>
+              <a:rPr lang="en-US" dirty="0" smtClean="0"/>
+              <a:t> students and administrators</a:t>
+            </a:r>
+          </a:p>
+          <a:p>
+            <a:endParaRPr lang="en-US" dirty="0" smtClean="0"/>
+          </a:p>
+          <a:p>
+            <a:r>
+              <a:rPr lang="en-US" dirty="0" smtClean="0"/>
+              <a:t>Admin approval for item types (Picture???)</a:t>
+            </a:r>
+          </a:p>
+          <a:p>
+            <a:endParaRPr lang="en-US" dirty="0" smtClean="0"/>
+          </a:p>
+          <a:p>
+            <a:r>
+              <a:rPr lang="en-US" dirty="0" smtClean="0"/>
+              <a:t>Secure entry of information by users to keep from injection attacks and issues</a:t>
+            </a:r>
+          </a:p>
+          <a:p>
+            <a:endParaRPr lang="en-US" dirty="0" smtClean="0"/>
+          </a:p>
+          <a:p>
+            <a:r>
+              <a:rPr lang="en-US" dirty="0" smtClean="0"/>
+              <a:t>Tables are cross referenced, to keep all information most updated and current</a:t>
+            </a:r>
+          </a:p>
+          <a:p>
+            <a:endParaRPr lang="en-US" dirty="0" smtClean="0"/>
+          </a:p>
+          <a:p>
+            <a:r>
+              <a:rPr lang="en-US" dirty="0" smtClean="0"/>
+              <a:t>Sessions are passed to allow other parts of the website to access the same LDAP connection</a:t>
+            </a:r>
+          </a:p>
+        </p:txBody>
+      </p:sp>
+    </p:spTree>
+  </p:cSld>
+  <p:clrMapOvr>
+    <a:masterClrMapping/>
+  </p:clrMapOvr>
+</p:sld>
+</file>
+
 <file path=ppt/theme/theme1.xml><?xml version="1.0" encoding="utf-8"?>
 <a:theme xmlns:a="http://schemas.openxmlformats.org/drawingml/2006/main" name=" Black ">
   <a:themeElements>

</xml_diff>

<commit_message>
Lost and found ppt update.
</commit_message>
<xml_diff>
--- a/babbage/powerpoint/Group18 Presentation.pptx
+++ b/babbage/powerpoint/Group18 Presentation.pptx
@@ -10,6 +10,7 @@
     <p:sldId id="257" r:id="rId4"/>
     <p:sldId id="258" r:id="rId5"/>
     <p:sldId id="260" r:id="rId6"/>
+    <p:sldId id="261" r:id="rId7"/>
   </p:sldIdLst>
   <p:sldSz cx="9144000" cy="6858000" type="screen4x3"/>
   <p:notesSz cx="6858000" cy="9144000"/>
@@ -110,7 +111,7 @@
   </p:defaultTextStyle>
   <p:extLst>
     <p:ext uri="{521415D9-36F7-43E2-AB2F-B90AF26B5E84}">
-      <p14:sectionLst xmlns:p14="http://schemas.microsoft.com/office/powerpoint/2010/main" xmlns:p="http://schemas.openxmlformats.org/presentationml/2006/main" xmlns:r="http://schemas.openxmlformats.org/officeDocument/2006/relationships" xmlns:a="http://schemas.openxmlformats.org/drawingml/2006/main" xmlns="">
+      <p14:sectionLst xmlns="" xmlns:a="http://schemas.openxmlformats.org/drawingml/2006/main" xmlns:r="http://schemas.openxmlformats.org/officeDocument/2006/relationships" xmlns:p="http://schemas.openxmlformats.org/presentationml/2006/main" xmlns:p14="http://schemas.microsoft.com/office/powerpoint/2010/main" xmlns:mv="urn:schemas-microsoft-com:mac:vml" xmlns:mc="http://schemas.openxmlformats.org/markup-compatibility/2006">
         <p14:section name="Opening" id="{891F661E-DE42-5B49-BA88-1D4106BE2C4B}">
           <p14:sldIdLst>
             <p14:sldId id="256"/>
@@ -315,7 +316,7 @@
             <a:fld id="{6BFECD78-3C8E-49F2-8FAB-59489D168ABB}" type="datetimeFigureOut">
               <a:rPr lang="en-US" smtClean="0"/>
               <a:pPr/>
-              <a:t>11/29/14</a:t>
+              <a:t>11/30/14</a:t>
             </a:fld>
             <a:endParaRPr lang="en-US"/>
           </a:p>
@@ -367,7 +368,7 @@
     </p:spTree>
     <p:extLst>
       <p:ext uri="{BB962C8B-B14F-4D97-AF65-F5344CB8AC3E}">
-        <p14:creationId xmlns:p14="http://schemas.microsoft.com/office/powerpoint/2010/main" xmlns:p="http://schemas.openxmlformats.org/presentationml/2006/main" xmlns:r="http://schemas.openxmlformats.org/officeDocument/2006/relationships" xmlns:a="http://schemas.openxmlformats.org/drawingml/2006/main" xmlns="" val="2702019936"/>
+        <p14:creationId xmlns="" xmlns:a="http://schemas.openxmlformats.org/drawingml/2006/main" xmlns:r="http://schemas.openxmlformats.org/officeDocument/2006/relationships" xmlns:p="http://schemas.openxmlformats.org/presentationml/2006/main" xmlns:p14="http://schemas.microsoft.com/office/powerpoint/2010/main" xmlns:mv="urn:schemas-microsoft-com:mac:vml" xmlns:mc="http://schemas.openxmlformats.org/markup-compatibility/2006" val="2702019936"/>
       </p:ext>
     </p:extLst>
   </p:cSld>
@@ -487,7 +488,7 @@
             <a:fld id="{6BFECD78-3C8E-49F2-8FAB-59489D168ABB}" type="datetimeFigureOut">
               <a:rPr lang="en-US" smtClean="0"/>
               <a:pPr/>
-              <a:t>11/29/14</a:t>
+              <a:t>11/30/14</a:t>
             </a:fld>
             <a:endParaRPr lang="en-US"/>
           </a:p>
@@ -539,7 +540,7 @@
     </p:spTree>
     <p:extLst>
       <p:ext uri="{BB962C8B-B14F-4D97-AF65-F5344CB8AC3E}">
-        <p14:creationId xmlns:p14="http://schemas.microsoft.com/office/powerpoint/2010/main" xmlns:p="http://schemas.openxmlformats.org/presentationml/2006/main" xmlns:r="http://schemas.openxmlformats.org/officeDocument/2006/relationships" xmlns:a="http://schemas.openxmlformats.org/drawingml/2006/main" xmlns="" val="2949498235"/>
+        <p14:creationId xmlns="" xmlns:a="http://schemas.openxmlformats.org/drawingml/2006/main" xmlns:r="http://schemas.openxmlformats.org/officeDocument/2006/relationships" xmlns:p="http://schemas.openxmlformats.org/presentationml/2006/main" xmlns:p14="http://schemas.microsoft.com/office/powerpoint/2010/main" xmlns:mv="urn:schemas-microsoft-com:mac:vml" xmlns:mc="http://schemas.openxmlformats.org/markup-compatibility/2006" val="2949498235"/>
       </p:ext>
     </p:extLst>
   </p:cSld>
@@ -669,7 +670,7 @@
             <a:fld id="{6BFECD78-3C8E-49F2-8FAB-59489D168ABB}" type="datetimeFigureOut">
               <a:rPr lang="en-US" smtClean="0"/>
               <a:pPr/>
-              <a:t>11/29/14</a:t>
+              <a:t>11/30/14</a:t>
             </a:fld>
             <a:endParaRPr lang="en-US"/>
           </a:p>
@@ -721,7 +722,7 @@
     </p:spTree>
     <p:extLst>
       <p:ext uri="{BB962C8B-B14F-4D97-AF65-F5344CB8AC3E}">
-        <p14:creationId xmlns:p14="http://schemas.microsoft.com/office/powerpoint/2010/main" xmlns:p="http://schemas.openxmlformats.org/presentationml/2006/main" xmlns:r="http://schemas.openxmlformats.org/officeDocument/2006/relationships" xmlns:a="http://schemas.openxmlformats.org/drawingml/2006/main" xmlns="" val="1427941222"/>
+        <p14:creationId xmlns="" xmlns:a="http://schemas.openxmlformats.org/drawingml/2006/main" xmlns:r="http://schemas.openxmlformats.org/officeDocument/2006/relationships" xmlns:p="http://schemas.openxmlformats.org/presentationml/2006/main" xmlns:p14="http://schemas.microsoft.com/office/powerpoint/2010/main" xmlns:mv="urn:schemas-microsoft-com:mac:vml" xmlns:mc="http://schemas.openxmlformats.org/markup-compatibility/2006" val="1427941222"/>
       </p:ext>
     </p:extLst>
   </p:cSld>
@@ -841,7 +842,7 @@
             <a:fld id="{6BFECD78-3C8E-49F2-8FAB-59489D168ABB}" type="datetimeFigureOut">
               <a:rPr lang="en-US" smtClean="0"/>
               <a:pPr/>
-              <a:t>11/29/14</a:t>
+              <a:t>11/30/14</a:t>
             </a:fld>
             <a:endParaRPr lang="en-US"/>
           </a:p>
@@ -893,7 +894,7 @@
     </p:spTree>
     <p:extLst>
       <p:ext uri="{BB962C8B-B14F-4D97-AF65-F5344CB8AC3E}">
-        <p14:creationId xmlns:p14="http://schemas.microsoft.com/office/powerpoint/2010/main" xmlns:p="http://schemas.openxmlformats.org/presentationml/2006/main" xmlns:r="http://schemas.openxmlformats.org/officeDocument/2006/relationships" xmlns:a="http://schemas.openxmlformats.org/drawingml/2006/main" xmlns="" val="2275933374"/>
+        <p14:creationId xmlns="" xmlns:a="http://schemas.openxmlformats.org/drawingml/2006/main" xmlns:r="http://schemas.openxmlformats.org/officeDocument/2006/relationships" xmlns:p="http://schemas.openxmlformats.org/presentationml/2006/main" xmlns:p14="http://schemas.microsoft.com/office/powerpoint/2010/main" xmlns:mv="urn:schemas-microsoft-com:mac:vml" xmlns:mc="http://schemas.openxmlformats.org/markup-compatibility/2006" val="2275933374"/>
       </p:ext>
     </p:extLst>
   </p:cSld>
@@ -1089,7 +1090,7 @@
             <a:fld id="{6BFECD78-3C8E-49F2-8FAB-59489D168ABB}" type="datetimeFigureOut">
               <a:rPr lang="en-US" smtClean="0"/>
               <a:pPr/>
-              <a:t>11/29/14</a:t>
+              <a:t>11/30/14</a:t>
             </a:fld>
             <a:endParaRPr lang="en-US"/>
           </a:p>
@@ -1141,7 +1142,7 @@
     </p:spTree>
     <p:extLst>
       <p:ext uri="{BB962C8B-B14F-4D97-AF65-F5344CB8AC3E}">
-        <p14:creationId xmlns:p14="http://schemas.microsoft.com/office/powerpoint/2010/main" xmlns:p="http://schemas.openxmlformats.org/presentationml/2006/main" xmlns:r="http://schemas.openxmlformats.org/officeDocument/2006/relationships" xmlns:a="http://schemas.openxmlformats.org/drawingml/2006/main" xmlns="" val="1798952600"/>
+        <p14:creationId xmlns="" xmlns:a="http://schemas.openxmlformats.org/drawingml/2006/main" xmlns:r="http://schemas.openxmlformats.org/officeDocument/2006/relationships" xmlns:p="http://schemas.openxmlformats.org/presentationml/2006/main" xmlns:p14="http://schemas.microsoft.com/office/powerpoint/2010/main" xmlns:mv="urn:schemas-microsoft-com:mac:vml" xmlns:mc="http://schemas.openxmlformats.org/markup-compatibility/2006" val="1798952600"/>
       </p:ext>
     </p:extLst>
   </p:cSld>
@@ -1379,7 +1380,7 @@
             <a:fld id="{6BFECD78-3C8E-49F2-8FAB-59489D168ABB}" type="datetimeFigureOut">
               <a:rPr lang="en-US" smtClean="0"/>
               <a:pPr/>
-              <a:t>11/29/14</a:t>
+              <a:t>11/30/14</a:t>
             </a:fld>
             <a:endParaRPr lang="en-US"/>
           </a:p>
@@ -1431,7 +1432,7 @@
     </p:spTree>
     <p:extLst>
       <p:ext uri="{BB962C8B-B14F-4D97-AF65-F5344CB8AC3E}">
-        <p14:creationId xmlns:p14="http://schemas.microsoft.com/office/powerpoint/2010/main" xmlns:p="http://schemas.openxmlformats.org/presentationml/2006/main" xmlns:r="http://schemas.openxmlformats.org/officeDocument/2006/relationships" xmlns:a="http://schemas.openxmlformats.org/drawingml/2006/main" xmlns="" val="1034301619"/>
+        <p14:creationId xmlns="" xmlns:a="http://schemas.openxmlformats.org/drawingml/2006/main" xmlns:r="http://schemas.openxmlformats.org/officeDocument/2006/relationships" xmlns:p="http://schemas.openxmlformats.org/presentationml/2006/main" xmlns:p14="http://schemas.microsoft.com/office/powerpoint/2010/main" xmlns:mv="urn:schemas-microsoft-com:mac:vml" xmlns:mc="http://schemas.openxmlformats.org/markup-compatibility/2006" val="1034301619"/>
       </p:ext>
     </p:extLst>
   </p:cSld>
@@ -1803,7 +1804,7 @@
             <a:fld id="{6BFECD78-3C8E-49F2-8FAB-59489D168ABB}" type="datetimeFigureOut">
               <a:rPr lang="en-US" smtClean="0"/>
               <a:pPr/>
-              <a:t>11/29/14</a:t>
+              <a:t>11/30/14</a:t>
             </a:fld>
             <a:endParaRPr lang="en-US"/>
           </a:p>
@@ -1855,7 +1856,7 @@
     </p:spTree>
     <p:extLst>
       <p:ext uri="{BB962C8B-B14F-4D97-AF65-F5344CB8AC3E}">
-        <p14:creationId xmlns:p14="http://schemas.microsoft.com/office/powerpoint/2010/main" xmlns:p="http://schemas.openxmlformats.org/presentationml/2006/main" xmlns:r="http://schemas.openxmlformats.org/officeDocument/2006/relationships" xmlns:a="http://schemas.openxmlformats.org/drawingml/2006/main" xmlns="" val="1417940929"/>
+        <p14:creationId xmlns="" xmlns:a="http://schemas.openxmlformats.org/drawingml/2006/main" xmlns:r="http://schemas.openxmlformats.org/officeDocument/2006/relationships" xmlns:p="http://schemas.openxmlformats.org/presentationml/2006/main" xmlns:p14="http://schemas.microsoft.com/office/powerpoint/2010/main" xmlns:mv="urn:schemas-microsoft-com:mac:vml" xmlns:mc="http://schemas.openxmlformats.org/markup-compatibility/2006" val="1417940929"/>
       </p:ext>
     </p:extLst>
   </p:cSld>
@@ -1923,7 +1924,7 @@
             <a:fld id="{6BFECD78-3C8E-49F2-8FAB-59489D168ABB}" type="datetimeFigureOut">
               <a:rPr lang="en-US" smtClean="0"/>
               <a:pPr/>
-              <a:t>11/29/14</a:t>
+              <a:t>11/30/14</a:t>
             </a:fld>
             <a:endParaRPr lang="en-US"/>
           </a:p>
@@ -1975,7 +1976,7 @@
     </p:spTree>
     <p:extLst>
       <p:ext uri="{BB962C8B-B14F-4D97-AF65-F5344CB8AC3E}">
-        <p14:creationId xmlns:p14="http://schemas.microsoft.com/office/powerpoint/2010/main" xmlns:p="http://schemas.openxmlformats.org/presentationml/2006/main" xmlns:r="http://schemas.openxmlformats.org/officeDocument/2006/relationships" xmlns:a="http://schemas.openxmlformats.org/drawingml/2006/main" xmlns="" val="656067729"/>
+        <p14:creationId xmlns="" xmlns:a="http://schemas.openxmlformats.org/drawingml/2006/main" xmlns:r="http://schemas.openxmlformats.org/officeDocument/2006/relationships" xmlns:p="http://schemas.openxmlformats.org/presentationml/2006/main" xmlns:p14="http://schemas.microsoft.com/office/powerpoint/2010/main" xmlns:mv="urn:schemas-microsoft-com:mac:vml" xmlns:mc="http://schemas.openxmlformats.org/markup-compatibility/2006" val="656067729"/>
       </p:ext>
     </p:extLst>
   </p:cSld>
@@ -2020,7 +2021,7 @@
             <a:fld id="{6BFECD78-3C8E-49F2-8FAB-59489D168ABB}" type="datetimeFigureOut">
               <a:rPr lang="en-US" smtClean="0"/>
               <a:pPr/>
-              <a:t>11/29/14</a:t>
+              <a:t>11/30/14</a:t>
             </a:fld>
             <a:endParaRPr lang="en-US"/>
           </a:p>
@@ -2072,7 +2073,7 @@
     </p:spTree>
     <p:extLst>
       <p:ext uri="{BB962C8B-B14F-4D97-AF65-F5344CB8AC3E}">
-        <p14:creationId xmlns:p14="http://schemas.microsoft.com/office/powerpoint/2010/main" xmlns:p="http://schemas.openxmlformats.org/presentationml/2006/main" xmlns:r="http://schemas.openxmlformats.org/officeDocument/2006/relationships" xmlns:a="http://schemas.openxmlformats.org/drawingml/2006/main" xmlns="" val="1249128790"/>
+        <p14:creationId xmlns="" xmlns:a="http://schemas.openxmlformats.org/drawingml/2006/main" xmlns:r="http://schemas.openxmlformats.org/officeDocument/2006/relationships" xmlns:p="http://schemas.openxmlformats.org/presentationml/2006/main" xmlns:p14="http://schemas.microsoft.com/office/powerpoint/2010/main" xmlns:mv="urn:schemas-microsoft-com:mac:vml" xmlns:mc="http://schemas.openxmlformats.org/markup-compatibility/2006" val="1249128790"/>
       </p:ext>
     </p:extLst>
   </p:cSld>
@@ -2299,7 +2300,7 @@
             <a:fld id="{6BFECD78-3C8E-49F2-8FAB-59489D168ABB}" type="datetimeFigureOut">
               <a:rPr lang="en-US" smtClean="0"/>
               <a:pPr/>
-              <a:t>11/29/14</a:t>
+              <a:t>11/30/14</a:t>
             </a:fld>
             <a:endParaRPr lang="en-US"/>
           </a:p>
@@ -2351,7 +2352,7 @@
     </p:spTree>
     <p:extLst>
       <p:ext uri="{BB962C8B-B14F-4D97-AF65-F5344CB8AC3E}">
-        <p14:creationId xmlns:p14="http://schemas.microsoft.com/office/powerpoint/2010/main" xmlns:p="http://schemas.openxmlformats.org/presentationml/2006/main" xmlns:r="http://schemas.openxmlformats.org/officeDocument/2006/relationships" xmlns:a="http://schemas.openxmlformats.org/drawingml/2006/main" xmlns="" val="2730116199"/>
+        <p14:creationId xmlns="" xmlns:a="http://schemas.openxmlformats.org/drawingml/2006/main" xmlns:r="http://schemas.openxmlformats.org/officeDocument/2006/relationships" xmlns:p="http://schemas.openxmlformats.org/presentationml/2006/main" xmlns:p14="http://schemas.microsoft.com/office/powerpoint/2010/main" xmlns:mv="urn:schemas-microsoft-com:mac:vml" xmlns:mc="http://schemas.openxmlformats.org/markup-compatibility/2006" val="2730116199"/>
       </p:ext>
     </p:extLst>
   </p:cSld>
@@ -2558,7 +2559,7 @@
             <a:fld id="{6BFECD78-3C8E-49F2-8FAB-59489D168ABB}" type="datetimeFigureOut">
               <a:rPr lang="en-US" smtClean="0"/>
               <a:pPr/>
-              <a:t>11/29/14</a:t>
+              <a:t>11/30/14</a:t>
             </a:fld>
             <a:endParaRPr lang="en-US"/>
           </a:p>
@@ -2610,7 +2611,7 @@
     </p:spTree>
     <p:extLst>
       <p:ext uri="{BB962C8B-B14F-4D97-AF65-F5344CB8AC3E}">
-        <p14:creationId xmlns:p14="http://schemas.microsoft.com/office/powerpoint/2010/main" xmlns:p="http://schemas.openxmlformats.org/presentationml/2006/main" xmlns:r="http://schemas.openxmlformats.org/officeDocument/2006/relationships" xmlns:a="http://schemas.openxmlformats.org/drawingml/2006/main" xmlns="" val="506574558"/>
+        <p14:creationId xmlns="" xmlns:a="http://schemas.openxmlformats.org/drawingml/2006/main" xmlns:r="http://schemas.openxmlformats.org/officeDocument/2006/relationships" xmlns:p="http://schemas.openxmlformats.org/presentationml/2006/main" xmlns:p14="http://schemas.microsoft.com/office/powerpoint/2010/main" xmlns:mv="urn:schemas-microsoft-com:mac:vml" xmlns:mc="http://schemas.openxmlformats.org/markup-compatibility/2006" val="506574558"/>
       </p:ext>
     </p:extLst>
   </p:cSld>
@@ -2778,7 +2779,7 @@
             <a:fld id="{6BFECD78-3C8E-49F2-8FAB-59489D168ABB}" type="datetimeFigureOut">
               <a:rPr lang="en-US" smtClean="0"/>
               <a:pPr/>
-              <a:t>11/29/14</a:t>
+              <a:t>11/30/14</a:t>
             </a:fld>
             <a:endParaRPr lang="en-US"/>
           </a:p>
@@ -2862,7 +2863,7 @@
     </p:spTree>
     <p:extLst>
       <p:ext uri="{BB962C8B-B14F-4D97-AF65-F5344CB8AC3E}">
-        <p14:creationId xmlns:p14="http://schemas.microsoft.com/office/powerpoint/2010/main" xmlns:p="http://schemas.openxmlformats.org/presentationml/2006/main" xmlns:r="http://schemas.openxmlformats.org/officeDocument/2006/relationships" xmlns:a="http://schemas.openxmlformats.org/drawingml/2006/main" xmlns="" val="2557711237"/>
+        <p14:creationId xmlns="" xmlns:a="http://schemas.openxmlformats.org/drawingml/2006/main" xmlns:r="http://schemas.openxmlformats.org/officeDocument/2006/relationships" xmlns:p="http://schemas.openxmlformats.org/presentationml/2006/main" xmlns:p14="http://schemas.microsoft.com/office/powerpoint/2010/main" xmlns:mv="urn:schemas-microsoft-com:mac:vml" xmlns:mc="http://schemas.openxmlformats.org/markup-compatibility/2006" val="2557711237"/>
       </p:ext>
     </p:extLst>
   </p:cSld>
@@ -3214,7 +3215,7 @@
     </p:spTree>
     <p:extLst>
       <p:ext uri="{BB962C8B-B14F-4D97-AF65-F5344CB8AC3E}">
-        <p14:creationId xmlns:p14="http://schemas.microsoft.com/office/powerpoint/2010/main" xmlns:p="http://schemas.openxmlformats.org/presentationml/2006/main" xmlns:r="http://schemas.openxmlformats.org/officeDocument/2006/relationships" xmlns:a="http://schemas.openxmlformats.org/drawingml/2006/main" xmlns="" val="1728261021"/>
+        <p14:creationId xmlns="" xmlns:a="http://schemas.openxmlformats.org/drawingml/2006/main" xmlns:r="http://schemas.openxmlformats.org/officeDocument/2006/relationships" xmlns:p="http://schemas.openxmlformats.org/presentationml/2006/main" xmlns:p14="http://schemas.microsoft.com/office/powerpoint/2010/main" xmlns:mv="urn:schemas-microsoft-com:mac:vml" xmlns:mc="http://schemas.openxmlformats.org/markup-compatibility/2006" val="1728261021"/>
       </p:ext>
     </p:extLst>
   </p:cSld>
@@ -3438,7 +3439,7 @@
           <a:blip r:embed="rId2">
             <a:extLst>
               <a:ext uri="{28A0092B-C50C-407E-A947-70E740481C1C}">
-                <a14:useLocalDpi xmlns:a14="http://schemas.microsoft.com/office/drawing/2010/main" xmlns:p="http://schemas.openxmlformats.org/presentationml/2006/main" xmlns:r="http://schemas.openxmlformats.org/officeDocument/2006/relationships" xmlns:a="http://schemas.openxmlformats.org/drawingml/2006/main" xmlns="" val="0"/>
+                <a14:useLocalDpi xmlns="" xmlns:a="http://schemas.openxmlformats.org/drawingml/2006/main" xmlns:r="http://schemas.openxmlformats.org/officeDocument/2006/relationships" xmlns:p="http://schemas.openxmlformats.org/presentationml/2006/main" xmlns:a14="http://schemas.microsoft.com/office/drawing/2010/main" xmlns:mv="urn:schemas-microsoft-com:mac:vml" xmlns:mc="http://schemas.openxmlformats.org/markup-compatibility/2006" val="0"/>
               </a:ext>
             </a:extLst>
           </a:blip>
@@ -3467,7 +3468,7 @@
           <a:blip r:embed="rId3">
             <a:extLst>
               <a:ext uri="{28A0092B-C50C-407E-A947-70E740481C1C}">
-                <a14:useLocalDpi xmlns:a14="http://schemas.microsoft.com/office/drawing/2010/main" xmlns:p="http://schemas.openxmlformats.org/presentationml/2006/main" xmlns:r="http://schemas.openxmlformats.org/officeDocument/2006/relationships" xmlns:a="http://schemas.openxmlformats.org/drawingml/2006/main" xmlns="" val="0"/>
+                <a14:useLocalDpi xmlns="" xmlns:a="http://schemas.openxmlformats.org/drawingml/2006/main" xmlns:r="http://schemas.openxmlformats.org/officeDocument/2006/relationships" xmlns:p="http://schemas.openxmlformats.org/presentationml/2006/main" xmlns:a14="http://schemas.microsoft.com/office/drawing/2010/main" xmlns:mv="urn:schemas-microsoft-com:mac:vml" xmlns:mc="http://schemas.openxmlformats.org/markup-compatibility/2006" val="0"/>
               </a:ext>
             </a:extLst>
           </a:blip>
@@ -3487,7 +3488,7 @@
     </p:spTree>
     <p:extLst>
       <p:ext uri="{BB962C8B-B14F-4D97-AF65-F5344CB8AC3E}">
-        <p14:creationId xmlns:p14="http://schemas.microsoft.com/office/powerpoint/2010/main" xmlns:p="http://schemas.openxmlformats.org/presentationml/2006/main" xmlns:r="http://schemas.openxmlformats.org/officeDocument/2006/relationships" xmlns:a="http://schemas.openxmlformats.org/drawingml/2006/main" xmlns="" val="3051097567"/>
+        <p14:creationId xmlns="" xmlns:a="http://schemas.openxmlformats.org/drawingml/2006/main" xmlns:r="http://schemas.openxmlformats.org/officeDocument/2006/relationships" xmlns:p="http://schemas.openxmlformats.org/presentationml/2006/main" xmlns:p14="http://schemas.microsoft.com/office/powerpoint/2010/main" xmlns:mv="urn:schemas-microsoft-com:mac:vml" xmlns:mc="http://schemas.openxmlformats.org/markup-compatibility/2006" val="3051097567"/>
       </p:ext>
     </p:extLst>
   </p:cSld>
@@ -4241,7 +4242,7 @@
           <a:blip r:embed="rId2" cstate="print">
             <a:extLst>
               <a:ext uri="{28A0092B-C50C-407E-A947-70E740481C1C}">
-                <a14:useLocalDpi xmlns:a14="http://schemas.microsoft.com/office/drawing/2010/main" xmlns:p="http://schemas.openxmlformats.org/presentationml/2006/main" xmlns:r="http://schemas.openxmlformats.org/officeDocument/2006/relationships" xmlns:a="http://schemas.openxmlformats.org/drawingml/2006/main" xmlns="" val="0"/>
+                <a14:useLocalDpi xmlns="" xmlns:a="http://schemas.openxmlformats.org/drawingml/2006/main" xmlns:r="http://schemas.openxmlformats.org/officeDocument/2006/relationships" xmlns:p="http://schemas.openxmlformats.org/presentationml/2006/main" xmlns:a14="http://schemas.microsoft.com/office/drawing/2010/main" xmlns:mv="urn:schemas-microsoft-com:mac:vml" xmlns:mc="http://schemas.openxmlformats.org/markup-compatibility/2006" val="0"/>
               </a:ext>
             </a:extLst>
           </a:blip>
@@ -4261,7 +4262,7 @@
     </p:spTree>
     <p:extLst>
       <p:ext uri="{BB962C8B-B14F-4D97-AF65-F5344CB8AC3E}">
-        <p14:creationId xmlns:p14="http://schemas.microsoft.com/office/powerpoint/2010/main" xmlns:p="http://schemas.openxmlformats.org/presentationml/2006/main" xmlns:r="http://schemas.openxmlformats.org/officeDocument/2006/relationships" xmlns:a="http://schemas.openxmlformats.org/drawingml/2006/main" xmlns="" val="3820048524"/>
+        <p14:creationId xmlns="" xmlns:a="http://schemas.openxmlformats.org/drawingml/2006/main" xmlns:r="http://schemas.openxmlformats.org/officeDocument/2006/relationships" xmlns:p="http://schemas.openxmlformats.org/presentationml/2006/main" xmlns:p14="http://schemas.microsoft.com/office/powerpoint/2010/main" xmlns:mv="urn:schemas-microsoft-com:mac:vml" xmlns:mc="http://schemas.openxmlformats.org/markup-compatibility/2006" val="3820048524"/>
       </p:ext>
     </p:extLst>
   </p:cSld>
@@ -4337,7 +4338,7 @@
           <a:blip r:embed="rId2">
             <a:extLst>
               <a:ext uri="{28A0092B-C50C-407E-A947-70E740481C1C}">
-                <a14:useLocalDpi xmlns:a14="http://schemas.microsoft.com/office/drawing/2010/main" xmlns:p="http://schemas.openxmlformats.org/presentationml/2006/main" xmlns:r="http://schemas.openxmlformats.org/officeDocument/2006/relationships" xmlns:a="http://schemas.openxmlformats.org/drawingml/2006/main" xmlns="" val="0"/>
+                <a14:useLocalDpi xmlns="" xmlns:a="http://schemas.openxmlformats.org/drawingml/2006/main" xmlns:r="http://schemas.openxmlformats.org/officeDocument/2006/relationships" xmlns:p="http://schemas.openxmlformats.org/presentationml/2006/main" xmlns:a14="http://schemas.microsoft.com/office/drawing/2010/main" xmlns:mv="urn:schemas-microsoft-com:mac:vml" xmlns:mc="http://schemas.openxmlformats.org/markup-compatibility/2006" val="0"/>
               </a:ext>
             </a:extLst>
           </a:blip>
@@ -4367,7 +4368,7 @@
           <a:blip r:embed="rId2">
             <a:extLst>
               <a:ext uri="{28A0092B-C50C-407E-A947-70E740481C1C}">
-                <a14:useLocalDpi xmlns:a14="http://schemas.microsoft.com/office/drawing/2010/main" xmlns:p="http://schemas.openxmlformats.org/presentationml/2006/main" xmlns:r="http://schemas.openxmlformats.org/officeDocument/2006/relationships" xmlns:a="http://schemas.openxmlformats.org/drawingml/2006/main" xmlns="" val="0"/>
+                <a14:useLocalDpi xmlns="" xmlns:a="http://schemas.openxmlformats.org/drawingml/2006/main" xmlns:r="http://schemas.openxmlformats.org/officeDocument/2006/relationships" xmlns:p="http://schemas.openxmlformats.org/presentationml/2006/main" xmlns:a14="http://schemas.microsoft.com/office/drawing/2010/main" xmlns:mv="urn:schemas-microsoft-com:mac:vml" xmlns:mc="http://schemas.openxmlformats.org/markup-compatibility/2006" val="0"/>
               </a:ext>
             </a:extLst>
           </a:blip>
@@ -4396,7 +4397,7 @@
           <a:blip r:embed="rId2">
             <a:extLst>
               <a:ext uri="{28A0092B-C50C-407E-A947-70E740481C1C}">
-                <a14:useLocalDpi xmlns:a14="http://schemas.microsoft.com/office/drawing/2010/main" xmlns:p="http://schemas.openxmlformats.org/presentationml/2006/main" xmlns:r="http://schemas.openxmlformats.org/officeDocument/2006/relationships" xmlns:a="http://schemas.openxmlformats.org/drawingml/2006/main" xmlns="" val="0"/>
+                <a14:useLocalDpi xmlns="" xmlns:a="http://schemas.openxmlformats.org/drawingml/2006/main" xmlns:r="http://schemas.openxmlformats.org/officeDocument/2006/relationships" xmlns:p="http://schemas.openxmlformats.org/presentationml/2006/main" xmlns:a14="http://schemas.microsoft.com/office/drawing/2010/main" xmlns:mv="urn:schemas-microsoft-com:mac:vml" xmlns:mc="http://schemas.openxmlformats.org/markup-compatibility/2006" val="0"/>
               </a:ext>
             </a:extLst>
           </a:blip>
@@ -4788,7 +4789,7 @@
     </p:spTree>
     <p:extLst>
       <p:ext uri="{BB962C8B-B14F-4D97-AF65-F5344CB8AC3E}">
-        <p14:creationId xmlns:p14="http://schemas.microsoft.com/office/powerpoint/2010/main" xmlns:p="http://schemas.openxmlformats.org/presentationml/2006/main" xmlns:r="http://schemas.openxmlformats.org/officeDocument/2006/relationships" xmlns:a="http://schemas.openxmlformats.org/drawingml/2006/main" xmlns="" val="4028300545"/>
+        <p14:creationId xmlns="" xmlns:a="http://schemas.openxmlformats.org/drawingml/2006/main" xmlns:r="http://schemas.openxmlformats.org/officeDocument/2006/relationships" xmlns:p="http://schemas.openxmlformats.org/presentationml/2006/main" xmlns:p14="http://schemas.microsoft.com/office/powerpoint/2010/main" xmlns:mv="urn:schemas-microsoft-com:mac:vml" xmlns:mc="http://schemas.openxmlformats.org/markup-compatibility/2006" val="4028300545"/>
       </p:ext>
     </p:extLst>
   </p:cSld>
@@ -5498,71 +5499,101 @@
           </a:xfrm>
         </p:spPr>
         <p:txBody>
-          <a:bodyPr/>
+          <a:bodyPr>
+            <a:normAutofit/>
+          </a:bodyPr>
           <a:lstStyle/>
           <a:p>
             <a:r>
-              <a:rPr lang="en-US" dirty="0" smtClean="0"/>
-              <a:t>Lost and Found (</a:t>
-            </a:r>
-            <a:r>
-              <a:rPr lang="en-US" smtClean="0"/>
-              <a:t>starting out):</a:t>
-            </a:r>
-            <a:endParaRPr lang="en-US" dirty="0" smtClean="0"/>
-          </a:p>
-          <a:p>
-            <a:endParaRPr lang="en-US" dirty="0" smtClean="0"/>
-          </a:p>
-          <a:p>
-            <a:r>
-              <a:rPr lang="en-US" dirty="0" smtClean="0"/>
-              <a:t>LDAP credential connections for </a:t>
-            </a:r>
-            <a:r>
-              <a:rPr lang="en-US" dirty="0" err="1" smtClean="0"/>
-              <a:t>Mizzou</a:t>
-            </a:r>
-            <a:r>
-              <a:rPr lang="en-US" dirty="0" smtClean="0"/>
-              <a:t> students and administrators</a:t>
-            </a:r>
-          </a:p>
-          <a:p>
-            <a:endParaRPr lang="en-US" dirty="0" smtClean="0"/>
-          </a:p>
-          <a:p>
-            <a:r>
-              <a:rPr lang="en-US" dirty="0" smtClean="0"/>
-              <a:t>Admin approval for item types (Picture???)</a:t>
-            </a:r>
-          </a:p>
-          <a:p>
-            <a:endParaRPr lang="en-US" dirty="0" smtClean="0"/>
-          </a:p>
-          <a:p>
-            <a:r>
-              <a:rPr lang="en-US" dirty="0" smtClean="0"/>
-              <a:t>Secure entry of information by users to keep from injection attacks and issues</a:t>
-            </a:r>
-          </a:p>
-          <a:p>
-            <a:endParaRPr lang="en-US" dirty="0" smtClean="0"/>
-          </a:p>
-          <a:p>
-            <a:r>
-              <a:rPr lang="en-US" dirty="0" smtClean="0"/>
-              <a:t>Tables are cross referenced, to keep all information most updated and current</a:t>
-            </a:r>
-          </a:p>
-          <a:p>
-            <a:endParaRPr lang="en-US" dirty="0" smtClean="0"/>
-          </a:p>
-          <a:p>
-            <a:r>
-              <a:rPr lang="en-US" dirty="0" smtClean="0"/>
-              <a:t>Sessions are passed to allow other parts of the website to access the same LDAP connection</a:t>
-            </a:r>
+              <a:rPr lang="en-US" sz="3600" b="1" dirty="0" smtClean="0"/>
+              <a:t>Lost and </a:t>
+            </a:r>
+            <a:r>
+              <a:rPr lang="en-US" sz="3600" b="1" dirty="0" smtClean="0"/>
+              <a:t>Found Module</a:t>
+            </a:r>
+            <a:br>
+              <a:rPr lang="en-US" sz="3600" b="1" dirty="0" smtClean="0"/>
+            </a:br>
+            <a:r>
+              <a:rPr lang="en-US" sz="3600" b="1" dirty="0" smtClean="0"/>
+              <a:t/>
+            </a:r>
+            <a:br>
+              <a:rPr lang="en-US" sz="3600" b="1" dirty="0" smtClean="0"/>
+            </a:br>
+            <a:endParaRPr lang="en-US" sz="2000" b="1" dirty="0" smtClean="0"/>
+          </a:p>
+          <a:p>
+            <a:r>
+              <a:rPr lang="en-US" sz="2000" dirty="0" smtClean="0"/>
+              <a:t>- Requested by the University</a:t>
+            </a:r>
+            <a:r>
+              <a:rPr lang="en-US" sz="2000" dirty="0" smtClean="0"/>
+              <a:t/>
+            </a:r>
+            <a:br>
+              <a:rPr lang="en-US" sz="2000" dirty="0" smtClean="0"/>
+            </a:br>
+            <a:endParaRPr lang="en-US" sz="2000" dirty="0" smtClean="0"/>
+          </a:p>
+          <a:p>
+            <a:r>
+              <a:rPr lang="en-US" sz="2000" dirty="0" smtClean="0"/>
+              <a:t>- LDAP </a:t>
+            </a:r>
+            <a:r>
+              <a:rPr lang="en-US" sz="2000" dirty="0" smtClean="0"/>
+              <a:t>credential </a:t>
+            </a:r>
+            <a:r>
+              <a:rPr lang="en-US" sz="2000" dirty="0" smtClean="0"/>
+              <a:t>connections</a:t>
+            </a:r>
+            <a:r>
+              <a:rPr lang="en-US" sz="2000" dirty="0" smtClean="0"/>
+              <a:t/>
+            </a:r>
+            <a:br>
+              <a:rPr lang="en-US" sz="2000" dirty="0" smtClean="0"/>
+            </a:br>
+            <a:r>
+              <a:rPr lang="en-US" sz="2000" dirty="0" smtClean="0"/>
+              <a:t/>
+            </a:r>
+            <a:br>
+              <a:rPr lang="en-US" sz="2000" dirty="0" smtClean="0"/>
+            </a:br>
+            <a:r>
+              <a:rPr lang="en-US" sz="2000" dirty="0" smtClean="0"/>
+              <a:t>- Secure field entry methods</a:t>
+            </a:r>
+            <a:br>
+              <a:rPr lang="en-US" sz="2000" dirty="0" smtClean="0"/>
+            </a:br>
+            <a:r>
+              <a:rPr lang="en-US" sz="2000" dirty="0" smtClean="0"/>
+              <a:t/>
+            </a:r>
+            <a:br>
+              <a:rPr lang="en-US" sz="2000" dirty="0" smtClean="0"/>
+            </a:br>
+            <a:r>
+              <a:rPr lang="en-US" sz="2000" dirty="0" smtClean="0"/>
+              <a:t>- Cross referenced tables for item id and status’</a:t>
+            </a:r>
+            <a:endParaRPr lang="en-US" sz="2000" dirty="0" smtClean="0"/>
+          </a:p>
+          <a:p>
+            <a:endParaRPr lang="en-US" sz="2000" dirty="0" smtClean="0"/>
+          </a:p>
+          <a:p>
+            <a:r>
+              <a:rPr lang="en-US" sz="2000" dirty="0" smtClean="0"/>
+              <a:t>- Item types became a challenge </a:t>
+            </a:r>
+            <a:endParaRPr lang="en-US" sz="2000" dirty="0" smtClean="0"/>
           </a:p>
         </p:txBody>
       </p:sp>
@@ -5571,6 +5602,700 @@
   <p:clrMapOvr>
     <a:masterClrMapping/>
   </p:clrMapOvr>
+  <p:transition>
+    <p:fade/>
+  </p:transition>
+  <p:timing>
+    <p:tnLst>
+      <p:par>
+        <p:cTn id="1" dur="indefinite" restart="never" nodeType="tmRoot">
+          <p:childTnLst>
+            <p:seq concurrent="1" nextAc="seek">
+              <p:cTn id="2" dur="indefinite" nodeType="mainSeq">
+                <p:childTnLst>
+                  <p:par>
+                    <p:cTn id="3" fill="hold">
+                      <p:stCondLst>
+                        <p:cond delay="indefinite"/>
+                      </p:stCondLst>
+                      <p:childTnLst>
+                        <p:par>
+                          <p:cTn id="4" fill="hold">
+                            <p:stCondLst>
+                              <p:cond delay="0"/>
+                            </p:stCondLst>
+                            <p:childTnLst>
+                              <p:par>
+                                <p:cTn id="5" presetID="1" presetClass="entr" presetSubtype="0" fill="hold" grpId="1" nodeType="clickEffect">
+                                  <p:stCondLst>
+                                    <p:cond delay="0"/>
+                                  </p:stCondLst>
+                                  <p:childTnLst>
+                                    <p:set>
+                                      <p:cBhvr>
+                                        <p:cTn id="6" dur="1" fill="hold">
+                                          <p:stCondLst>
+                                            <p:cond delay="0"/>
+                                          </p:stCondLst>
+                                        </p:cTn>
+                                        <p:tgtEl>
+                                          <p:spTgt spid="4">
+                                            <p:txEl>
+                                              <p:pRg st="0" end="0"/>
+                                            </p:txEl>
+                                          </p:spTgt>
+                                        </p:tgtEl>
+                                        <p:attrNameLst>
+                                          <p:attrName>style.visibility</p:attrName>
+                                        </p:attrNameLst>
+                                      </p:cBhvr>
+                                      <p:to>
+                                        <p:strVal val="visible"/>
+                                      </p:to>
+                                    </p:set>
+                                  </p:childTnLst>
+                                </p:cTn>
+                              </p:par>
+                            </p:childTnLst>
+                          </p:cTn>
+                        </p:par>
+                      </p:childTnLst>
+                    </p:cTn>
+                  </p:par>
+                  <p:par>
+                    <p:cTn id="7" fill="hold">
+                      <p:stCondLst>
+                        <p:cond delay="indefinite"/>
+                      </p:stCondLst>
+                      <p:childTnLst>
+                        <p:par>
+                          <p:cTn id="8" fill="hold">
+                            <p:stCondLst>
+                              <p:cond delay="0"/>
+                            </p:stCondLst>
+                            <p:childTnLst>
+                              <p:par>
+                                <p:cTn id="9" presetID="1" presetClass="entr" presetSubtype="0" fill="hold" grpId="2" nodeType="clickEffect">
+                                  <p:stCondLst>
+                                    <p:cond delay="0"/>
+                                  </p:stCondLst>
+                                  <p:childTnLst>
+                                    <p:set>
+                                      <p:cBhvr>
+                                        <p:cTn id="10" dur="1" fill="hold">
+                                          <p:stCondLst>
+                                            <p:cond delay="0"/>
+                                          </p:stCondLst>
+                                        </p:cTn>
+                                        <p:tgtEl>
+                                          <p:spTgt spid="4">
+                                            <p:txEl>
+                                              <p:pRg st="0" end="0"/>
+                                            </p:txEl>
+                                          </p:spTgt>
+                                        </p:tgtEl>
+                                        <p:attrNameLst>
+                                          <p:attrName>style.visibility</p:attrName>
+                                        </p:attrNameLst>
+                                      </p:cBhvr>
+                                      <p:to>
+                                        <p:strVal val="visible"/>
+                                      </p:to>
+                                    </p:set>
+                                  </p:childTnLst>
+                                </p:cTn>
+                              </p:par>
+                            </p:childTnLst>
+                          </p:cTn>
+                        </p:par>
+                      </p:childTnLst>
+                    </p:cTn>
+                  </p:par>
+                  <p:par>
+                    <p:cTn id="11" fill="hold">
+                      <p:stCondLst>
+                        <p:cond delay="indefinite"/>
+                      </p:stCondLst>
+                      <p:childTnLst>
+                        <p:par>
+                          <p:cTn id="12" fill="hold">
+                            <p:stCondLst>
+                              <p:cond delay="0"/>
+                            </p:stCondLst>
+                            <p:childTnLst>
+                              <p:par>
+                                <p:cTn id="13" presetID="1" presetClass="entr" presetSubtype="0" fill="hold" grpId="2" nodeType="clickEffect">
+                                  <p:stCondLst>
+                                    <p:cond delay="0"/>
+                                  </p:stCondLst>
+                                  <p:childTnLst>
+                                    <p:set>
+                                      <p:cBhvr>
+                                        <p:cTn id="14" dur="1" fill="hold">
+                                          <p:stCondLst>
+                                            <p:cond delay="0"/>
+                                          </p:stCondLst>
+                                        </p:cTn>
+                                        <p:tgtEl>
+                                          <p:spTgt spid="4">
+                                            <p:txEl>
+                                              <p:pRg st="1" end="1"/>
+                                            </p:txEl>
+                                          </p:spTgt>
+                                        </p:tgtEl>
+                                        <p:attrNameLst>
+                                          <p:attrName>style.visibility</p:attrName>
+                                        </p:attrNameLst>
+                                      </p:cBhvr>
+                                      <p:to>
+                                        <p:strVal val="visible"/>
+                                      </p:to>
+                                    </p:set>
+                                  </p:childTnLst>
+                                </p:cTn>
+                              </p:par>
+                            </p:childTnLst>
+                          </p:cTn>
+                        </p:par>
+                      </p:childTnLst>
+                    </p:cTn>
+                  </p:par>
+                  <p:par>
+                    <p:cTn id="15" fill="hold">
+                      <p:stCondLst>
+                        <p:cond delay="indefinite"/>
+                      </p:stCondLst>
+                      <p:childTnLst>
+                        <p:par>
+                          <p:cTn id="16" fill="hold">
+                            <p:stCondLst>
+                              <p:cond delay="0"/>
+                            </p:stCondLst>
+                            <p:childTnLst>
+                              <p:par>
+                                <p:cTn id="17" presetID="1" presetClass="entr" presetSubtype="0" fill="hold" grpId="2" nodeType="clickEffect">
+                                  <p:stCondLst>
+                                    <p:cond delay="0"/>
+                                  </p:stCondLst>
+                                  <p:childTnLst>
+                                    <p:set>
+                                      <p:cBhvr>
+                                        <p:cTn id="18" dur="1" fill="hold">
+                                          <p:stCondLst>
+                                            <p:cond delay="0"/>
+                                          </p:stCondLst>
+                                        </p:cTn>
+                                        <p:tgtEl>
+                                          <p:spTgt spid="4">
+                                            <p:txEl>
+                                              <p:pRg st="2" end="2"/>
+                                            </p:txEl>
+                                          </p:spTgt>
+                                        </p:tgtEl>
+                                        <p:attrNameLst>
+                                          <p:attrName>style.visibility</p:attrName>
+                                        </p:attrNameLst>
+                                      </p:cBhvr>
+                                      <p:to>
+                                        <p:strVal val="visible"/>
+                                      </p:to>
+                                    </p:set>
+                                  </p:childTnLst>
+                                </p:cTn>
+                              </p:par>
+                            </p:childTnLst>
+                          </p:cTn>
+                        </p:par>
+                      </p:childTnLst>
+                    </p:cTn>
+                  </p:par>
+                  <p:par>
+                    <p:cTn id="19" fill="hold">
+                      <p:stCondLst>
+                        <p:cond delay="indefinite"/>
+                      </p:stCondLst>
+                      <p:childTnLst>
+                        <p:par>
+                          <p:cTn id="20" fill="hold">
+                            <p:stCondLst>
+                              <p:cond delay="0"/>
+                            </p:stCondLst>
+                            <p:childTnLst>
+                              <p:par>
+                                <p:cTn id="21" presetID="1" presetClass="entr" presetSubtype="0" fill="hold" grpId="2" nodeType="clickEffect">
+                                  <p:stCondLst>
+                                    <p:cond delay="0"/>
+                                  </p:stCondLst>
+                                  <p:childTnLst>
+                                    <p:set>
+                                      <p:cBhvr>
+                                        <p:cTn id="22" dur="1" fill="hold">
+                                          <p:stCondLst>
+                                            <p:cond delay="0"/>
+                                          </p:stCondLst>
+                                        </p:cTn>
+                                        <p:tgtEl>
+                                          <p:spTgt spid="4">
+                                            <p:txEl>
+                                              <p:pRg st="4" end="4"/>
+                                            </p:txEl>
+                                          </p:spTgt>
+                                        </p:tgtEl>
+                                        <p:attrNameLst>
+                                          <p:attrName>style.visibility</p:attrName>
+                                        </p:attrNameLst>
+                                      </p:cBhvr>
+                                      <p:to>
+                                        <p:strVal val="visible"/>
+                                      </p:to>
+                                    </p:set>
+                                  </p:childTnLst>
+                                </p:cTn>
+                              </p:par>
+                            </p:childTnLst>
+                          </p:cTn>
+                        </p:par>
+                      </p:childTnLst>
+                    </p:cTn>
+                  </p:par>
+                </p:childTnLst>
+              </p:cTn>
+              <p:prevCondLst>
+                <p:cond evt="onPrev" delay="0">
+                  <p:tgtEl>
+                    <p:sldTgt/>
+                  </p:tgtEl>
+                </p:cond>
+              </p:prevCondLst>
+              <p:nextCondLst>
+                <p:cond evt="onNext" delay="0">
+                  <p:tgtEl>
+                    <p:sldTgt/>
+                  </p:tgtEl>
+                </p:cond>
+              </p:nextCondLst>
+            </p:seq>
+          </p:childTnLst>
+        </p:cTn>
+      </p:par>
+    </p:tnLst>
+    <p:bldLst>
+      <p:bldP spid="4" grpId="1" uiExpand="1" build="p"/>
+      <p:bldP spid="4" grpId="2" build="p"/>
+    </p:bldLst>
+  </p:timing>
+</p:sld>
+</file>
+
+<file path=ppt/slides/slide6.xml><?xml version="1.0" encoding="utf-8"?>
+<p:sld xmlns:a="http://schemas.openxmlformats.org/drawingml/2006/main" xmlns:r="http://schemas.openxmlformats.org/officeDocument/2006/relationships" xmlns:mc="http://schemas.openxmlformats.org/markup-compatibility/2006" xmlns:mv="urn:schemas-microsoft-com:mac:vml" xmlns:p="http://schemas.openxmlformats.org/presentationml/2006/main" mc:Ignorable="mv" mc:PreserveAttributes="mv:*">
+  <p:cSld>
+    <p:spTree>
+      <p:nvGrpSpPr>
+        <p:cNvPr id="1" name=""/>
+        <p:cNvGrpSpPr/>
+        <p:nvPr/>
+      </p:nvGrpSpPr>
+      <p:grpSpPr>
+        <a:xfrm>
+          <a:off x="0" y="0"/>
+          <a:ext cx="0" cy="0"/>
+          <a:chOff x="0" y="0"/>
+          <a:chExt cx="0" cy="0"/>
+        </a:xfrm>
+      </p:grpSpPr>
+      <p:sp>
+        <p:nvSpPr>
+          <p:cNvPr id="4" name="Text Placeholder 3"/>
+          <p:cNvSpPr>
+            <a:spLocks noGrp="1"/>
+          </p:cNvSpPr>
+          <p:nvPr>
+            <p:ph type="body" sz="half" idx="2"/>
+          </p:nvPr>
+        </p:nvSpPr>
+        <p:spPr>
+          <a:xfrm>
+            <a:off x="457202" y="1435102"/>
+            <a:ext cx="8497277" cy="4691063"/>
+          </a:xfrm>
+        </p:spPr>
+        <p:txBody>
+          <a:bodyPr>
+            <a:normAutofit/>
+          </a:bodyPr>
+          <a:lstStyle/>
+          <a:p>
+            <a:r>
+              <a:rPr lang="en-US" sz="3600" b="1" dirty="0" smtClean="0"/>
+              <a:t>Lost and </a:t>
+            </a:r>
+            <a:r>
+              <a:rPr lang="en-US" sz="3600" b="1" dirty="0" smtClean="0"/>
+              <a:t>Found Module</a:t>
+            </a:r>
+            <a:br>
+              <a:rPr lang="en-US" sz="3600" b="1" dirty="0" smtClean="0"/>
+            </a:br>
+            <a:endParaRPr lang="en-US" sz="3600" b="1" dirty="0" smtClean="0"/>
+          </a:p>
+          <a:p>
+            <a:r>
+              <a:rPr lang="en-US" sz="2000" dirty="0" smtClean="0"/>
+              <a:t>Lost Item </a:t>
+            </a:r>
+            <a:r>
+              <a:rPr lang="en-US" sz="2000" dirty="0" smtClean="0"/>
+              <a:t>T</a:t>
+            </a:r>
+            <a:r>
+              <a:rPr lang="en-US" sz="2000" dirty="0" smtClean="0"/>
+              <a:t>ypes </a:t>
+            </a:r>
+          </a:p>
+          <a:p>
+            <a:pPr lvl="1">
+              <a:buFontTx/>
+              <a:buChar char="-"/>
+            </a:pPr>
+            <a:r>
+              <a:rPr lang="en-US" sz="2000" dirty="0" smtClean="0"/>
+              <a:t> Common types (Phone, Laptop, Jacket)</a:t>
+            </a:r>
+          </a:p>
+          <a:p>
+            <a:pPr lvl="1">
+              <a:buFontTx/>
+              <a:buChar char="-"/>
+            </a:pPr>
+            <a:r>
+              <a:rPr lang="en-US" sz="2000" dirty="0" smtClean="0"/>
+              <a:t> Uncommon (Food, Wife)</a:t>
+            </a:r>
+          </a:p>
+          <a:p>
+            <a:pPr lvl="2">
+              <a:buFontTx/>
+              <a:buChar char="-"/>
+            </a:pPr>
+            <a:r>
+              <a:rPr lang="en-US" sz="2000" dirty="0" smtClean="0"/>
+              <a:t> Option for new types</a:t>
+            </a:r>
+          </a:p>
+          <a:p>
+            <a:pPr lvl="2">
+              <a:buFontTx/>
+              <a:buChar char="-"/>
+            </a:pPr>
+            <a:r>
+              <a:rPr lang="en-US" sz="2000" dirty="0" smtClean="0"/>
+              <a:t> Admin Approval</a:t>
+            </a:r>
+          </a:p>
+          <a:p>
+            <a:pPr lvl="2">
+              <a:buFontTx/>
+              <a:buChar char="-"/>
+            </a:pPr>
+            <a:r>
+              <a:rPr lang="en-US" sz="2000" dirty="0" smtClean="0"/>
+              <a:t> Admin interface</a:t>
+            </a:r>
+          </a:p>
+        </p:txBody>
+      </p:sp>
+    </p:spTree>
+  </p:cSld>
+  <p:clrMapOvr>
+    <a:masterClrMapping/>
+  </p:clrMapOvr>
+  <p:timing>
+    <p:tnLst>
+      <p:par>
+        <p:cTn id="1" dur="indefinite" restart="never" nodeType="tmRoot">
+          <p:childTnLst>
+            <p:seq concurrent="1" nextAc="seek">
+              <p:cTn id="2" dur="indefinite" nodeType="mainSeq">
+                <p:childTnLst>
+                  <p:par>
+                    <p:cTn id="3" fill="hold">
+                      <p:stCondLst>
+                        <p:cond delay="indefinite"/>
+                      </p:stCondLst>
+                      <p:childTnLst>
+                        <p:par>
+                          <p:cTn id="4" fill="hold">
+                            <p:stCondLst>
+                              <p:cond delay="0"/>
+                            </p:stCondLst>
+                            <p:childTnLst>
+                              <p:par>
+                                <p:cTn id="5" presetID="1" presetClass="entr" presetSubtype="0" fill="hold" grpId="0" nodeType="clickEffect">
+                                  <p:stCondLst>
+                                    <p:cond delay="0"/>
+                                  </p:stCondLst>
+                                  <p:childTnLst>
+                                    <p:set>
+                                      <p:cBhvr>
+                                        <p:cTn id="6" dur="1" fill="hold">
+                                          <p:stCondLst>
+                                            <p:cond delay="0"/>
+                                          </p:stCondLst>
+                                        </p:cTn>
+                                        <p:tgtEl>
+                                          <p:spTgt spid="4">
+                                            <p:txEl>
+                                              <p:pRg st="0" end="0"/>
+                                            </p:txEl>
+                                          </p:spTgt>
+                                        </p:tgtEl>
+                                        <p:attrNameLst>
+                                          <p:attrName>style.visibility</p:attrName>
+                                        </p:attrNameLst>
+                                      </p:cBhvr>
+                                      <p:to>
+                                        <p:strVal val="visible"/>
+                                      </p:to>
+                                    </p:set>
+                                  </p:childTnLst>
+                                </p:cTn>
+                              </p:par>
+                            </p:childTnLst>
+                          </p:cTn>
+                        </p:par>
+                      </p:childTnLst>
+                    </p:cTn>
+                  </p:par>
+                  <p:par>
+                    <p:cTn id="7" fill="hold">
+                      <p:stCondLst>
+                        <p:cond delay="indefinite"/>
+                      </p:stCondLst>
+                      <p:childTnLst>
+                        <p:par>
+                          <p:cTn id="8" fill="hold">
+                            <p:stCondLst>
+                              <p:cond delay="0"/>
+                            </p:stCondLst>
+                            <p:childTnLst>
+                              <p:par>
+                                <p:cTn id="9" presetID="1" presetClass="entr" presetSubtype="0" fill="hold" grpId="0" nodeType="clickEffect">
+                                  <p:stCondLst>
+                                    <p:cond delay="0"/>
+                                  </p:stCondLst>
+                                  <p:childTnLst>
+                                    <p:set>
+                                      <p:cBhvr>
+                                        <p:cTn id="10" dur="1" fill="hold">
+                                          <p:stCondLst>
+                                            <p:cond delay="0"/>
+                                          </p:stCondLst>
+                                        </p:cTn>
+                                        <p:tgtEl>
+                                          <p:spTgt spid="4">
+                                            <p:txEl>
+                                              <p:pRg st="1" end="1"/>
+                                            </p:txEl>
+                                          </p:spTgt>
+                                        </p:tgtEl>
+                                        <p:attrNameLst>
+                                          <p:attrName>style.visibility</p:attrName>
+                                        </p:attrNameLst>
+                                      </p:cBhvr>
+                                      <p:to>
+                                        <p:strVal val="visible"/>
+                                      </p:to>
+                                    </p:set>
+                                  </p:childTnLst>
+                                </p:cTn>
+                              </p:par>
+                              <p:par>
+                                <p:cTn id="11" presetID="1" presetClass="entr" presetSubtype="0" fill="hold" grpId="0" nodeType="withEffect">
+                                  <p:stCondLst>
+                                    <p:cond delay="0"/>
+                                  </p:stCondLst>
+                                  <p:childTnLst>
+                                    <p:set>
+                                      <p:cBhvr>
+                                        <p:cTn id="12" dur="1" fill="hold">
+                                          <p:stCondLst>
+                                            <p:cond delay="0"/>
+                                          </p:stCondLst>
+                                        </p:cTn>
+                                        <p:tgtEl>
+                                          <p:spTgt spid="4">
+                                            <p:txEl>
+                                              <p:pRg st="2" end="2"/>
+                                            </p:txEl>
+                                          </p:spTgt>
+                                        </p:tgtEl>
+                                        <p:attrNameLst>
+                                          <p:attrName>style.visibility</p:attrName>
+                                        </p:attrNameLst>
+                                      </p:cBhvr>
+                                      <p:to>
+                                        <p:strVal val="visible"/>
+                                      </p:to>
+                                    </p:set>
+                                  </p:childTnLst>
+                                </p:cTn>
+                              </p:par>
+                              <p:par>
+                                <p:cTn id="13" presetID="1" presetClass="entr" presetSubtype="0" fill="hold" grpId="0" nodeType="withEffect">
+                                  <p:stCondLst>
+                                    <p:cond delay="0"/>
+                                  </p:stCondLst>
+                                  <p:childTnLst>
+                                    <p:set>
+                                      <p:cBhvr>
+                                        <p:cTn id="14" dur="1" fill="hold">
+                                          <p:stCondLst>
+                                            <p:cond delay="0"/>
+                                          </p:stCondLst>
+                                        </p:cTn>
+                                        <p:tgtEl>
+                                          <p:spTgt spid="4">
+                                            <p:txEl>
+                                              <p:pRg st="3" end="3"/>
+                                            </p:txEl>
+                                          </p:spTgt>
+                                        </p:tgtEl>
+                                        <p:attrNameLst>
+                                          <p:attrName>style.visibility</p:attrName>
+                                        </p:attrNameLst>
+                                      </p:cBhvr>
+                                      <p:to>
+                                        <p:strVal val="visible"/>
+                                      </p:to>
+                                    </p:set>
+                                  </p:childTnLst>
+                                </p:cTn>
+                              </p:par>
+                              <p:par>
+                                <p:cTn id="15" presetID="1" presetClass="entr" presetSubtype="0" fill="hold" grpId="0" nodeType="withEffect">
+                                  <p:stCondLst>
+                                    <p:cond delay="0"/>
+                                  </p:stCondLst>
+                                  <p:childTnLst>
+                                    <p:set>
+                                      <p:cBhvr>
+                                        <p:cTn id="16" dur="1" fill="hold">
+                                          <p:stCondLst>
+                                            <p:cond delay="0"/>
+                                          </p:stCondLst>
+                                        </p:cTn>
+                                        <p:tgtEl>
+                                          <p:spTgt spid="4">
+                                            <p:txEl>
+                                              <p:pRg st="4" end="4"/>
+                                            </p:txEl>
+                                          </p:spTgt>
+                                        </p:tgtEl>
+                                        <p:attrNameLst>
+                                          <p:attrName>style.visibility</p:attrName>
+                                        </p:attrNameLst>
+                                      </p:cBhvr>
+                                      <p:to>
+                                        <p:strVal val="visible"/>
+                                      </p:to>
+                                    </p:set>
+                                  </p:childTnLst>
+                                </p:cTn>
+                              </p:par>
+                              <p:par>
+                                <p:cTn id="17" presetID="1" presetClass="entr" presetSubtype="0" fill="hold" grpId="0" nodeType="withEffect">
+                                  <p:stCondLst>
+                                    <p:cond delay="0"/>
+                                  </p:stCondLst>
+                                  <p:childTnLst>
+                                    <p:set>
+                                      <p:cBhvr>
+                                        <p:cTn id="18" dur="1" fill="hold">
+                                          <p:stCondLst>
+                                            <p:cond delay="0"/>
+                                          </p:stCondLst>
+                                        </p:cTn>
+                                        <p:tgtEl>
+                                          <p:spTgt spid="4">
+                                            <p:txEl>
+                                              <p:pRg st="5" end="5"/>
+                                            </p:txEl>
+                                          </p:spTgt>
+                                        </p:tgtEl>
+                                        <p:attrNameLst>
+                                          <p:attrName>style.visibility</p:attrName>
+                                        </p:attrNameLst>
+                                      </p:cBhvr>
+                                      <p:to>
+                                        <p:strVal val="visible"/>
+                                      </p:to>
+                                    </p:set>
+                                  </p:childTnLst>
+                                </p:cTn>
+                              </p:par>
+                              <p:par>
+                                <p:cTn id="19" presetID="1" presetClass="entr" presetSubtype="0" fill="hold" grpId="0" nodeType="withEffect">
+                                  <p:stCondLst>
+                                    <p:cond delay="0"/>
+                                  </p:stCondLst>
+                                  <p:childTnLst>
+                                    <p:set>
+                                      <p:cBhvr>
+                                        <p:cTn id="20" dur="1" fill="hold">
+                                          <p:stCondLst>
+                                            <p:cond delay="0"/>
+                                          </p:stCondLst>
+                                        </p:cTn>
+                                        <p:tgtEl>
+                                          <p:spTgt spid="4">
+                                            <p:txEl>
+                                              <p:pRg st="6" end="6"/>
+                                            </p:txEl>
+                                          </p:spTgt>
+                                        </p:tgtEl>
+                                        <p:attrNameLst>
+                                          <p:attrName>style.visibility</p:attrName>
+                                        </p:attrNameLst>
+                                      </p:cBhvr>
+                                      <p:to>
+                                        <p:strVal val="visible"/>
+                                      </p:to>
+                                    </p:set>
+                                  </p:childTnLst>
+                                </p:cTn>
+                              </p:par>
+                            </p:childTnLst>
+                          </p:cTn>
+                        </p:par>
+                      </p:childTnLst>
+                    </p:cTn>
+                  </p:par>
+                </p:childTnLst>
+              </p:cTn>
+              <p:prevCondLst>
+                <p:cond evt="onPrev" delay="0">
+                  <p:tgtEl>
+                    <p:sldTgt/>
+                  </p:tgtEl>
+                </p:cond>
+              </p:prevCondLst>
+              <p:nextCondLst>
+                <p:cond evt="onNext" delay="0">
+                  <p:tgtEl>
+                    <p:sldTgt/>
+                  </p:tgtEl>
+                </p:cond>
+              </p:nextCondLst>
+            </p:seq>
+          </p:childTnLst>
+        </p:cTn>
+      </p:par>
+    </p:tnLst>
+    <p:bldLst>
+      <p:bldP spid="4" grpId="0" build="p"/>
+    </p:bldLst>
+  </p:timing>
 </p:sld>
 </file>
 

</xml_diff>

<commit_message>
Added erd file and added technologies slide to presentation.
</commit_message>
<xml_diff>
--- a/babbage/powerpoint/Group18 Presentation.pptx
+++ b/babbage/powerpoint/Group18 Presentation.pptx
@@ -6,9 +6,10 @@
   </p:sldMasterIdLst>
   <p:sldIdLst>
     <p:sldId id="256" r:id="rId2"/>
-    <p:sldId id="259" r:id="rId3"/>
-    <p:sldId id="257" r:id="rId4"/>
-    <p:sldId id="258" r:id="rId5"/>
+    <p:sldId id="260" r:id="rId3"/>
+    <p:sldId id="259" r:id="rId4"/>
+    <p:sldId id="257" r:id="rId5"/>
+    <p:sldId id="258" r:id="rId6"/>
   </p:sldIdLst>
   <p:sldSz cx="9144000" cy="6858000" type="screen4x3"/>
   <p:notesSz cx="6858000" cy="9144000"/>
@@ -115,6 +116,11 @@
             <p14:sldId id="256"/>
           </p14:sldIdLst>
         </p14:section>
+        <p14:section name="Technologies" id="{2E34024E-3150-954F-AEC8-F72BA0715EB9}">
+          <p14:sldIdLst>
+            <p14:sldId id="260"/>
+          </p14:sldIdLst>
+        </p14:section>
         <p14:section name="CSS/Menu" id="{B7D230E2-ED78-C74A-A978-20BA6CB7001B}">
           <p14:sldIdLst>
             <p14:sldId id="259"/>
@@ -313,7 +319,7 @@
           <a:p>
             <a:fld id="{6BFECD78-3C8E-49F2-8FAB-59489D168ABB}" type="datetimeFigureOut">
               <a:rPr lang="en-US" smtClean="0"/>
-              <a:t>11/24/14</a:t>
+              <a:t>11/30/14</a:t>
             </a:fld>
             <a:endParaRPr lang="en-US"/>
           </a:p>
@@ -483,7 +489,7 @@
           <a:p>
             <a:fld id="{6BFECD78-3C8E-49F2-8FAB-59489D168ABB}" type="datetimeFigureOut">
               <a:rPr lang="en-US" smtClean="0"/>
-              <a:t>11/24/14</a:t>
+              <a:t>11/30/14</a:t>
             </a:fld>
             <a:endParaRPr lang="en-US"/>
           </a:p>
@@ -663,7 +669,7 @@
           <a:p>
             <a:fld id="{6BFECD78-3C8E-49F2-8FAB-59489D168ABB}" type="datetimeFigureOut">
               <a:rPr lang="en-US" smtClean="0"/>
-              <a:t>11/24/14</a:t>
+              <a:t>11/30/14</a:t>
             </a:fld>
             <a:endParaRPr lang="en-US"/>
           </a:p>
@@ -833,7 +839,7 @@
           <a:p>
             <a:fld id="{6BFECD78-3C8E-49F2-8FAB-59489D168ABB}" type="datetimeFigureOut">
               <a:rPr lang="en-US" smtClean="0"/>
-              <a:t>11/24/14</a:t>
+              <a:t>11/30/14</a:t>
             </a:fld>
             <a:endParaRPr lang="en-US"/>
           </a:p>
@@ -1079,7 +1085,7 @@
           <a:p>
             <a:fld id="{6BFECD78-3C8E-49F2-8FAB-59489D168ABB}" type="datetimeFigureOut">
               <a:rPr lang="en-US" smtClean="0"/>
-              <a:t>11/24/14</a:t>
+              <a:t>11/30/14</a:t>
             </a:fld>
             <a:endParaRPr lang="en-US"/>
           </a:p>
@@ -1367,7 +1373,7 @@
           <a:p>
             <a:fld id="{6BFECD78-3C8E-49F2-8FAB-59489D168ABB}" type="datetimeFigureOut">
               <a:rPr lang="en-US" smtClean="0"/>
-              <a:t>11/24/14</a:t>
+              <a:t>11/30/14</a:t>
             </a:fld>
             <a:endParaRPr lang="en-US"/>
           </a:p>
@@ -1789,7 +1795,7 @@
           <a:p>
             <a:fld id="{6BFECD78-3C8E-49F2-8FAB-59489D168ABB}" type="datetimeFigureOut">
               <a:rPr lang="en-US" smtClean="0"/>
-              <a:t>11/24/14</a:t>
+              <a:t>11/30/14</a:t>
             </a:fld>
             <a:endParaRPr lang="en-US"/>
           </a:p>
@@ -1907,7 +1913,7 @@
           <a:p>
             <a:fld id="{6BFECD78-3C8E-49F2-8FAB-59489D168ABB}" type="datetimeFigureOut">
               <a:rPr lang="en-US" smtClean="0"/>
-              <a:t>11/24/14</a:t>
+              <a:t>11/30/14</a:t>
             </a:fld>
             <a:endParaRPr lang="en-US"/>
           </a:p>
@@ -2002,7 +2008,7 @@
           <a:p>
             <a:fld id="{6BFECD78-3C8E-49F2-8FAB-59489D168ABB}" type="datetimeFigureOut">
               <a:rPr lang="en-US" smtClean="0"/>
-              <a:t>11/24/14</a:t>
+              <a:t>11/30/14</a:t>
             </a:fld>
             <a:endParaRPr lang="en-US"/>
           </a:p>
@@ -2279,7 +2285,7 @@
           <a:p>
             <a:fld id="{6BFECD78-3C8E-49F2-8FAB-59489D168ABB}" type="datetimeFigureOut">
               <a:rPr lang="en-US" smtClean="0"/>
-              <a:t>11/24/14</a:t>
+              <a:t>11/30/14</a:t>
             </a:fld>
             <a:endParaRPr lang="en-US"/>
           </a:p>
@@ -2536,7 +2542,7 @@
           <a:p>
             <a:fld id="{6BFECD78-3C8E-49F2-8FAB-59489D168ABB}" type="datetimeFigureOut">
               <a:rPr lang="en-US" smtClean="0"/>
-              <a:t>11/24/14</a:t>
+              <a:t>11/30/14</a:t>
             </a:fld>
             <a:endParaRPr lang="en-US"/>
           </a:p>
@@ -2652,10 +2658,10 @@
           <a:lstStyle/>
           <a:p>
             <a:r>
-              <a:rPr lang="en-US" smtClean="0"/>
+              <a:rPr lang="en-US" dirty="0" smtClean="0"/>
               <a:t>Click to edit Master title style</a:t>
             </a:r>
-            <a:endParaRPr lang="en-US"/>
+            <a:endParaRPr lang="en-US" dirty="0"/>
           </a:p>
         </p:txBody>
       </p:sp>
@@ -2755,7 +2761,7 @@
             <a:fld id="{6BFECD78-3C8E-49F2-8FAB-59489D168ABB}" type="datetimeFigureOut">
               <a:rPr lang="en-US" smtClean="0"/>
               <a:pPr/>
-              <a:t>11/24/14</a:t>
+              <a:t>11/30/14</a:t>
             </a:fld>
             <a:endParaRPr lang="en-US"/>
           </a:p>
@@ -3209,6 +3215,201 @@
 </file>
 
 <file path=ppt/slides/slide2.xml><?xml version="1.0" encoding="utf-8"?>
+<p:sld xmlns:a="http://schemas.openxmlformats.org/drawingml/2006/main" xmlns:r="http://schemas.openxmlformats.org/officeDocument/2006/relationships" xmlns:p="http://schemas.openxmlformats.org/presentationml/2006/main">
+  <p:cSld>
+    <p:spTree>
+      <p:nvGrpSpPr>
+        <p:cNvPr id="1" name=""/>
+        <p:cNvGrpSpPr/>
+        <p:nvPr/>
+      </p:nvGrpSpPr>
+      <p:grpSpPr>
+        <a:xfrm>
+          <a:off x="0" y="0"/>
+          <a:ext cx="0" cy="0"/>
+          <a:chOff x="0" y="0"/>
+          <a:chExt cx="0" cy="0"/>
+        </a:xfrm>
+      </p:grpSpPr>
+      <p:sp>
+        <p:nvSpPr>
+          <p:cNvPr id="2" name="Title 1"/>
+          <p:cNvSpPr>
+            <a:spLocks noGrp="1"/>
+          </p:cNvSpPr>
+          <p:nvPr>
+            <p:ph type="title"/>
+          </p:nvPr>
+        </p:nvSpPr>
+        <p:spPr>
+          <a:xfrm>
+            <a:off x="457200" y="1395059"/>
+            <a:ext cx="8229600" cy="765098"/>
+          </a:xfrm>
+        </p:spPr>
+        <p:txBody>
+          <a:bodyPr/>
+          <a:lstStyle/>
+          <a:p>
+            <a:r>
+              <a:rPr lang="en-US" dirty="0" smtClean="0"/>
+              <a:t>Technologies</a:t>
+            </a:r>
+            <a:endParaRPr lang="en-US" dirty="0"/>
+          </a:p>
+        </p:txBody>
+      </p:sp>
+      <p:sp>
+        <p:nvSpPr>
+          <p:cNvPr id="3" name="Content Placeholder 2"/>
+          <p:cNvSpPr>
+            <a:spLocks noGrp="1"/>
+          </p:cNvSpPr>
+          <p:nvPr>
+            <p:ph idx="1"/>
+          </p:nvPr>
+        </p:nvSpPr>
+        <p:spPr>
+          <a:xfrm>
+            <a:off x="457200" y="2297671"/>
+            <a:ext cx="8229600" cy="4192286"/>
+          </a:xfrm>
+        </p:spPr>
+        <p:txBody>
+          <a:bodyPr>
+            <a:normAutofit/>
+          </a:bodyPr>
+          <a:lstStyle/>
+          <a:p>
+            <a:r>
+              <a:rPr lang="en-US" b="1" dirty="0" smtClean="0"/>
+              <a:t>Languages Used: </a:t>
+            </a:r>
+            <a:r>
+              <a:rPr lang="en-US" dirty="0" smtClean="0"/>
+              <a:t>PHP 5.5.6, </a:t>
+            </a:r>
+            <a:r>
+              <a:rPr lang="en-US" dirty="0" err="1" smtClean="0"/>
+              <a:t>jQuery</a:t>
+            </a:r>
+            <a:r>
+              <a:rPr lang="en-US" dirty="0" smtClean="0"/>
+              <a:t>, </a:t>
+            </a:r>
+            <a:r>
+              <a:rPr lang="en-US" dirty="0" err="1" smtClean="0"/>
+              <a:t>jQuery</a:t>
+            </a:r>
+            <a:r>
+              <a:rPr lang="en-US" dirty="0" smtClean="0"/>
+              <a:t> UI, Twitter </a:t>
+            </a:r>
+            <a:r>
+              <a:rPr lang="en-US" smtClean="0"/>
+              <a:t>Bootstrap, SOAP</a:t>
+            </a:r>
+            <a:r>
+              <a:rPr lang="en-US" dirty="0" smtClean="0"/>
+              <a:t>/XML</a:t>
+            </a:r>
+          </a:p>
+          <a:p>
+            <a:r>
+              <a:rPr lang="en-US" b="1" dirty="0" smtClean="0"/>
+              <a:t>Databases: </a:t>
+            </a:r>
+            <a:r>
+              <a:rPr lang="en-US" dirty="0" err="1" smtClean="0"/>
+              <a:t>PostgreSQL</a:t>
+            </a:r>
+            <a:r>
+              <a:rPr lang="en-US" dirty="0" smtClean="0"/>
+              <a:t> and SQL Server</a:t>
+            </a:r>
+          </a:p>
+          <a:p>
+            <a:r>
+              <a:rPr lang="en-US" b="1" dirty="0" smtClean="0"/>
+              <a:t>Version Control: </a:t>
+            </a:r>
+            <a:r>
+              <a:rPr lang="en-US" dirty="0" smtClean="0"/>
+              <a:t>GIT on </a:t>
+            </a:r>
+            <a:r>
+              <a:rPr lang="en-US" dirty="0" err="1" smtClean="0"/>
+              <a:t>Github</a:t>
+            </a:r>
+            <a:endParaRPr lang="en-US" dirty="0" smtClean="0"/>
+          </a:p>
+          <a:p>
+            <a:r>
+              <a:rPr lang="en-US" b="1" dirty="0" smtClean="0"/>
+              <a:t>Framework: </a:t>
+            </a:r>
+            <a:r>
+              <a:rPr lang="en-US" dirty="0" err="1" smtClean="0"/>
+              <a:t>Yii</a:t>
+            </a:r>
+            <a:r>
+              <a:rPr lang="en-US" dirty="0"/>
+              <a:t> </a:t>
+            </a:r>
+            <a:r>
+              <a:rPr lang="en-US" dirty="0" smtClean="0"/>
+              <a:t>1.1 (MVC)</a:t>
+            </a:r>
+          </a:p>
+          <a:p>
+            <a:r>
+              <a:rPr lang="en-US" b="1" dirty="0" smtClean="0"/>
+              <a:t>Web Server: </a:t>
+            </a:r>
+            <a:r>
+              <a:rPr lang="en-US" dirty="0" smtClean="0"/>
+              <a:t>Apache</a:t>
+            </a:r>
+          </a:p>
+          <a:p>
+            <a:r>
+              <a:rPr lang="en-US" b="1" dirty="0" smtClean="0"/>
+              <a:t>Tools: </a:t>
+            </a:r>
+            <a:r>
+              <a:rPr lang="en-US" dirty="0" err="1" smtClean="0"/>
+              <a:t>PhpStorm</a:t>
+            </a:r>
+            <a:r>
+              <a:rPr lang="en-US" dirty="0" smtClean="0"/>
+              <a:t>, </a:t>
+            </a:r>
+            <a:r>
+              <a:rPr lang="en-US" dirty="0" err="1" smtClean="0"/>
+              <a:t>SourceTree</a:t>
+            </a:r>
+            <a:r>
+              <a:rPr lang="en-US" dirty="0" smtClean="0"/>
+              <a:t>, pgAdmin3</a:t>
+            </a:r>
+            <a:endParaRPr lang="en-US" dirty="0"/>
+          </a:p>
+        </p:txBody>
+      </p:sp>
+    </p:spTree>
+    <p:extLst>
+      <p:ext uri="{BB962C8B-B14F-4D97-AF65-F5344CB8AC3E}">
+        <p14:creationId xmlns:p14="http://schemas.microsoft.com/office/powerpoint/2010/main" val="1895160442"/>
+      </p:ext>
+    </p:extLst>
+  </p:cSld>
+  <p:clrMapOvr>
+    <a:masterClrMapping/>
+  </p:clrMapOvr>
+</p:sld>
+</file>
+
+<file path=ppt/slides/slide3.xml><?xml version="1.0" encoding="utf-8"?>
 <p:sld xmlns:a="http://schemas.openxmlformats.org/drawingml/2006/main" xmlns:r="http://schemas.openxmlformats.org/officeDocument/2006/relationships" xmlns:p="http://schemas.openxmlformats.org/presentationml/2006/main">
   <p:cSld>
     <p:spTree>
@@ -4189,7 +4390,7 @@
 </p:sld>
 </file>
 
-<file path=ppt/slides/slide3.xml><?xml version="1.0" encoding="utf-8"?>
+<file path=ppt/slides/slide4.xml><?xml version="1.0" encoding="utf-8"?>
 <p:sld xmlns:a="http://schemas.openxmlformats.org/drawingml/2006/main" xmlns:r="http://schemas.openxmlformats.org/officeDocument/2006/relationships" xmlns:p="http://schemas.openxmlformats.org/presentationml/2006/main">
   <p:cSld>
     <p:spTree>
@@ -4255,7 +4456,7 @@
 </p:sld>
 </file>
 
-<file path=ppt/slides/slide4.xml><?xml version="1.0" encoding="utf-8"?>
+<file path=ppt/slides/slide5.xml><?xml version="1.0" encoding="utf-8"?>
 <p:sld xmlns:a="http://schemas.openxmlformats.org/drawingml/2006/main" xmlns:r="http://schemas.openxmlformats.org/officeDocument/2006/relationships" xmlns:p="http://schemas.openxmlformats.org/presentationml/2006/main">
   <p:cSld>
     <p:spTree>

</xml_diff>

<commit_message>
Added dataset and overview slides.
</commit_message>
<xml_diff>
--- a/babbage/powerpoint/Group18 Presentation.pptx
+++ b/babbage/powerpoint/Group18 Presentation.pptx
@@ -6,10 +6,12 @@
   </p:sldMasterIdLst>
   <p:sldIdLst>
     <p:sldId id="256" r:id="rId2"/>
-    <p:sldId id="260" r:id="rId3"/>
-    <p:sldId id="259" r:id="rId4"/>
-    <p:sldId id="257" r:id="rId5"/>
-    <p:sldId id="258" r:id="rId6"/>
+    <p:sldId id="262" r:id="rId3"/>
+    <p:sldId id="260" r:id="rId4"/>
+    <p:sldId id="259" r:id="rId5"/>
+    <p:sldId id="257" r:id="rId6"/>
+    <p:sldId id="258" r:id="rId7"/>
+    <p:sldId id="261" r:id="rId8"/>
   </p:sldIdLst>
   <p:sldSz cx="9144000" cy="6858000" type="screen4x3"/>
   <p:notesSz cx="6858000" cy="9144000"/>
@@ -111,9 +113,10 @@
   <p:extLst>
     <p:ext uri="{521415D9-36F7-43E2-AB2F-B90AF26B5E84}">
       <p14:sectionLst xmlns:p14="http://schemas.microsoft.com/office/powerpoint/2010/main">
-        <p14:section name="Opening" id="{891F661E-DE42-5B49-BA88-1D4106BE2C4B}">
+        <p14:section name="Opening &amp; Overview" id="{891F661E-DE42-5B49-BA88-1D4106BE2C4B}">
           <p14:sldIdLst>
             <p14:sldId id="256"/>
+            <p14:sldId id="262"/>
           </p14:sldIdLst>
         </p14:section>
         <p14:section name="Technologies" id="{2E34024E-3150-954F-AEC8-F72BA0715EB9}">
@@ -130,6 +133,11 @@
           <p14:sldIdLst>
             <p14:sldId id="257"/>
             <p14:sldId id="258"/>
+          </p14:sldIdLst>
+        </p14:section>
+        <p14:section name="Datasets" id="{EDF45DFA-6EF1-834F-9D2B-DD0B71DDF15F}">
+          <p14:sldIdLst>
+            <p14:sldId id="261"/>
           </p14:sldIdLst>
         </p14:section>
       </p14:sectionLst>
@@ -319,7 +327,7 @@
           <a:p>
             <a:fld id="{6BFECD78-3C8E-49F2-8FAB-59489D168ABB}" type="datetimeFigureOut">
               <a:rPr lang="en-US" smtClean="0"/>
-              <a:t>11/30/14</a:t>
+              <a:t>12/1/14</a:t>
             </a:fld>
             <a:endParaRPr lang="en-US"/>
           </a:p>
@@ -489,7 +497,7 @@
           <a:p>
             <a:fld id="{6BFECD78-3C8E-49F2-8FAB-59489D168ABB}" type="datetimeFigureOut">
               <a:rPr lang="en-US" smtClean="0"/>
-              <a:t>11/30/14</a:t>
+              <a:t>12/1/14</a:t>
             </a:fld>
             <a:endParaRPr lang="en-US"/>
           </a:p>
@@ -669,7 +677,7 @@
           <a:p>
             <a:fld id="{6BFECD78-3C8E-49F2-8FAB-59489D168ABB}" type="datetimeFigureOut">
               <a:rPr lang="en-US" smtClean="0"/>
-              <a:t>11/30/14</a:t>
+              <a:t>12/1/14</a:t>
             </a:fld>
             <a:endParaRPr lang="en-US"/>
           </a:p>
@@ -839,7 +847,7 @@
           <a:p>
             <a:fld id="{6BFECD78-3C8E-49F2-8FAB-59489D168ABB}" type="datetimeFigureOut">
               <a:rPr lang="en-US" smtClean="0"/>
-              <a:t>11/30/14</a:t>
+              <a:t>12/1/14</a:t>
             </a:fld>
             <a:endParaRPr lang="en-US"/>
           </a:p>
@@ -1085,7 +1093,7 @@
           <a:p>
             <a:fld id="{6BFECD78-3C8E-49F2-8FAB-59489D168ABB}" type="datetimeFigureOut">
               <a:rPr lang="en-US" smtClean="0"/>
-              <a:t>11/30/14</a:t>
+              <a:t>12/1/14</a:t>
             </a:fld>
             <a:endParaRPr lang="en-US"/>
           </a:p>
@@ -1373,7 +1381,7 @@
           <a:p>
             <a:fld id="{6BFECD78-3C8E-49F2-8FAB-59489D168ABB}" type="datetimeFigureOut">
               <a:rPr lang="en-US" smtClean="0"/>
-              <a:t>11/30/14</a:t>
+              <a:t>12/1/14</a:t>
             </a:fld>
             <a:endParaRPr lang="en-US"/>
           </a:p>
@@ -1795,7 +1803,7 @@
           <a:p>
             <a:fld id="{6BFECD78-3C8E-49F2-8FAB-59489D168ABB}" type="datetimeFigureOut">
               <a:rPr lang="en-US" smtClean="0"/>
-              <a:t>11/30/14</a:t>
+              <a:t>12/1/14</a:t>
             </a:fld>
             <a:endParaRPr lang="en-US"/>
           </a:p>
@@ -1913,7 +1921,7 @@
           <a:p>
             <a:fld id="{6BFECD78-3C8E-49F2-8FAB-59489D168ABB}" type="datetimeFigureOut">
               <a:rPr lang="en-US" smtClean="0"/>
-              <a:t>11/30/14</a:t>
+              <a:t>12/1/14</a:t>
             </a:fld>
             <a:endParaRPr lang="en-US"/>
           </a:p>
@@ -2008,7 +2016,7 @@
           <a:p>
             <a:fld id="{6BFECD78-3C8E-49F2-8FAB-59489D168ABB}" type="datetimeFigureOut">
               <a:rPr lang="en-US" smtClean="0"/>
-              <a:t>11/30/14</a:t>
+              <a:t>12/1/14</a:t>
             </a:fld>
             <a:endParaRPr lang="en-US"/>
           </a:p>
@@ -2285,7 +2293,7 @@
           <a:p>
             <a:fld id="{6BFECD78-3C8E-49F2-8FAB-59489D168ABB}" type="datetimeFigureOut">
               <a:rPr lang="en-US" smtClean="0"/>
-              <a:t>11/30/14</a:t>
+              <a:t>12/1/14</a:t>
             </a:fld>
             <a:endParaRPr lang="en-US"/>
           </a:p>
@@ -2542,7 +2550,7 @@
           <a:p>
             <a:fld id="{6BFECD78-3C8E-49F2-8FAB-59489D168ABB}" type="datetimeFigureOut">
               <a:rPr lang="en-US" smtClean="0"/>
-              <a:t>11/30/14</a:t>
+              <a:t>12/1/14</a:t>
             </a:fld>
             <a:endParaRPr lang="en-US"/>
           </a:p>
@@ -2761,7 +2769,7 @@
             <a:fld id="{6BFECD78-3C8E-49F2-8FAB-59489D168ABB}" type="datetimeFigureOut">
               <a:rPr lang="en-US" smtClean="0"/>
               <a:pPr/>
-              <a:t>11/30/14</a:t>
+              <a:t>12/1/14</a:t>
             </a:fld>
             <a:endParaRPr lang="en-US"/>
           </a:p>
@@ -3241,6 +3249,112 @@
             <p:ph type="title"/>
           </p:nvPr>
         </p:nvSpPr>
+        <p:spPr/>
+        <p:txBody>
+          <a:bodyPr/>
+          <a:lstStyle/>
+          <a:p>
+            <a:r>
+              <a:rPr lang="en-US" dirty="0" smtClean="0"/>
+              <a:t>Overview</a:t>
+            </a:r>
+            <a:endParaRPr lang="en-US" dirty="0"/>
+          </a:p>
+        </p:txBody>
+      </p:sp>
+      <p:sp>
+        <p:nvSpPr>
+          <p:cNvPr id="3" name="Content Placeholder 2"/>
+          <p:cNvSpPr>
+            <a:spLocks noGrp="1"/>
+          </p:cNvSpPr>
+          <p:nvPr>
+            <p:ph idx="1"/>
+          </p:nvPr>
+        </p:nvSpPr>
+        <p:spPr/>
+        <p:txBody>
+          <a:bodyPr/>
+          <a:lstStyle/>
+          <a:p>
+            <a:r>
+              <a:rPr lang="en-US" dirty="0" smtClean="0"/>
+              <a:t>Cascade Server</a:t>
+            </a:r>
+          </a:p>
+          <a:p>
+            <a:pPr lvl="1"/>
+            <a:r>
+              <a:rPr lang="en-US" dirty="0" smtClean="0"/>
+              <a:t>No SSL Available</a:t>
+            </a:r>
+          </a:p>
+          <a:p>
+            <a:r>
+              <a:rPr lang="en-US" dirty="0" smtClean="0"/>
+              <a:t>Replacement CMS</a:t>
+            </a:r>
+          </a:p>
+          <a:p>
+            <a:r>
+              <a:rPr lang="en-US" dirty="0" smtClean="0"/>
+              <a:t>Unions Admin Portal</a:t>
+            </a:r>
+          </a:p>
+          <a:p>
+            <a:r>
+              <a:rPr lang="en-US" dirty="0" smtClean="0"/>
+              <a:t>Lost &amp; Found Module</a:t>
+            </a:r>
+          </a:p>
+          <a:p>
+            <a:r>
+              <a:rPr lang="en-US" dirty="0" smtClean="0"/>
+              <a:t>User Management</a:t>
+            </a:r>
+          </a:p>
+        </p:txBody>
+      </p:sp>
+    </p:spTree>
+    <p:extLst>
+      <p:ext uri="{BB962C8B-B14F-4D97-AF65-F5344CB8AC3E}">
+        <p14:creationId xmlns:p14="http://schemas.microsoft.com/office/powerpoint/2010/main" val="1927676499"/>
+      </p:ext>
+    </p:extLst>
+  </p:cSld>
+  <p:clrMapOvr>
+    <a:masterClrMapping/>
+  </p:clrMapOvr>
+</p:sld>
+</file>
+
+<file path=ppt/slides/slide3.xml><?xml version="1.0" encoding="utf-8"?>
+<p:sld xmlns:a="http://schemas.openxmlformats.org/drawingml/2006/main" xmlns:r="http://schemas.openxmlformats.org/officeDocument/2006/relationships" xmlns:p="http://schemas.openxmlformats.org/presentationml/2006/main">
+  <p:cSld>
+    <p:spTree>
+      <p:nvGrpSpPr>
+        <p:cNvPr id="1" name=""/>
+        <p:cNvGrpSpPr/>
+        <p:nvPr/>
+      </p:nvGrpSpPr>
+      <p:grpSpPr>
+        <a:xfrm>
+          <a:off x="0" y="0"/>
+          <a:ext cx="0" cy="0"/>
+          <a:chOff x="0" y="0"/>
+          <a:chExt cx="0" cy="0"/>
+        </a:xfrm>
+      </p:grpSpPr>
+      <p:sp>
+        <p:nvSpPr>
+          <p:cNvPr id="2" name="Title 1"/>
+          <p:cNvSpPr>
+            <a:spLocks noGrp="1"/>
+          </p:cNvSpPr>
+          <p:nvPr>
+            <p:ph type="title"/>
+          </p:nvPr>
+        </p:nvSpPr>
         <p:spPr>
           <a:xfrm>
             <a:off x="457200" y="1395059"/>
@@ -3409,7 +3523,7 @@
 </p:sld>
 </file>
 
-<file path=ppt/slides/slide3.xml><?xml version="1.0" encoding="utf-8"?>
+<file path=ppt/slides/slide4.xml><?xml version="1.0" encoding="utf-8"?>
 <p:sld xmlns:a="http://schemas.openxmlformats.org/drawingml/2006/main" xmlns:r="http://schemas.openxmlformats.org/officeDocument/2006/relationships" xmlns:p="http://schemas.openxmlformats.org/presentationml/2006/main">
   <p:cSld>
     <p:spTree>
@@ -4390,7 +4504,7 @@
 </p:sld>
 </file>
 
-<file path=ppt/slides/slide4.xml><?xml version="1.0" encoding="utf-8"?>
+<file path=ppt/slides/slide5.xml><?xml version="1.0" encoding="utf-8"?>
 <p:sld xmlns:a="http://schemas.openxmlformats.org/drawingml/2006/main" xmlns:r="http://schemas.openxmlformats.org/officeDocument/2006/relationships" xmlns:p="http://schemas.openxmlformats.org/presentationml/2006/main">
   <p:cSld>
     <p:spTree>
@@ -4456,7 +4570,7 @@
 </p:sld>
 </file>
 
-<file path=ppt/slides/slide5.xml><?xml version="1.0" encoding="utf-8"?>
+<file path=ppt/slides/slide6.xml><?xml version="1.0" encoding="utf-8"?>
 <p:sld xmlns:a="http://schemas.openxmlformats.org/drawingml/2006/main" xmlns:r="http://schemas.openxmlformats.org/officeDocument/2006/relationships" xmlns:p="http://schemas.openxmlformats.org/presentationml/2006/main">
   <p:cSld>
     <p:spTree>
@@ -5642,6 +5756,133 @@
 </p:sld>
 </file>
 
+<file path=ppt/slides/slide7.xml><?xml version="1.0" encoding="utf-8"?>
+<p:sld xmlns:a="http://schemas.openxmlformats.org/drawingml/2006/main" xmlns:r="http://schemas.openxmlformats.org/officeDocument/2006/relationships" xmlns:p="http://schemas.openxmlformats.org/presentationml/2006/main">
+  <p:cSld>
+    <p:spTree>
+      <p:nvGrpSpPr>
+        <p:cNvPr id="1" name=""/>
+        <p:cNvGrpSpPr/>
+        <p:nvPr/>
+      </p:nvGrpSpPr>
+      <p:grpSpPr>
+        <a:xfrm>
+          <a:off x="0" y="0"/>
+          <a:ext cx="0" cy="0"/>
+          <a:chOff x="0" y="0"/>
+          <a:chExt cx="0" cy="0"/>
+        </a:xfrm>
+      </p:grpSpPr>
+      <p:sp>
+        <p:nvSpPr>
+          <p:cNvPr id="2" name="Title 1"/>
+          <p:cNvSpPr>
+            <a:spLocks noGrp="1"/>
+          </p:cNvSpPr>
+          <p:nvPr>
+            <p:ph type="title"/>
+          </p:nvPr>
+        </p:nvSpPr>
+        <p:spPr/>
+        <p:txBody>
+          <a:bodyPr/>
+          <a:lstStyle/>
+          <a:p>
+            <a:r>
+              <a:rPr lang="en-US" dirty="0" smtClean="0"/>
+              <a:t>Datasets Utilized</a:t>
+            </a:r>
+            <a:endParaRPr lang="en-US" dirty="0"/>
+          </a:p>
+        </p:txBody>
+      </p:sp>
+      <p:sp>
+        <p:nvSpPr>
+          <p:cNvPr id="3" name="Content Placeholder 2"/>
+          <p:cNvSpPr>
+            <a:spLocks noGrp="1"/>
+          </p:cNvSpPr>
+          <p:nvPr>
+            <p:ph idx="1"/>
+          </p:nvPr>
+        </p:nvSpPr>
+        <p:spPr/>
+        <p:txBody>
+          <a:bodyPr>
+            <a:normAutofit fontScale="92500" lnSpcReduction="20000"/>
+          </a:bodyPr>
+          <a:lstStyle/>
+          <a:p>
+            <a:r>
+              <a:rPr lang="en-US" dirty="0" smtClean="0"/>
+              <a:t>EMS API</a:t>
+            </a:r>
+          </a:p>
+          <a:p>
+            <a:pPr lvl="1"/>
+            <a:r>
+              <a:rPr lang="en-US" dirty="0" smtClean="0"/>
+              <a:t>Event Management System for the Missouri Student Unions</a:t>
+            </a:r>
+          </a:p>
+          <a:p>
+            <a:pPr lvl="1"/>
+            <a:r>
+              <a:rPr lang="en-US" dirty="0" smtClean="0"/>
+              <a:t>Event Spaces </a:t>
+            </a:r>
+            <a:r>
+              <a:rPr lang="en-US" smtClean="0"/>
+              <a:t>&amp; Meeting Times</a:t>
+            </a:r>
+            <a:endParaRPr lang="en-US" dirty="0" smtClean="0"/>
+          </a:p>
+          <a:p>
+            <a:r>
+              <a:rPr lang="en-US" dirty="0" err="1" smtClean="0"/>
+              <a:t>PostgresSQL</a:t>
+            </a:r>
+            <a:r>
+              <a:rPr lang="en-US" dirty="0" smtClean="0"/>
+              <a:t> Database</a:t>
+            </a:r>
+          </a:p>
+          <a:p>
+            <a:pPr lvl="1"/>
+            <a:r>
+              <a:rPr lang="en-US" dirty="0" smtClean="0"/>
+              <a:t>Lost &amp; Found</a:t>
+            </a:r>
+          </a:p>
+          <a:p>
+            <a:pPr lvl="1"/>
+            <a:r>
+              <a:rPr lang="en-US" dirty="0" smtClean="0"/>
+              <a:t>Policies &amp; Procedures</a:t>
+            </a:r>
+          </a:p>
+          <a:p>
+            <a:pPr lvl="1"/>
+            <a:r>
+              <a:rPr lang="en-US" dirty="0" smtClean="0"/>
+              <a:t>Event Space Features and Building Attractions</a:t>
+            </a:r>
+          </a:p>
+        </p:txBody>
+      </p:sp>
+    </p:spTree>
+    <p:extLst>
+      <p:ext uri="{BB962C8B-B14F-4D97-AF65-F5344CB8AC3E}">
+        <p14:creationId xmlns:p14="http://schemas.microsoft.com/office/powerpoint/2010/main" val="968368286"/>
+      </p:ext>
+    </p:extLst>
+  </p:cSld>
+  <p:clrMapOvr>
+    <a:masterClrMapping/>
+  </p:clrMapOvr>
+</p:sld>
+</file>
+
 <file path=ppt/theme/theme1.xml><?xml version="1.0" encoding="utf-8"?>
 <a:theme xmlns:a="http://schemas.openxmlformats.org/drawingml/2006/main" name=" Black ">
   <a:themeElements>

</xml_diff>

<commit_message>
Added ERD and Ben's Lost & Found slides
</commit_message>
<xml_diff>
--- a/babbage/powerpoint/Group18 Presentation.pptx
+++ b/babbage/powerpoint/Group18 Presentation.pptx
@@ -8,10 +8,13 @@
     <p:sldId id="256" r:id="rId2"/>
     <p:sldId id="262" r:id="rId3"/>
     <p:sldId id="260" r:id="rId4"/>
-    <p:sldId id="259" r:id="rId5"/>
-    <p:sldId id="257" r:id="rId6"/>
-    <p:sldId id="258" r:id="rId7"/>
-    <p:sldId id="261" r:id="rId8"/>
+    <p:sldId id="261" r:id="rId5"/>
+    <p:sldId id="263" r:id="rId6"/>
+    <p:sldId id="259" r:id="rId7"/>
+    <p:sldId id="257" r:id="rId8"/>
+    <p:sldId id="258" r:id="rId9"/>
+    <p:sldId id="264" r:id="rId10"/>
+    <p:sldId id="265" r:id="rId11"/>
   </p:sldIdLst>
   <p:sldSz cx="9144000" cy="6858000" type="screen4x3"/>
   <p:notesSz cx="6858000" cy="9144000"/>
@@ -124,6 +127,12 @@
             <p14:sldId id="260"/>
           </p14:sldIdLst>
         </p14:section>
+        <p14:section name="Datasets" id="{3CA54D6D-4E1E-D244-BD00-5AAC20E5B3FA}">
+          <p14:sldIdLst>
+            <p14:sldId id="261"/>
+            <p14:sldId id="263"/>
+          </p14:sldIdLst>
+        </p14:section>
         <p14:section name="CSS/Menu" id="{B7D230E2-ED78-C74A-A978-20BA6CB7001B}">
           <p14:sldIdLst>
             <p14:sldId id="259"/>
@@ -135,9 +144,10 @@
             <p14:sldId id="258"/>
           </p14:sldIdLst>
         </p14:section>
-        <p14:section name="Datasets" id="{EDF45DFA-6EF1-834F-9D2B-DD0B71DDF15F}">
+        <p14:section name="Lost &amp; Found" id="{7DC7A3DC-6434-934F-8600-70803678AD29}">
           <p14:sldIdLst>
-            <p14:sldId id="261"/>
+            <p14:sldId id="264"/>
+            <p14:sldId id="265"/>
           </p14:sldIdLst>
         </p14:section>
       </p14:sectionLst>
@@ -3222,6 +3232,411 @@
 </p:sld>
 </file>
 
+<file path=ppt/slides/slide10.xml><?xml version="1.0" encoding="utf-8"?>
+<p:sld xmlns:a="http://schemas.openxmlformats.org/drawingml/2006/main" xmlns:r="http://schemas.openxmlformats.org/officeDocument/2006/relationships" xmlns:p="http://schemas.openxmlformats.org/presentationml/2006/main">
+  <p:cSld>
+    <p:spTree>
+      <p:nvGrpSpPr>
+        <p:cNvPr id="1" name=""/>
+        <p:cNvGrpSpPr/>
+        <p:nvPr/>
+      </p:nvGrpSpPr>
+      <p:grpSpPr>
+        <a:xfrm>
+          <a:off x="0" y="0"/>
+          <a:ext cx="0" cy="0"/>
+          <a:chOff x="0" y="0"/>
+          <a:chExt cx="0" cy="0"/>
+        </a:xfrm>
+      </p:grpSpPr>
+      <p:sp>
+        <p:nvSpPr>
+          <p:cNvPr id="4" name="Text Placeholder 3"/>
+          <p:cNvSpPr>
+            <a:spLocks noGrp="1"/>
+          </p:cNvSpPr>
+          <p:nvPr>
+            <p:ph type="body" sz="half" idx="2"/>
+          </p:nvPr>
+        </p:nvSpPr>
+        <p:spPr>
+          <a:xfrm>
+            <a:off x="457202" y="1435102"/>
+            <a:ext cx="8497277" cy="4691063"/>
+          </a:xfrm>
+        </p:spPr>
+        <p:txBody>
+          <a:bodyPr>
+            <a:normAutofit/>
+          </a:bodyPr>
+          <a:lstStyle/>
+          <a:p>
+            <a:r>
+              <a:rPr lang="en-US" sz="3600" b="1" dirty="0" smtClean="0"/>
+              <a:t>Lost and Found Module</a:t>
+            </a:r>
+            <a:br>
+              <a:rPr lang="en-US" sz="3600" b="1" dirty="0" smtClean="0"/>
+            </a:br>
+            <a:endParaRPr lang="en-US" sz="3600" b="1" dirty="0" smtClean="0"/>
+          </a:p>
+          <a:p>
+            <a:r>
+              <a:rPr lang="en-US" sz="2000" dirty="0" smtClean="0"/>
+              <a:t>Lost Item Types </a:t>
+            </a:r>
+          </a:p>
+          <a:p>
+            <a:pPr lvl="1">
+              <a:buFontTx/>
+              <a:buChar char="-"/>
+            </a:pPr>
+            <a:r>
+              <a:rPr lang="en-US" sz="2000" dirty="0" smtClean="0"/>
+              <a:t> Common types (Phone, Laptop, Jacket)</a:t>
+            </a:r>
+          </a:p>
+          <a:p>
+            <a:pPr lvl="1">
+              <a:buFontTx/>
+              <a:buChar char="-"/>
+            </a:pPr>
+            <a:r>
+              <a:rPr lang="en-US" sz="2000" dirty="0" smtClean="0"/>
+              <a:t> Uncommon (Food, Wife)</a:t>
+            </a:r>
+          </a:p>
+          <a:p>
+            <a:pPr lvl="2">
+              <a:buFontTx/>
+              <a:buChar char="-"/>
+            </a:pPr>
+            <a:r>
+              <a:rPr lang="en-US" sz="2000" dirty="0" smtClean="0"/>
+              <a:t> Option for new types</a:t>
+            </a:r>
+          </a:p>
+          <a:p>
+            <a:pPr lvl="2">
+              <a:buFontTx/>
+              <a:buChar char="-"/>
+            </a:pPr>
+            <a:r>
+              <a:rPr lang="en-US" sz="2000" dirty="0" smtClean="0"/>
+              <a:t> Admin Approval</a:t>
+            </a:r>
+          </a:p>
+          <a:p>
+            <a:pPr lvl="2">
+              <a:buFontTx/>
+              <a:buChar char="-"/>
+            </a:pPr>
+            <a:r>
+              <a:rPr lang="en-US" sz="2000" dirty="0" smtClean="0"/>
+              <a:t> Admin interface</a:t>
+            </a:r>
+          </a:p>
+        </p:txBody>
+      </p:sp>
+    </p:spTree>
+    <p:extLst>
+      <p:ext uri="{BB962C8B-B14F-4D97-AF65-F5344CB8AC3E}">
+        <p14:creationId xmlns:p14="http://schemas.microsoft.com/office/powerpoint/2010/main" val="1495093529"/>
+      </p:ext>
+    </p:extLst>
+  </p:cSld>
+  <p:clrMapOvr>
+    <a:masterClrMapping/>
+  </p:clrMapOvr>
+  <p:timing>
+    <p:tnLst>
+      <p:par>
+        <p:cTn xmlns:p14="http://schemas.microsoft.com/office/powerpoint/2010/main" id="1" dur="indefinite" restart="never" nodeType="tmRoot">
+          <p:childTnLst>
+            <p:seq concurrent="1" nextAc="seek">
+              <p:cTn id="2" dur="indefinite" nodeType="mainSeq">
+                <p:childTnLst>
+                  <p:par>
+                    <p:cTn id="3" fill="hold">
+                      <p:stCondLst>
+                        <p:cond delay="indefinite"/>
+                      </p:stCondLst>
+                      <p:childTnLst>
+                        <p:par>
+                          <p:cTn id="4" fill="hold">
+                            <p:stCondLst>
+                              <p:cond delay="0"/>
+                            </p:stCondLst>
+                            <p:childTnLst>
+                              <p:par>
+                                <p:cTn id="5" presetID="1" presetClass="entr" presetSubtype="0" fill="hold" grpId="0" nodeType="clickEffect">
+                                  <p:stCondLst>
+                                    <p:cond delay="0"/>
+                                  </p:stCondLst>
+                                  <p:childTnLst>
+                                    <p:set>
+                                      <p:cBhvr>
+                                        <p:cTn id="6" dur="1" fill="hold">
+                                          <p:stCondLst>
+                                            <p:cond delay="0"/>
+                                          </p:stCondLst>
+                                        </p:cTn>
+                                        <p:tgtEl>
+                                          <p:spTgt spid="4">
+                                            <p:txEl>
+                                              <p:pRg st="0" end="0"/>
+                                            </p:txEl>
+                                          </p:spTgt>
+                                        </p:tgtEl>
+                                        <p:attrNameLst>
+                                          <p:attrName>style.visibility</p:attrName>
+                                        </p:attrNameLst>
+                                      </p:cBhvr>
+                                      <p:to>
+                                        <p:strVal val="visible"/>
+                                      </p:to>
+                                    </p:set>
+                                  </p:childTnLst>
+                                </p:cTn>
+                              </p:par>
+                            </p:childTnLst>
+                          </p:cTn>
+                        </p:par>
+                      </p:childTnLst>
+                    </p:cTn>
+                  </p:par>
+                  <p:par>
+                    <p:cTn id="7" fill="hold">
+                      <p:stCondLst>
+                        <p:cond delay="indefinite"/>
+                      </p:stCondLst>
+                      <p:childTnLst>
+                        <p:par>
+                          <p:cTn id="8" fill="hold">
+                            <p:stCondLst>
+                              <p:cond delay="0"/>
+                            </p:stCondLst>
+                            <p:childTnLst>
+                              <p:par>
+                                <p:cTn id="9" presetID="1" presetClass="entr" presetSubtype="0" fill="hold" grpId="0" nodeType="clickEffect">
+                                  <p:stCondLst>
+                                    <p:cond delay="0"/>
+                                  </p:stCondLst>
+                                  <p:childTnLst>
+                                    <p:set>
+                                      <p:cBhvr>
+                                        <p:cTn id="10" dur="1" fill="hold">
+                                          <p:stCondLst>
+                                            <p:cond delay="0"/>
+                                          </p:stCondLst>
+                                        </p:cTn>
+                                        <p:tgtEl>
+                                          <p:spTgt spid="4">
+                                            <p:txEl>
+                                              <p:pRg st="1" end="1"/>
+                                            </p:txEl>
+                                          </p:spTgt>
+                                        </p:tgtEl>
+                                        <p:attrNameLst>
+                                          <p:attrName>style.visibility</p:attrName>
+                                        </p:attrNameLst>
+                                      </p:cBhvr>
+                                      <p:to>
+                                        <p:strVal val="visible"/>
+                                      </p:to>
+                                    </p:set>
+                                  </p:childTnLst>
+                                </p:cTn>
+                              </p:par>
+                              <p:par>
+                                <p:cTn id="11" presetID="1" presetClass="entr" presetSubtype="0" fill="hold" grpId="0" nodeType="withEffect">
+                                  <p:stCondLst>
+                                    <p:cond delay="0"/>
+                                  </p:stCondLst>
+                                  <p:childTnLst>
+                                    <p:set>
+                                      <p:cBhvr>
+                                        <p:cTn id="12" dur="1" fill="hold">
+                                          <p:stCondLst>
+                                            <p:cond delay="0"/>
+                                          </p:stCondLst>
+                                        </p:cTn>
+                                        <p:tgtEl>
+                                          <p:spTgt spid="4">
+                                            <p:txEl>
+                                              <p:pRg st="2" end="2"/>
+                                            </p:txEl>
+                                          </p:spTgt>
+                                        </p:tgtEl>
+                                        <p:attrNameLst>
+                                          <p:attrName>style.visibility</p:attrName>
+                                        </p:attrNameLst>
+                                      </p:cBhvr>
+                                      <p:to>
+                                        <p:strVal val="visible"/>
+                                      </p:to>
+                                    </p:set>
+                                  </p:childTnLst>
+                                </p:cTn>
+                              </p:par>
+                              <p:par>
+                                <p:cTn id="13" presetID="1" presetClass="entr" presetSubtype="0" fill="hold" grpId="0" nodeType="withEffect">
+                                  <p:stCondLst>
+                                    <p:cond delay="0"/>
+                                  </p:stCondLst>
+                                  <p:childTnLst>
+                                    <p:set>
+                                      <p:cBhvr>
+                                        <p:cTn id="14" dur="1" fill="hold">
+                                          <p:stCondLst>
+                                            <p:cond delay="0"/>
+                                          </p:stCondLst>
+                                        </p:cTn>
+                                        <p:tgtEl>
+                                          <p:spTgt spid="4">
+                                            <p:txEl>
+                                              <p:pRg st="3" end="3"/>
+                                            </p:txEl>
+                                          </p:spTgt>
+                                        </p:tgtEl>
+                                        <p:attrNameLst>
+                                          <p:attrName>style.visibility</p:attrName>
+                                        </p:attrNameLst>
+                                      </p:cBhvr>
+                                      <p:to>
+                                        <p:strVal val="visible"/>
+                                      </p:to>
+                                    </p:set>
+                                  </p:childTnLst>
+                                </p:cTn>
+                              </p:par>
+                              <p:par>
+                                <p:cTn id="15" presetID="1" presetClass="entr" presetSubtype="0" fill="hold" grpId="0" nodeType="withEffect">
+                                  <p:stCondLst>
+                                    <p:cond delay="0"/>
+                                  </p:stCondLst>
+                                  <p:childTnLst>
+                                    <p:set>
+                                      <p:cBhvr>
+                                        <p:cTn id="16" dur="1" fill="hold">
+                                          <p:stCondLst>
+                                            <p:cond delay="0"/>
+                                          </p:stCondLst>
+                                        </p:cTn>
+                                        <p:tgtEl>
+                                          <p:spTgt spid="4">
+                                            <p:txEl>
+                                              <p:pRg st="4" end="4"/>
+                                            </p:txEl>
+                                          </p:spTgt>
+                                        </p:tgtEl>
+                                        <p:attrNameLst>
+                                          <p:attrName>style.visibility</p:attrName>
+                                        </p:attrNameLst>
+                                      </p:cBhvr>
+                                      <p:to>
+                                        <p:strVal val="visible"/>
+                                      </p:to>
+                                    </p:set>
+                                  </p:childTnLst>
+                                </p:cTn>
+                              </p:par>
+                              <p:par>
+                                <p:cTn id="17" presetID="1" presetClass="entr" presetSubtype="0" fill="hold" grpId="0" nodeType="withEffect">
+                                  <p:stCondLst>
+                                    <p:cond delay="0"/>
+                                  </p:stCondLst>
+                                  <p:childTnLst>
+                                    <p:set>
+                                      <p:cBhvr>
+                                        <p:cTn id="18" dur="1" fill="hold">
+                                          <p:stCondLst>
+                                            <p:cond delay="0"/>
+                                          </p:stCondLst>
+                                        </p:cTn>
+                                        <p:tgtEl>
+                                          <p:spTgt spid="4">
+                                            <p:txEl>
+                                              <p:pRg st="5" end="5"/>
+                                            </p:txEl>
+                                          </p:spTgt>
+                                        </p:tgtEl>
+                                        <p:attrNameLst>
+                                          <p:attrName>style.visibility</p:attrName>
+                                        </p:attrNameLst>
+                                      </p:cBhvr>
+                                      <p:to>
+                                        <p:strVal val="visible"/>
+                                      </p:to>
+                                    </p:set>
+                                  </p:childTnLst>
+                                </p:cTn>
+                              </p:par>
+                              <p:par>
+                                <p:cTn id="19" presetID="1" presetClass="entr" presetSubtype="0" fill="hold" grpId="0" nodeType="withEffect">
+                                  <p:stCondLst>
+                                    <p:cond delay="0"/>
+                                  </p:stCondLst>
+                                  <p:childTnLst>
+                                    <p:set>
+                                      <p:cBhvr>
+                                        <p:cTn id="20" dur="1" fill="hold">
+                                          <p:stCondLst>
+                                            <p:cond delay="0"/>
+                                          </p:stCondLst>
+                                        </p:cTn>
+                                        <p:tgtEl>
+                                          <p:spTgt spid="4">
+                                            <p:txEl>
+                                              <p:pRg st="6" end="6"/>
+                                            </p:txEl>
+                                          </p:spTgt>
+                                        </p:tgtEl>
+                                        <p:attrNameLst>
+                                          <p:attrName>style.visibility</p:attrName>
+                                        </p:attrNameLst>
+                                      </p:cBhvr>
+                                      <p:to>
+                                        <p:strVal val="visible"/>
+                                      </p:to>
+                                    </p:set>
+                                  </p:childTnLst>
+                                </p:cTn>
+                              </p:par>
+                            </p:childTnLst>
+                          </p:cTn>
+                        </p:par>
+                      </p:childTnLst>
+                    </p:cTn>
+                  </p:par>
+                </p:childTnLst>
+              </p:cTn>
+              <p:prevCondLst>
+                <p:cond evt="onPrev" delay="0">
+                  <p:tgtEl>
+                    <p:sldTgt/>
+                  </p:tgtEl>
+                </p:cond>
+              </p:prevCondLst>
+              <p:nextCondLst>
+                <p:cond evt="onNext" delay="0">
+                  <p:tgtEl>
+                    <p:sldTgt/>
+                  </p:tgtEl>
+                </p:cond>
+              </p:nextCondLst>
+            </p:seq>
+          </p:childTnLst>
+        </p:cTn>
+      </p:par>
+    </p:tnLst>
+    <p:bldLst>
+      <p:bldP spid="4" grpId="0" build="p"/>
+    </p:bldLst>
+  </p:timing>
+</p:sld>
+</file>
+
 <file path=ppt/slides/slide2.xml><?xml version="1.0" encoding="utf-8"?>
 <p:sld xmlns:a="http://schemas.openxmlformats.org/drawingml/2006/main" xmlns:r="http://schemas.openxmlformats.org/officeDocument/2006/relationships" xmlns:p="http://schemas.openxmlformats.org/presentationml/2006/main">
   <p:cSld>
@@ -3524,6 +3939,200 @@
 </file>
 
 <file path=ppt/slides/slide4.xml><?xml version="1.0" encoding="utf-8"?>
+<p:sld xmlns:a="http://schemas.openxmlformats.org/drawingml/2006/main" xmlns:r="http://schemas.openxmlformats.org/officeDocument/2006/relationships" xmlns:p="http://schemas.openxmlformats.org/presentationml/2006/main">
+  <p:cSld>
+    <p:spTree>
+      <p:nvGrpSpPr>
+        <p:cNvPr id="1" name=""/>
+        <p:cNvGrpSpPr/>
+        <p:nvPr/>
+      </p:nvGrpSpPr>
+      <p:grpSpPr>
+        <a:xfrm>
+          <a:off x="0" y="0"/>
+          <a:ext cx="0" cy="0"/>
+          <a:chOff x="0" y="0"/>
+          <a:chExt cx="0" cy="0"/>
+        </a:xfrm>
+      </p:grpSpPr>
+      <p:sp>
+        <p:nvSpPr>
+          <p:cNvPr id="2" name="Title 1"/>
+          <p:cNvSpPr>
+            <a:spLocks noGrp="1"/>
+          </p:cNvSpPr>
+          <p:nvPr>
+            <p:ph type="title"/>
+          </p:nvPr>
+        </p:nvSpPr>
+        <p:spPr/>
+        <p:txBody>
+          <a:bodyPr/>
+          <a:lstStyle/>
+          <a:p>
+            <a:r>
+              <a:rPr lang="en-US" dirty="0" smtClean="0"/>
+              <a:t>Datasets Utilized</a:t>
+            </a:r>
+            <a:endParaRPr lang="en-US" dirty="0"/>
+          </a:p>
+        </p:txBody>
+      </p:sp>
+      <p:sp>
+        <p:nvSpPr>
+          <p:cNvPr id="3" name="Content Placeholder 2"/>
+          <p:cNvSpPr>
+            <a:spLocks noGrp="1"/>
+          </p:cNvSpPr>
+          <p:nvPr>
+            <p:ph idx="1"/>
+          </p:nvPr>
+        </p:nvSpPr>
+        <p:spPr/>
+        <p:txBody>
+          <a:bodyPr>
+            <a:normAutofit fontScale="92500" lnSpcReduction="20000"/>
+          </a:bodyPr>
+          <a:lstStyle/>
+          <a:p>
+            <a:r>
+              <a:rPr lang="en-US" dirty="0" smtClean="0"/>
+              <a:t>EMS API</a:t>
+            </a:r>
+          </a:p>
+          <a:p>
+            <a:pPr lvl="1"/>
+            <a:r>
+              <a:rPr lang="en-US" dirty="0" smtClean="0"/>
+              <a:t>Event Management System for the Missouri Student Unions</a:t>
+            </a:r>
+          </a:p>
+          <a:p>
+            <a:pPr lvl="1"/>
+            <a:r>
+              <a:rPr lang="en-US" dirty="0" smtClean="0"/>
+              <a:t>Event Spaces &amp; Meeting Times</a:t>
+            </a:r>
+          </a:p>
+          <a:p>
+            <a:r>
+              <a:rPr lang="en-US" dirty="0" err="1" smtClean="0"/>
+              <a:t>PostgresSQL</a:t>
+            </a:r>
+            <a:r>
+              <a:rPr lang="en-US" dirty="0" smtClean="0"/>
+              <a:t> Database</a:t>
+            </a:r>
+          </a:p>
+          <a:p>
+            <a:pPr lvl="1"/>
+            <a:r>
+              <a:rPr lang="en-US" dirty="0" smtClean="0"/>
+              <a:t>Lost &amp; Found</a:t>
+            </a:r>
+          </a:p>
+          <a:p>
+            <a:pPr lvl="1"/>
+            <a:r>
+              <a:rPr lang="en-US" dirty="0" smtClean="0"/>
+              <a:t>Policies &amp; Procedures</a:t>
+            </a:r>
+          </a:p>
+          <a:p>
+            <a:pPr lvl="1"/>
+            <a:r>
+              <a:rPr lang="en-US" dirty="0" smtClean="0"/>
+              <a:t>Event Space Features and Building Attractions</a:t>
+            </a:r>
+          </a:p>
+        </p:txBody>
+      </p:sp>
+    </p:spTree>
+    <p:extLst>
+      <p:ext uri="{BB962C8B-B14F-4D97-AF65-F5344CB8AC3E}">
+        <p14:creationId xmlns:p14="http://schemas.microsoft.com/office/powerpoint/2010/main" val="968368286"/>
+      </p:ext>
+    </p:extLst>
+  </p:cSld>
+  <p:clrMapOvr>
+    <a:masterClrMapping/>
+  </p:clrMapOvr>
+  <p:timing>
+    <p:tnLst>
+      <p:par>
+        <p:cTn xmlns:p14="http://schemas.microsoft.com/office/powerpoint/2010/main" id="1" dur="indefinite" restart="never" nodeType="tmRoot"/>
+      </p:par>
+    </p:tnLst>
+  </p:timing>
+</p:sld>
+</file>
+
+<file path=ppt/slides/slide5.xml><?xml version="1.0" encoding="utf-8"?>
+<p:sld xmlns:a="http://schemas.openxmlformats.org/drawingml/2006/main" xmlns:r="http://schemas.openxmlformats.org/officeDocument/2006/relationships" xmlns:p="http://schemas.openxmlformats.org/presentationml/2006/main">
+  <p:cSld>
+    <p:spTree>
+      <p:nvGrpSpPr>
+        <p:cNvPr id="1" name=""/>
+        <p:cNvGrpSpPr/>
+        <p:nvPr/>
+      </p:nvGrpSpPr>
+      <p:grpSpPr>
+        <a:xfrm>
+          <a:off x="0" y="0"/>
+          <a:ext cx="0" cy="0"/>
+          <a:chOff x="0" y="0"/>
+          <a:chExt cx="0" cy="0"/>
+        </a:xfrm>
+      </p:grpSpPr>
+      <p:pic>
+        <p:nvPicPr>
+          <p:cNvPr id="4" name="Content Placeholder 3" descr="erd.png"/>
+          <p:cNvPicPr>
+            <a:picLocks noGrp="1" noChangeAspect="1"/>
+          </p:cNvPicPr>
+          <p:nvPr>
+            <p:ph idx="1"/>
+          </p:nvPr>
+        </p:nvPicPr>
+        <p:blipFill rotWithShape="1">
+          <a:blip r:embed="rId2">
+            <a:extLst>
+              <a:ext uri="{28A0092B-C50C-407E-A947-70E740481C1C}">
+                <a14:useLocalDpi xmlns:a14="http://schemas.microsoft.com/office/drawing/2010/main" val="0"/>
+              </a:ext>
+            </a:extLst>
+          </a:blip>
+          <a:srcRect l="-10636" r="-3322" b="59"/>
+          <a:stretch/>
+        </p:blipFill>
+        <p:spPr>
+          <a:xfrm>
+            <a:off x="290007" y="1433667"/>
+            <a:ext cx="8066783" cy="5336827"/>
+          </a:xfrm>
+        </p:spPr>
+      </p:pic>
+    </p:spTree>
+    <p:extLst>
+      <p:ext uri="{BB962C8B-B14F-4D97-AF65-F5344CB8AC3E}">
+        <p14:creationId xmlns:p14="http://schemas.microsoft.com/office/powerpoint/2010/main" val="4135642186"/>
+      </p:ext>
+    </p:extLst>
+  </p:cSld>
+  <p:clrMapOvr>
+    <a:masterClrMapping/>
+  </p:clrMapOvr>
+  <p:timing>
+    <p:tnLst>
+      <p:par>
+        <p:cTn xmlns:p14="http://schemas.microsoft.com/office/powerpoint/2010/main" id="1" dur="indefinite" restart="never" nodeType="tmRoot"/>
+      </p:par>
+    </p:tnLst>
+  </p:timing>
+</p:sld>
+</file>
+
+<file path=ppt/slides/slide6.xml><?xml version="1.0" encoding="utf-8"?>
 <p:sld xmlns:a="http://schemas.openxmlformats.org/drawingml/2006/main" xmlns:r="http://schemas.openxmlformats.org/officeDocument/2006/relationships" xmlns:p="http://schemas.openxmlformats.org/presentationml/2006/main">
   <p:cSld>
     <p:spTree>
@@ -4504,7 +5113,7 @@
 </p:sld>
 </file>
 
-<file path=ppt/slides/slide5.xml><?xml version="1.0" encoding="utf-8"?>
+<file path=ppt/slides/slide7.xml><?xml version="1.0" encoding="utf-8"?>
 <p:sld xmlns:a="http://schemas.openxmlformats.org/drawingml/2006/main" xmlns:r="http://schemas.openxmlformats.org/officeDocument/2006/relationships" xmlns:p="http://schemas.openxmlformats.org/presentationml/2006/main">
   <p:cSld>
     <p:spTree>
@@ -4570,7 +5179,7 @@
 </p:sld>
 </file>
 
-<file path=ppt/slides/slide6.xml><?xml version="1.0" encoding="utf-8"?>
+<file path=ppt/slides/slide8.xml><?xml version="1.0" encoding="utf-8"?>
 <p:sld xmlns:a="http://schemas.openxmlformats.org/drawingml/2006/main" xmlns:r="http://schemas.openxmlformats.org/officeDocument/2006/relationships" xmlns:p="http://schemas.openxmlformats.org/presentationml/2006/main">
   <p:cSld>
     <p:spTree>
@@ -5756,7 +6365,7 @@
 </p:sld>
 </file>
 
-<file path=ppt/slides/slide7.xml><?xml version="1.0" encoding="utf-8"?>
+<file path=ppt/slides/slide9.xml><?xml version="1.0" encoding="utf-8"?>
 <p:sld xmlns:a="http://schemas.openxmlformats.org/drawingml/2006/main" xmlns:r="http://schemas.openxmlformats.org/officeDocument/2006/relationships" xmlns:p="http://schemas.openxmlformats.org/presentationml/2006/main">
   <p:cSld>
     <p:spTree>
@@ -5785,101 +6394,615 @@
         </p:nvSpPr>
         <p:spPr/>
         <p:txBody>
-          <a:bodyPr/>
-          <a:lstStyle/>
-          <a:p>
-            <a:r>
-              <a:rPr lang="en-US" dirty="0" smtClean="0"/>
-              <a:t>Datasets Utilized</a:t>
-            </a:r>
-            <a:endParaRPr lang="en-US" dirty="0"/>
-          </a:p>
-        </p:txBody>
-      </p:sp>
-      <p:sp>
-        <p:nvSpPr>
-          <p:cNvPr id="3" name="Content Placeholder 2"/>
-          <p:cNvSpPr>
-            <a:spLocks noGrp="1"/>
-          </p:cNvSpPr>
-          <p:nvPr>
-            <p:ph idx="1"/>
-          </p:nvPr>
-        </p:nvSpPr>
-        <p:spPr/>
-        <p:txBody>
           <a:bodyPr>
-            <a:normAutofit fontScale="92500" lnSpcReduction="20000"/>
+            <a:normAutofit/>
           </a:bodyPr>
           <a:lstStyle/>
           <a:p>
             <a:r>
-              <a:rPr lang="en-US" dirty="0" smtClean="0"/>
-              <a:t>EMS API</a:t>
-            </a:r>
+              <a:rPr lang="en-US" b="1" dirty="0"/>
+              <a:t>Lost and Found </a:t>
+            </a:r>
+            <a:r>
+              <a:rPr lang="en-US" b="1" dirty="0" smtClean="0"/>
+              <a:t>Module</a:t>
+            </a:r>
+            <a:endParaRPr lang="en-US" dirty="0"/>
+          </a:p>
+        </p:txBody>
+      </p:sp>
+      <p:sp>
+        <p:nvSpPr>
+          <p:cNvPr id="4" name="Text Placeholder 3"/>
+          <p:cNvSpPr>
+            <a:spLocks noGrp="1"/>
+          </p:cNvSpPr>
+          <p:nvPr>
+            <p:ph idx="1"/>
+          </p:nvPr>
+        </p:nvSpPr>
+        <p:spPr/>
+        <p:txBody>
+          <a:bodyPr>
+            <a:normAutofit lnSpcReduction="10000"/>
+          </a:bodyPr>
+          <a:lstStyle/>
+          <a:p>
+            <a:r>
+              <a:rPr lang="en-US" sz="2000" dirty="0" smtClean="0"/>
+              <a:t>Requested </a:t>
+            </a:r>
+            <a:r>
+              <a:rPr lang="en-US" sz="2000" dirty="0" smtClean="0"/>
+              <a:t>by the </a:t>
+            </a:r>
+            <a:r>
+              <a:rPr lang="en-US" sz="2000" dirty="0" smtClean="0"/>
+              <a:t>University</a:t>
+            </a:r>
+            <a:endParaRPr lang="en-US" sz="2000" dirty="0" smtClean="0"/>
+          </a:p>
+          <a:p>
+            <a:r>
+              <a:rPr lang="en-US" sz="2000" dirty="0" smtClean="0"/>
+              <a:t>LDAP </a:t>
+            </a:r>
+            <a:r>
+              <a:rPr lang="en-US" sz="2000" dirty="0" smtClean="0"/>
+              <a:t>credential </a:t>
+            </a:r>
+            <a:r>
+              <a:rPr lang="en-US" sz="2000" dirty="0" smtClean="0"/>
+              <a:t>connections</a:t>
+            </a:r>
+            <a:endParaRPr lang="en-US" sz="2000" dirty="0"/>
+          </a:p>
+          <a:p>
+            <a:r>
+              <a:rPr lang="en-US" sz="2000" dirty="0" smtClean="0"/>
+              <a:t>Cross </a:t>
+            </a:r>
+            <a:r>
+              <a:rPr lang="en-US" sz="2000" dirty="0" smtClean="0"/>
+              <a:t>referenced tables for item id and </a:t>
+            </a:r>
+            <a:r>
+              <a:rPr lang="en-US" sz="2000" dirty="0" smtClean="0"/>
+              <a:t>status’</a:t>
+            </a:r>
+          </a:p>
+          <a:p>
+            <a:r>
+              <a:rPr lang="en-US" sz="2000" dirty="0" smtClean="0"/>
+              <a:t>Item </a:t>
+            </a:r>
+            <a:r>
+              <a:rPr lang="en-US" sz="2000" dirty="0" smtClean="0"/>
+              <a:t>types became a challenge </a:t>
+            </a:r>
+            <a:endParaRPr lang="en-US" sz="2000" dirty="0" smtClean="0"/>
+          </a:p>
+          <a:p>
+            <a:r>
+              <a:rPr lang="en-US" sz="2000" dirty="0"/>
+              <a:t>Lost Item Types </a:t>
+            </a:r>
+            <a:endParaRPr lang="en-US" sz="2000" dirty="0" smtClean="0"/>
           </a:p>
           <a:p>
             <a:pPr lvl="1"/>
             <a:r>
-              <a:rPr lang="en-US" dirty="0" smtClean="0"/>
-              <a:t>Event Management System for the Missouri Student Unions</a:t>
+              <a:rPr lang="en-US" sz="1600" dirty="0" smtClean="0"/>
+              <a:t> </a:t>
+            </a:r>
+            <a:r>
+              <a:rPr lang="en-US" sz="2000" dirty="0"/>
+              <a:t>Common types (Phone, Laptop, Jacket</a:t>
+            </a:r>
+            <a:r>
+              <a:rPr lang="en-US" sz="2000" dirty="0" smtClean="0"/>
+              <a:t>)</a:t>
             </a:r>
           </a:p>
           <a:p>
             <a:pPr lvl="1"/>
             <a:r>
-              <a:rPr lang="en-US" dirty="0" smtClean="0"/>
-              <a:t>Event Spaces </a:t>
-            </a:r>
-            <a:r>
-              <a:rPr lang="en-US" smtClean="0"/>
-              <a:t>&amp; Meeting Times</a:t>
-            </a:r>
-            <a:endParaRPr lang="en-US" dirty="0" smtClean="0"/>
-          </a:p>
-          <a:p>
-            <a:r>
-              <a:rPr lang="en-US" dirty="0" err="1" smtClean="0"/>
-              <a:t>PostgresSQL</a:t>
-            </a:r>
-            <a:r>
-              <a:rPr lang="en-US" dirty="0" smtClean="0"/>
-              <a:t> Database</a:t>
-            </a:r>
-          </a:p>
-          <a:p>
-            <a:pPr lvl="1"/>
-            <a:r>
-              <a:rPr lang="en-US" dirty="0" smtClean="0"/>
-              <a:t>Lost &amp; Found</a:t>
-            </a:r>
-          </a:p>
-          <a:p>
-            <a:pPr lvl="1"/>
-            <a:r>
-              <a:rPr lang="en-US" dirty="0" smtClean="0"/>
-              <a:t>Policies &amp; Procedures</a:t>
-            </a:r>
-          </a:p>
-          <a:p>
-            <a:pPr lvl="1"/>
-            <a:r>
-              <a:rPr lang="en-US" dirty="0" smtClean="0"/>
-              <a:t>Event Space Features and Building Attractions</a:t>
-            </a:r>
+              <a:rPr lang="en-US" sz="2000" dirty="0" smtClean="0"/>
+              <a:t> </a:t>
+            </a:r>
+            <a:r>
+              <a:rPr lang="en-US" sz="2000" dirty="0"/>
+              <a:t>Uncommon (Food, Wife</a:t>
+            </a:r>
+            <a:r>
+              <a:rPr lang="en-US" sz="2000" dirty="0" smtClean="0"/>
+              <a:t>)</a:t>
+            </a:r>
+          </a:p>
+          <a:p>
+            <a:pPr lvl="2"/>
+            <a:r>
+              <a:rPr lang="en-US" sz="2000" dirty="0" smtClean="0"/>
+              <a:t>Option </a:t>
+            </a:r>
+            <a:r>
+              <a:rPr lang="en-US" sz="2000" dirty="0"/>
+              <a:t>for new </a:t>
+            </a:r>
+            <a:r>
+              <a:rPr lang="en-US" sz="2000" dirty="0" smtClean="0"/>
+              <a:t>types</a:t>
+            </a:r>
+          </a:p>
+          <a:p>
+            <a:pPr lvl="2"/>
+            <a:r>
+              <a:rPr lang="en-US" sz="2000" dirty="0" smtClean="0"/>
+              <a:t>Admin Approval</a:t>
+            </a:r>
+          </a:p>
+          <a:p>
+            <a:pPr lvl="2"/>
+            <a:r>
+              <a:rPr lang="en-US" sz="2000" dirty="0" smtClean="0"/>
+              <a:t>Admin </a:t>
+            </a:r>
+            <a:r>
+              <a:rPr lang="en-US" sz="2000" dirty="0"/>
+              <a:t>interface</a:t>
+            </a:r>
+          </a:p>
+          <a:p>
+            <a:endParaRPr lang="en-US" sz="2000" dirty="0" smtClean="0"/>
           </a:p>
         </p:txBody>
       </p:sp>
     </p:spTree>
     <p:extLst>
       <p:ext uri="{BB962C8B-B14F-4D97-AF65-F5344CB8AC3E}">
-        <p14:creationId xmlns:p14="http://schemas.microsoft.com/office/powerpoint/2010/main" val="968368286"/>
+        <p14:creationId xmlns:p14="http://schemas.microsoft.com/office/powerpoint/2010/main" val="2662477214"/>
       </p:ext>
     </p:extLst>
   </p:cSld>
   <p:clrMapOvr>
     <a:masterClrMapping/>
   </p:clrMapOvr>
+  <p:transition xmlns:p14="http://schemas.microsoft.com/office/powerpoint/2010/main">
+    <p:fade/>
+  </p:transition>
+  <p:timing>
+    <p:tnLst>
+      <p:par>
+        <p:cTn xmlns:p14="http://schemas.microsoft.com/office/powerpoint/2010/main" id="1" dur="indefinite" restart="never" nodeType="tmRoot">
+          <p:childTnLst>
+            <p:seq concurrent="1" nextAc="seek">
+              <p:cTn id="2" dur="indefinite" nodeType="mainSeq">
+                <p:childTnLst>
+                  <p:par>
+                    <p:cTn id="3" fill="hold">
+                      <p:stCondLst>
+                        <p:cond delay="indefinite"/>
+                      </p:stCondLst>
+                      <p:childTnLst>
+                        <p:par>
+                          <p:cTn id="4" fill="hold">
+                            <p:stCondLst>
+                              <p:cond delay="0"/>
+                            </p:stCondLst>
+                            <p:childTnLst>
+                              <p:par>
+                                <p:cTn id="5" presetID="1" presetClass="entr" presetSubtype="0" fill="hold" grpId="1" nodeType="clickEffect">
+                                  <p:stCondLst>
+                                    <p:cond delay="0"/>
+                                  </p:stCondLst>
+                                  <p:childTnLst>
+                                    <p:set>
+                                      <p:cBhvr>
+                                        <p:cTn id="6" dur="1" fill="hold">
+                                          <p:stCondLst>
+                                            <p:cond delay="0"/>
+                                          </p:stCondLst>
+                                        </p:cTn>
+                                        <p:tgtEl>
+                                          <p:spTgt spid="4">
+                                            <p:txEl>
+                                              <p:pRg st="0" end="0"/>
+                                            </p:txEl>
+                                          </p:spTgt>
+                                        </p:tgtEl>
+                                        <p:attrNameLst>
+                                          <p:attrName>style.visibility</p:attrName>
+                                        </p:attrNameLst>
+                                      </p:cBhvr>
+                                      <p:to>
+                                        <p:strVal val="visible"/>
+                                      </p:to>
+                                    </p:set>
+                                  </p:childTnLst>
+                                </p:cTn>
+                              </p:par>
+                            </p:childTnLst>
+                          </p:cTn>
+                        </p:par>
+                      </p:childTnLst>
+                    </p:cTn>
+                  </p:par>
+                  <p:par>
+                    <p:cTn id="7" fill="hold">
+                      <p:stCondLst>
+                        <p:cond delay="indefinite"/>
+                      </p:stCondLst>
+                      <p:childTnLst>
+                        <p:par>
+                          <p:cTn id="8" fill="hold">
+                            <p:stCondLst>
+                              <p:cond delay="0"/>
+                            </p:stCondLst>
+                            <p:childTnLst>
+                              <p:par>
+                                <p:cTn id="9" presetID="1" presetClass="entr" presetSubtype="0" fill="hold" grpId="1" nodeType="clickEffect">
+                                  <p:stCondLst>
+                                    <p:cond delay="0"/>
+                                  </p:stCondLst>
+                                  <p:childTnLst>
+                                    <p:set>
+                                      <p:cBhvr>
+                                        <p:cTn id="10" dur="1" fill="hold">
+                                          <p:stCondLst>
+                                            <p:cond delay="0"/>
+                                          </p:stCondLst>
+                                        </p:cTn>
+                                        <p:tgtEl>
+                                          <p:spTgt spid="4">
+                                            <p:txEl>
+                                              <p:pRg st="1" end="1"/>
+                                            </p:txEl>
+                                          </p:spTgt>
+                                        </p:tgtEl>
+                                        <p:attrNameLst>
+                                          <p:attrName>style.visibility</p:attrName>
+                                        </p:attrNameLst>
+                                      </p:cBhvr>
+                                      <p:to>
+                                        <p:strVal val="visible"/>
+                                      </p:to>
+                                    </p:set>
+                                  </p:childTnLst>
+                                </p:cTn>
+                              </p:par>
+                            </p:childTnLst>
+                          </p:cTn>
+                        </p:par>
+                      </p:childTnLst>
+                    </p:cTn>
+                  </p:par>
+                  <p:par>
+                    <p:cTn id="11" fill="hold">
+                      <p:stCondLst>
+                        <p:cond delay="indefinite"/>
+                      </p:stCondLst>
+                      <p:childTnLst>
+                        <p:par>
+                          <p:cTn id="12" fill="hold">
+                            <p:stCondLst>
+                              <p:cond delay="0"/>
+                            </p:stCondLst>
+                            <p:childTnLst>
+                              <p:par>
+                                <p:cTn id="13" presetID="1" presetClass="entr" presetSubtype="0" fill="hold" grpId="1" nodeType="clickEffect">
+                                  <p:stCondLst>
+                                    <p:cond delay="0"/>
+                                  </p:stCondLst>
+                                  <p:childTnLst>
+                                    <p:set>
+                                      <p:cBhvr>
+                                        <p:cTn id="14" dur="1" fill="hold">
+                                          <p:stCondLst>
+                                            <p:cond delay="0"/>
+                                          </p:stCondLst>
+                                        </p:cTn>
+                                        <p:tgtEl>
+                                          <p:spTgt spid="4">
+                                            <p:txEl>
+                                              <p:pRg st="2" end="2"/>
+                                            </p:txEl>
+                                          </p:spTgt>
+                                        </p:tgtEl>
+                                        <p:attrNameLst>
+                                          <p:attrName>style.visibility</p:attrName>
+                                        </p:attrNameLst>
+                                      </p:cBhvr>
+                                      <p:to>
+                                        <p:strVal val="visible"/>
+                                      </p:to>
+                                    </p:set>
+                                  </p:childTnLst>
+                                </p:cTn>
+                              </p:par>
+                            </p:childTnLst>
+                          </p:cTn>
+                        </p:par>
+                      </p:childTnLst>
+                    </p:cTn>
+                  </p:par>
+                  <p:par>
+                    <p:cTn id="15" fill="hold">
+                      <p:stCondLst>
+                        <p:cond delay="indefinite"/>
+                      </p:stCondLst>
+                      <p:childTnLst>
+                        <p:par>
+                          <p:cTn id="16" fill="hold">
+                            <p:stCondLst>
+                              <p:cond delay="0"/>
+                            </p:stCondLst>
+                            <p:childTnLst>
+                              <p:par>
+                                <p:cTn id="17" presetID="1" presetClass="entr" presetSubtype="0" fill="hold" grpId="1" nodeType="clickEffect">
+                                  <p:stCondLst>
+                                    <p:cond delay="0"/>
+                                  </p:stCondLst>
+                                  <p:childTnLst>
+                                    <p:set>
+                                      <p:cBhvr>
+                                        <p:cTn id="18" dur="1" fill="hold">
+                                          <p:stCondLst>
+                                            <p:cond delay="0"/>
+                                          </p:stCondLst>
+                                        </p:cTn>
+                                        <p:tgtEl>
+                                          <p:spTgt spid="4">
+                                            <p:txEl>
+                                              <p:pRg st="3" end="3"/>
+                                            </p:txEl>
+                                          </p:spTgt>
+                                        </p:tgtEl>
+                                        <p:attrNameLst>
+                                          <p:attrName>style.visibility</p:attrName>
+                                        </p:attrNameLst>
+                                      </p:cBhvr>
+                                      <p:to>
+                                        <p:strVal val="visible"/>
+                                      </p:to>
+                                    </p:set>
+                                  </p:childTnLst>
+                                </p:cTn>
+                              </p:par>
+                            </p:childTnLst>
+                          </p:cTn>
+                        </p:par>
+                      </p:childTnLst>
+                    </p:cTn>
+                  </p:par>
+                  <p:par>
+                    <p:cTn id="19" fill="hold">
+                      <p:stCondLst>
+                        <p:cond delay="indefinite"/>
+                      </p:stCondLst>
+                      <p:childTnLst>
+                        <p:par>
+                          <p:cTn id="20" fill="hold">
+                            <p:stCondLst>
+                              <p:cond delay="0"/>
+                            </p:stCondLst>
+                            <p:childTnLst>
+                              <p:par>
+                                <p:cTn id="21" presetID="1" presetClass="entr" presetSubtype="0" fill="hold" grpId="1" nodeType="clickEffect">
+                                  <p:stCondLst>
+                                    <p:cond delay="0"/>
+                                  </p:stCondLst>
+                                  <p:childTnLst>
+                                    <p:set>
+                                      <p:cBhvr>
+                                        <p:cTn id="22" dur="1" fill="hold">
+                                          <p:stCondLst>
+                                            <p:cond delay="0"/>
+                                          </p:stCondLst>
+                                        </p:cTn>
+                                        <p:tgtEl>
+                                          <p:spTgt spid="4">
+                                            <p:txEl>
+                                              <p:pRg st="4" end="4"/>
+                                            </p:txEl>
+                                          </p:spTgt>
+                                        </p:tgtEl>
+                                        <p:attrNameLst>
+                                          <p:attrName>style.visibility</p:attrName>
+                                        </p:attrNameLst>
+                                      </p:cBhvr>
+                                      <p:to>
+                                        <p:strVal val="visible"/>
+                                      </p:to>
+                                    </p:set>
+                                  </p:childTnLst>
+                                </p:cTn>
+                              </p:par>
+                              <p:par>
+                                <p:cTn id="23" presetID="1" presetClass="entr" presetSubtype="0" fill="hold" grpId="1" nodeType="withEffect">
+                                  <p:stCondLst>
+                                    <p:cond delay="0"/>
+                                  </p:stCondLst>
+                                  <p:childTnLst>
+                                    <p:set>
+                                      <p:cBhvr>
+                                        <p:cTn id="24" dur="1" fill="hold">
+                                          <p:stCondLst>
+                                            <p:cond delay="0"/>
+                                          </p:stCondLst>
+                                        </p:cTn>
+                                        <p:tgtEl>
+                                          <p:spTgt spid="4">
+                                            <p:txEl>
+                                              <p:pRg st="5" end="5"/>
+                                            </p:txEl>
+                                          </p:spTgt>
+                                        </p:tgtEl>
+                                        <p:attrNameLst>
+                                          <p:attrName>style.visibility</p:attrName>
+                                        </p:attrNameLst>
+                                      </p:cBhvr>
+                                      <p:to>
+                                        <p:strVal val="visible"/>
+                                      </p:to>
+                                    </p:set>
+                                  </p:childTnLst>
+                                </p:cTn>
+                              </p:par>
+                              <p:par>
+                                <p:cTn id="25" presetID="1" presetClass="entr" presetSubtype="0" fill="hold" grpId="1" nodeType="withEffect">
+                                  <p:stCondLst>
+                                    <p:cond delay="0"/>
+                                  </p:stCondLst>
+                                  <p:childTnLst>
+                                    <p:set>
+                                      <p:cBhvr>
+                                        <p:cTn id="26" dur="1" fill="hold">
+                                          <p:stCondLst>
+                                            <p:cond delay="0"/>
+                                          </p:stCondLst>
+                                        </p:cTn>
+                                        <p:tgtEl>
+                                          <p:spTgt spid="4">
+                                            <p:txEl>
+                                              <p:pRg st="6" end="6"/>
+                                            </p:txEl>
+                                          </p:spTgt>
+                                        </p:tgtEl>
+                                        <p:attrNameLst>
+                                          <p:attrName>style.visibility</p:attrName>
+                                        </p:attrNameLst>
+                                      </p:cBhvr>
+                                      <p:to>
+                                        <p:strVal val="visible"/>
+                                      </p:to>
+                                    </p:set>
+                                  </p:childTnLst>
+                                </p:cTn>
+                              </p:par>
+                              <p:par>
+                                <p:cTn id="27" presetID="1" presetClass="entr" presetSubtype="0" fill="hold" grpId="1" nodeType="withEffect">
+                                  <p:stCondLst>
+                                    <p:cond delay="0"/>
+                                  </p:stCondLst>
+                                  <p:childTnLst>
+                                    <p:set>
+                                      <p:cBhvr>
+                                        <p:cTn id="28" dur="1" fill="hold">
+                                          <p:stCondLst>
+                                            <p:cond delay="0"/>
+                                          </p:stCondLst>
+                                        </p:cTn>
+                                        <p:tgtEl>
+                                          <p:spTgt spid="4">
+                                            <p:txEl>
+                                              <p:pRg st="7" end="7"/>
+                                            </p:txEl>
+                                          </p:spTgt>
+                                        </p:tgtEl>
+                                        <p:attrNameLst>
+                                          <p:attrName>style.visibility</p:attrName>
+                                        </p:attrNameLst>
+                                      </p:cBhvr>
+                                      <p:to>
+                                        <p:strVal val="visible"/>
+                                      </p:to>
+                                    </p:set>
+                                  </p:childTnLst>
+                                </p:cTn>
+                              </p:par>
+                              <p:par>
+                                <p:cTn id="29" presetID="1" presetClass="entr" presetSubtype="0" fill="hold" grpId="1" nodeType="withEffect">
+                                  <p:stCondLst>
+                                    <p:cond delay="0"/>
+                                  </p:stCondLst>
+                                  <p:childTnLst>
+                                    <p:set>
+                                      <p:cBhvr>
+                                        <p:cTn id="30" dur="1" fill="hold">
+                                          <p:stCondLst>
+                                            <p:cond delay="0"/>
+                                          </p:stCondLst>
+                                        </p:cTn>
+                                        <p:tgtEl>
+                                          <p:spTgt spid="4">
+                                            <p:txEl>
+                                              <p:pRg st="8" end="8"/>
+                                            </p:txEl>
+                                          </p:spTgt>
+                                        </p:tgtEl>
+                                        <p:attrNameLst>
+                                          <p:attrName>style.visibility</p:attrName>
+                                        </p:attrNameLst>
+                                      </p:cBhvr>
+                                      <p:to>
+                                        <p:strVal val="visible"/>
+                                      </p:to>
+                                    </p:set>
+                                  </p:childTnLst>
+                                </p:cTn>
+                              </p:par>
+                              <p:par>
+                                <p:cTn id="31" presetID="1" presetClass="entr" presetSubtype="0" fill="hold" grpId="1" nodeType="withEffect">
+                                  <p:stCondLst>
+                                    <p:cond delay="0"/>
+                                  </p:stCondLst>
+                                  <p:childTnLst>
+                                    <p:set>
+                                      <p:cBhvr>
+                                        <p:cTn id="32" dur="1" fill="hold">
+                                          <p:stCondLst>
+                                            <p:cond delay="0"/>
+                                          </p:stCondLst>
+                                        </p:cTn>
+                                        <p:tgtEl>
+                                          <p:spTgt spid="4">
+                                            <p:txEl>
+                                              <p:pRg st="9" end="9"/>
+                                            </p:txEl>
+                                          </p:spTgt>
+                                        </p:tgtEl>
+                                        <p:attrNameLst>
+                                          <p:attrName>style.visibility</p:attrName>
+                                        </p:attrNameLst>
+                                      </p:cBhvr>
+                                      <p:to>
+                                        <p:strVal val="visible"/>
+                                      </p:to>
+                                    </p:set>
+                                  </p:childTnLst>
+                                </p:cTn>
+                              </p:par>
+                            </p:childTnLst>
+                          </p:cTn>
+                        </p:par>
+                      </p:childTnLst>
+                    </p:cTn>
+                  </p:par>
+                </p:childTnLst>
+              </p:cTn>
+              <p:prevCondLst>
+                <p:cond evt="onPrev" delay="0">
+                  <p:tgtEl>
+                    <p:sldTgt/>
+                  </p:tgtEl>
+                </p:cond>
+              </p:prevCondLst>
+              <p:nextCondLst>
+                <p:cond evt="onNext" delay="0">
+                  <p:tgtEl>
+                    <p:sldTgt/>
+                  </p:tgtEl>
+                </p:cond>
+              </p:nextCondLst>
+            </p:seq>
+          </p:childTnLst>
+        </p:cTn>
+      </p:par>
+    </p:tnLst>
+    <p:bldLst>
+      <p:bldP spid="4" grpId="1" build="p"/>
+    </p:bldLst>
+  </p:timing>
 </p:sld>
 </file>
 

</xml_diff>

<commit_message>
Updated with Buildings and Features slides (2)
</commit_message>
<xml_diff>
--- a/babbage/powerpoint/Group18 Presentation.pptx
+++ b/babbage/powerpoint/Group18 Presentation.pptx
@@ -6,10 +6,16 @@
   </p:sldMasterIdLst>
   <p:sldIdLst>
     <p:sldId id="256" r:id="rId2"/>
-    <p:sldId id="260" r:id="rId3"/>
-    <p:sldId id="259" r:id="rId4"/>
-    <p:sldId id="257" r:id="rId5"/>
-    <p:sldId id="258" r:id="rId6"/>
+    <p:sldId id="262" r:id="rId3"/>
+    <p:sldId id="260" r:id="rId4"/>
+    <p:sldId id="261" r:id="rId5"/>
+    <p:sldId id="263" r:id="rId6"/>
+    <p:sldId id="259" r:id="rId7"/>
+    <p:sldId id="257" r:id="rId8"/>
+    <p:sldId id="258" r:id="rId9"/>
+    <p:sldId id="264" r:id="rId10"/>
+    <p:sldId id="265" r:id="rId11"/>
+    <p:sldId id="266" r:id="rId12"/>
   </p:sldIdLst>
   <p:sldSz cx="9144000" cy="6858000" type="screen4x3"/>
   <p:notesSz cx="6858000" cy="9144000"/>
@@ -111,14 +117,21 @@
   <p:extLst>
     <p:ext uri="{521415D9-36F7-43E2-AB2F-B90AF26B5E84}">
       <p14:sectionLst xmlns:p14="http://schemas.microsoft.com/office/powerpoint/2010/main">
-        <p14:section name="Opening" id="{891F661E-DE42-5B49-BA88-1D4106BE2C4B}">
+        <p14:section name="Opening &amp; Overview" id="{891F661E-DE42-5B49-BA88-1D4106BE2C4B}">
           <p14:sldIdLst>
             <p14:sldId id="256"/>
+            <p14:sldId id="262"/>
           </p14:sldIdLst>
         </p14:section>
         <p14:section name="Technologies" id="{2E34024E-3150-954F-AEC8-F72BA0715EB9}">
           <p14:sldIdLst>
             <p14:sldId id="260"/>
+          </p14:sldIdLst>
+        </p14:section>
+        <p14:section name="Datasets" id="{3CA54D6D-4E1E-D244-BD00-5AAC20E5B3FA}">
+          <p14:sldIdLst>
+            <p14:sldId id="261"/>
+            <p14:sldId id="263"/>
           </p14:sldIdLst>
         </p14:section>
         <p14:section name="CSS/Menu" id="{B7D230E2-ED78-C74A-A978-20BA6CB7001B}">
@@ -130,6 +143,13 @@
           <p14:sldIdLst>
             <p14:sldId id="257"/>
             <p14:sldId id="258"/>
+          </p14:sldIdLst>
+        </p14:section>
+        <p14:section name="Lost &amp; Found" id="{7DC7A3DC-6434-934F-8600-70803678AD29}">
+          <p14:sldIdLst>
+            <p14:sldId id="264"/>
+            <p14:sldId id="265"/>
+            <p14:sldId id="266"/>
           </p14:sldIdLst>
         </p14:section>
       </p14:sectionLst>
@@ -319,7 +339,7 @@
           <a:p>
             <a:fld id="{6BFECD78-3C8E-49F2-8FAB-59489D168ABB}" type="datetimeFigureOut">
               <a:rPr lang="en-US" smtClean="0"/>
-              <a:t>11/30/14</a:t>
+              <a:t>12/1/14</a:t>
             </a:fld>
             <a:endParaRPr lang="en-US"/>
           </a:p>
@@ -489,7 +509,7 @@
           <a:p>
             <a:fld id="{6BFECD78-3C8E-49F2-8FAB-59489D168ABB}" type="datetimeFigureOut">
               <a:rPr lang="en-US" smtClean="0"/>
-              <a:t>11/30/14</a:t>
+              <a:t>12/1/14</a:t>
             </a:fld>
             <a:endParaRPr lang="en-US"/>
           </a:p>
@@ -669,7 +689,7 @@
           <a:p>
             <a:fld id="{6BFECD78-3C8E-49F2-8FAB-59489D168ABB}" type="datetimeFigureOut">
               <a:rPr lang="en-US" smtClean="0"/>
-              <a:t>11/30/14</a:t>
+              <a:t>12/1/14</a:t>
             </a:fld>
             <a:endParaRPr lang="en-US"/>
           </a:p>
@@ -839,7 +859,7 @@
           <a:p>
             <a:fld id="{6BFECD78-3C8E-49F2-8FAB-59489D168ABB}" type="datetimeFigureOut">
               <a:rPr lang="en-US" smtClean="0"/>
-              <a:t>11/30/14</a:t>
+              <a:t>12/1/14</a:t>
             </a:fld>
             <a:endParaRPr lang="en-US"/>
           </a:p>
@@ -1085,7 +1105,7 @@
           <a:p>
             <a:fld id="{6BFECD78-3C8E-49F2-8FAB-59489D168ABB}" type="datetimeFigureOut">
               <a:rPr lang="en-US" smtClean="0"/>
-              <a:t>11/30/14</a:t>
+              <a:t>12/1/14</a:t>
             </a:fld>
             <a:endParaRPr lang="en-US"/>
           </a:p>
@@ -1373,7 +1393,7 @@
           <a:p>
             <a:fld id="{6BFECD78-3C8E-49F2-8FAB-59489D168ABB}" type="datetimeFigureOut">
               <a:rPr lang="en-US" smtClean="0"/>
-              <a:t>11/30/14</a:t>
+              <a:t>12/1/14</a:t>
             </a:fld>
             <a:endParaRPr lang="en-US"/>
           </a:p>
@@ -1795,7 +1815,7 @@
           <a:p>
             <a:fld id="{6BFECD78-3C8E-49F2-8FAB-59489D168ABB}" type="datetimeFigureOut">
               <a:rPr lang="en-US" smtClean="0"/>
-              <a:t>11/30/14</a:t>
+              <a:t>12/1/14</a:t>
             </a:fld>
             <a:endParaRPr lang="en-US"/>
           </a:p>
@@ -1913,7 +1933,7 @@
           <a:p>
             <a:fld id="{6BFECD78-3C8E-49F2-8FAB-59489D168ABB}" type="datetimeFigureOut">
               <a:rPr lang="en-US" smtClean="0"/>
-              <a:t>11/30/14</a:t>
+              <a:t>12/1/14</a:t>
             </a:fld>
             <a:endParaRPr lang="en-US"/>
           </a:p>
@@ -2008,7 +2028,7 @@
           <a:p>
             <a:fld id="{6BFECD78-3C8E-49F2-8FAB-59489D168ABB}" type="datetimeFigureOut">
               <a:rPr lang="en-US" smtClean="0"/>
-              <a:t>11/30/14</a:t>
+              <a:t>12/1/14</a:t>
             </a:fld>
             <a:endParaRPr lang="en-US"/>
           </a:p>
@@ -2285,7 +2305,7 @@
           <a:p>
             <a:fld id="{6BFECD78-3C8E-49F2-8FAB-59489D168ABB}" type="datetimeFigureOut">
               <a:rPr lang="en-US" smtClean="0"/>
-              <a:t>11/30/14</a:t>
+              <a:t>12/1/14</a:t>
             </a:fld>
             <a:endParaRPr lang="en-US"/>
           </a:p>
@@ -2542,7 +2562,7 @@
           <a:p>
             <a:fld id="{6BFECD78-3C8E-49F2-8FAB-59489D168ABB}" type="datetimeFigureOut">
               <a:rPr lang="en-US" smtClean="0"/>
-              <a:t>11/30/14</a:t>
+              <a:t>12/1/14</a:t>
             </a:fld>
             <a:endParaRPr lang="en-US"/>
           </a:p>
@@ -2761,7 +2781,7 @@
             <a:fld id="{6BFECD78-3C8E-49F2-8FAB-59489D168ABB}" type="datetimeFigureOut">
               <a:rPr lang="en-US" smtClean="0"/>
               <a:pPr/>
-              <a:t>11/30/14</a:t>
+              <a:t>12/1/14</a:t>
             </a:fld>
             <a:endParaRPr lang="en-US"/>
           </a:p>
@@ -3214,6 +3234,249 @@
 </p:sld>
 </file>
 
+<file path=ppt/slides/slide10.xml><?xml version="1.0" encoding="utf-8"?>
+<p:sld xmlns:a="http://schemas.openxmlformats.org/drawingml/2006/main" xmlns:r="http://schemas.openxmlformats.org/officeDocument/2006/relationships" xmlns:p="http://schemas.openxmlformats.org/presentationml/2006/main">
+  <p:cSld>
+    <p:spTree>
+      <p:nvGrpSpPr>
+        <p:cNvPr id="1" name=""/>
+        <p:cNvGrpSpPr/>
+        <p:nvPr/>
+      </p:nvGrpSpPr>
+      <p:grpSpPr>
+        <a:xfrm>
+          <a:off x="0" y="0"/>
+          <a:ext cx="0" cy="0"/>
+          <a:chOff x="0" y="0"/>
+          <a:chExt cx="0" cy="0"/>
+        </a:xfrm>
+      </p:grpSpPr>
+      <p:sp>
+        <p:nvSpPr>
+          <p:cNvPr id="2" name="Title 1"/>
+          <p:cNvSpPr>
+            <a:spLocks noGrp="1"/>
+          </p:cNvSpPr>
+          <p:nvPr>
+            <p:ph type="title"/>
+          </p:nvPr>
+        </p:nvSpPr>
+        <p:spPr/>
+        <p:txBody>
+          <a:bodyPr/>
+          <a:lstStyle/>
+          <a:p>
+            <a:r>
+              <a:rPr lang="en-US" dirty="0" smtClean="0"/>
+              <a:t>Buildings and Features</a:t>
+            </a:r>
+            <a:endParaRPr lang="en-US" dirty="0"/>
+          </a:p>
+        </p:txBody>
+      </p:sp>
+      <p:sp>
+        <p:nvSpPr>
+          <p:cNvPr id="3" name="Content Placeholder 2"/>
+          <p:cNvSpPr>
+            <a:spLocks noGrp="1"/>
+          </p:cNvSpPr>
+          <p:nvPr>
+            <p:ph idx="1"/>
+          </p:nvPr>
+        </p:nvSpPr>
+        <p:spPr/>
+        <p:txBody>
+          <a:bodyPr/>
+          <a:lstStyle/>
+          <a:p>
+            <a:r>
+              <a:rPr lang="en-US" sz="2400" dirty="0" smtClean="0"/>
+              <a:t> 2 Buildings, 7 floors, 12 restaurants, and 60 features.</a:t>
+            </a:r>
+          </a:p>
+          <a:p>
+            <a:r>
+              <a:rPr lang="en-US" sz="2400" dirty="0" smtClean="0"/>
+              <a:t>Pull data dynamically from </a:t>
+            </a:r>
+            <a:r>
+              <a:rPr lang="en-US" sz="2400" dirty="0" err="1" smtClean="0"/>
+              <a:t>postgreSQL</a:t>
+            </a:r>
+            <a:r>
+              <a:rPr lang="en-US" sz="2400" dirty="0" smtClean="0"/>
+              <a:t> </a:t>
+            </a:r>
+          </a:p>
+          <a:p>
+            <a:pPr lvl="1"/>
+            <a:r>
+              <a:rPr lang="en-US" sz="2000" dirty="0" smtClean="0"/>
+              <a:t>Display by building name, floor level</a:t>
+            </a:r>
+          </a:p>
+          <a:p>
+            <a:r>
+              <a:rPr lang="en-US" sz="2400" dirty="0" smtClean="0"/>
+              <a:t>Order Data</a:t>
+            </a:r>
+          </a:p>
+          <a:p>
+            <a:r>
+              <a:rPr lang="en-US" sz="2400" dirty="0" smtClean="0"/>
+              <a:t>SELECT statements and INNER JOINS </a:t>
+            </a:r>
+          </a:p>
+          <a:p>
+            <a:pPr marL="0" indent="0">
+              <a:buNone/>
+            </a:pPr>
+            <a:endParaRPr lang="en-US" sz="2400" dirty="0" smtClean="0"/>
+          </a:p>
+          <a:p>
+            <a:endParaRPr lang="en-US" dirty="0"/>
+          </a:p>
+        </p:txBody>
+      </p:sp>
+    </p:spTree>
+    <p:extLst>
+      <p:ext uri="{BB962C8B-B14F-4D97-AF65-F5344CB8AC3E}">
+        <p14:creationId xmlns:p14="http://schemas.microsoft.com/office/powerpoint/2010/main" val="3192026903"/>
+      </p:ext>
+    </p:extLst>
+  </p:cSld>
+  <p:clrMapOvr>
+    <a:masterClrMapping/>
+  </p:clrMapOvr>
+</p:sld>
+</file>
+
+<file path=ppt/slides/slide11.xml><?xml version="1.0" encoding="utf-8"?>
+<p:sld xmlns:a="http://schemas.openxmlformats.org/drawingml/2006/main" xmlns:r="http://schemas.openxmlformats.org/officeDocument/2006/relationships" xmlns:p="http://schemas.openxmlformats.org/presentationml/2006/main">
+  <p:cSld>
+    <p:spTree>
+      <p:nvGrpSpPr>
+        <p:cNvPr id="1" name=""/>
+        <p:cNvGrpSpPr/>
+        <p:nvPr/>
+      </p:nvGrpSpPr>
+      <p:grpSpPr>
+        <a:xfrm>
+          <a:off x="0" y="0"/>
+          <a:ext cx="0" cy="0"/>
+          <a:chOff x="0" y="0"/>
+          <a:chExt cx="0" cy="0"/>
+        </a:xfrm>
+      </p:grpSpPr>
+      <p:sp>
+        <p:nvSpPr>
+          <p:cNvPr id="2" name="Title 1"/>
+          <p:cNvSpPr>
+            <a:spLocks noGrp="1"/>
+          </p:cNvSpPr>
+          <p:nvPr>
+            <p:ph type="title"/>
+          </p:nvPr>
+        </p:nvSpPr>
+        <p:spPr>
+          <a:xfrm>
+            <a:off x="457200" y="1395059"/>
+            <a:ext cx="8229600" cy="919973"/>
+          </a:xfrm>
+        </p:spPr>
+        <p:txBody>
+          <a:bodyPr>
+            <a:normAutofit/>
+          </a:bodyPr>
+          <a:lstStyle/>
+          <a:p>
+            <a:r>
+              <a:rPr lang="en-US" sz="3200" dirty="0" smtClean="0"/>
+              <a:t>Restaurants and Attractions</a:t>
+            </a:r>
+            <a:endParaRPr lang="en-US" sz="3200" dirty="0"/>
+          </a:p>
+        </p:txBody>
+      </p:sp>
+      <p:sp>
+        <p:nvSpPr>
+          <p:cNvPr id="3" name="Content Placeholder 2"/>
+          <p:cNvSpPr>
+            <a:spLocks noGrp="1"/>
+          </p:cNvSpPr>
+          <p:nvPr>
+            <p:ph idx="1"/>
+          </p:nvPr>
+        </p:nvSpPr>
+        <p:spPr>
+          <a:xfrm>
+            <a:off x="457200" y="2483603"/>
+            <a:ext cx="8229600" cy="3642562"/>
+          </a:xfrm>
+        </p:spPr>
+        <p:txBody>
+          <a:bodyPr>
+            <a:normAutofit/>
+          </a:bodyPr>
+          <a:lstStyle/>
+          <a:p>
+            <a:r>
+              <a:rPr lang="en-US" sz="2400" dirty="0" smtClean="0"/>
+              <a:t>Load images and all restaurant data from the database</a:t>
+            </a:r>
+          </a:p>
+          <a:p>
+            <a:r>
+              <a:rPr lang="en-US" sz="2400" dirty="0" smtClean="0"/>
+              <a:t>Include links to view information or Hours</a:t>
+            </a:r>
+          </a:p>
+          <a:p>
+            <a:r>
+              <a:rPr lang="en-US" sz="2400" dirty="0" smtClean="0"/>
+              <a:t>Make an administrator be able to Edit </a:t>
+            </a:r>
+          </a:p>
+          <a:p>
+            <a:pPr lvl="1"/>
+            <a:r>
+              <a:rPr lang="en-US" sz="2000" dirty="0" smtClean="0"/>
+              <a:t>Restaurant name/Description</a:t>
+            </a:r>
+          </a:p>
+          <a:p>
+            <a:pPr lvl="1"/>
+            <a:r>
+              <a:rPr lang="en-US" sz="2000" dirty="0" smtClean="0"/>
+              <a:t>Photo Icon</a:t>
+            </a:r>
+          </a:p>
+          <a:p>
+            <a:pPr lvl="1"/>
+            <a:r>
+              <a:rPr lang="en-US" sz="2000" dirty="0" smtClean="0"/>
+              <a:t>Link to menu</a:t>
+            </a:r>
+          </a:p>
+          <a:p>
+            <a:pPr lvl="1"/>
+            <a:endParaRPr lang="en-US" sz="1600" dirty="0"/>
+          </a:p>
+        </p:txBody>
+      </p:sp>
+    </p:spTree>
+    <p:extLst>
+      <p:ext uri="{BB962C8B-B14F-4D97-AF65-F5344CB8AC3E}">
+        <p14:creationId xmlns:p14="http://schemas.microsoft.com/office/powerpoint/2010/main" val="1592323765"/>
+      </p:ext>
+    </p:extLst>
+  </p:cSld>
+  <p:clrMapOvr>
+    <a:masterClrMapping/>
+  </p:clrMapOvr>
+</p:sld>
+</file>
+
 <file path=ppt/slides/slide2.xml><?xml version="1.0" encoding="utf-8"?>
 <p:sld xmlns:a="http://schemas.openxmlformats.org/drawingml/2006/main" xmlns:r="http://schemas.openxmlformats.org/officeDocument/2006/relationships" xmlns:p="http://schemas.openxmlformats.org/presentationml/2006/main">
   <p:cSld>
@@ -3241,6 +3504,112 @@
             <p:ph type="title"/>
           </p:nvPr>
         </p:nvSpPr>
+        <p:spPr/>
+        <p:txBody>
+          <a:bodyPr/>
+          <a:lstStyle/>
+          <a:p>
+            <a:r>
+              <a:rPr lang="en-US" dirty="0" smtClean="0"/>
+              <a:t>Overview</a:t>
+            </a:r>
+            <a:endParaRPr lang="en-US" dirty="0"/>
+          </a:p>
+        </p:txBody>
+      </p:sp>
+      <p:sp>
+        <p:nvSpPr>
+          <p:cNvPr id="3" name="Content Placeholder 2"/>
+          <p:cNvSpPr>
+            <a:spLocks noGrp="1"/>
+          </p:cNvSpPr>
+          <p:nvPr>
+            <p:ph idx="1"/>
+          </p:nvPr>
+        </p:nvSpPr>
+        <p:spPr/>
+        <p:txBody>
+          <a:bodyPr/>
+          <a:lstStyle/>
+          <a:p>
+            <a:r>
+              <a:rPr lang="en-US" dirty="0" smtClean="0"/>
+              <a:t>Cascade Server</a:t>
+            </a:r>
+          </a:p>
+          <a:p>
+            <a:pPr lvl="1"/>
+            <a:r>
+              <a:rPr lang="en-US" dirty="0" smtClean="0"/>
+              <a:t>No SSL Available</a:t>
+            </a:r>
+          </a:p>
+          <a:p>
+            <a:r>
+              <a:rPr lang="en-US" dirty="0" smtClean="0"/>
+              <a:t>Replacement CMS</a:t>
+            </a:r>
+          </a:p>
+          <a:p>
+            <a:r>
+              <a:rPr lang="en-US" dirty="0" smtClean="0"/>
+              <a:t>Unions Admin Portal</a:t>
+            </a:r>
+          </a:p>
+          <a:p>
+            <a:r>
+              <a:rPr lang="en-US" dirty="0" smtClean="0"/>
+              <a:t>Lost &amp; Found Module</a:t>
+            </a:r>
+          </a:p>
+          <a:p>
+            <a:r>
+              <a:rPr lang="en-US" dirty="0" smtClean="0"/>
+              <a:t>User Management</a:t>
+            </a:r>
+          </a:p>
+        </p:txBody>
+      </p:sp>
+    </p:spTree>
+    <p:extLst>
+      <p:ext uri="{BB962C8B-B14F-4D97-AF65-F5344CB8AC3E}">
+        <p14:creationId xmlns:p14="http://schemas.microsoft.com/office/powerpoint/2010/main" val="1927676499"/>
+      </p:ext>
+    </p:extLst>
+  </p:cSld>
+  <p:clrMapOvr>
+    <a:masterClrMapping/>
+  </p:clrMapOvr>
+</p:sld>
+</file>
+
+<file path=ppt/slides/slide3.xml><?xml version="1.0" encoding="utf-8"?>
+<p:sld xmlns:a="http://schemas.openxmlformats.org/drawingml/2006/main" xmlns:r="http://schemas.openxmlformats.org/officeDocument/2006/relationships" xmlns:p="http://schemas.openxmlformats.org/presentationml/2006/main">
+  <p:cSld>
+    <p:spTree>
+      <p:nvGrpSpPr>
+        <p:cNvPr id="1" name=""/>
+        <p:cNvGrpSpPr/>
+        <p:nvPr/>
+      </p:nvGrpSpPr>
+      <p:grpSpPr>
+        <a:xfrm>
+          <a:off x="0" y="0"/>
+          <a:ext cx="0" cy="0"/>
+          <a:chOff x="0" y="0"/>
+          <a:chExt cx="0" cy="0"/>
+        </a:xfrm>
+      </p:grpSpPr>
+      <p:sp>
+        <p:nvSpPr>
+          <p:cNvPr id="2" name="Title 1"/>
+          <p:cNvSpPr>
+            <a:spLocks noGrp="1"/>
+          </p:cNvSpPr>
+          <p:nvPr>
+            <p:ph type="title"/>
+          </p:nvPr>
+        </p:nvSpPr>
         <p:spPr>
           <a:xfrm>
             <a:off x="457200" y="1395059"/>
@@ -3409,7 +3778,201 @@
 </p:sld>
 </file>
 
-<file path=ppt/slides/slide3.xml><?xml version="1.0" encoding="utf-8"?>
+<file path=ppt/slides/slide4.xml><?xml version="1.0" encoding="utf-8"?>
+<p:sld xmlns:a="http://schemas.openxmlformats.org/drawingml/2006/main" xmlns:r="http://schemas.openxmlformats.org/officeDocument/2006/relationships" xmlns:p="http://schemas.openxmlformats.org/presentationml/2006/main">
+  <p:cSld>
+    <p:spTree>
+      <p:nvGrpSpPr>
+        <p:cNvPr id="1" name=""/>
+        <p:cNvGrpSpPr/>
+        <p:nvPr/>
+      </p:nvGrpSpPr>
+      <p:grpSpPr>
+        <a:xfrm>
+          <a:off x="0" y="0"/>
+          <a:ext cx="0" cy="0"/>
+          <a:chOff x="0" y="0"/>
+          <a:chExt cx="0" cy="0"/>
+        </a:xfrm>
+      </p:grpSpPr>
+      <p:sp>
+        <p:nvSpPr>
+          <p:cNvPr id="2" name="Title 1"/>
+          <p:cNvSpPr>
+            <a:spLocks noGrp="1"/>
+          </p:cNvSpPr>
+          <p:nvPr>
+            <p:ph type="title"/>
+          </p:nvPr>
+        </p:nvSpPr>
+        <p:spPr/>
+        <p:txBody>
+          <a:bodyPr/>
+          <a:lstStyle/>
+          <a:p>
+            <a:r>
+              <a:rPr lang="en-US" dirty="0" smtClean="0"/>
+              <a:t>Datasets Utilized</a:t>
+            </a:r>
+            <a:endParaRPr lang="en-US" dirty="0"/>
+          </a:p>
+        </p:txBody>
+      </p:sp>
+      <p:sp>
+        <p:nvSpPr>
+          <p:cNvPr id="3" name="Content Placeholder 2"/>
+          <p:cNvSpPr>
+            <a:spLocks noGrp="1"/>
+          </p:cNvSpPr>
+          <p:nvPr>
+            <p:ph idx="1"/>
+          </p:nvPr>
+        </p:nvSpPr>
+        <p:spPr/>
+        <p:txBody>
+          <a:bodyPr>
+            <a:normAutofit fontScale="92500" lnSpcReduction="20000"/>
+          </a:bodyPr>
+          <a:lstStyle/>
+          <a:p>
+            <a:r>
+              <a:rPr lang="en-US" dirty="0" smtClean="0"/>
+              <a:t>EMS API</a:t>
+            </a:r>
+          </a:p>
+          <a:p>
+            <a:pPr lvl="1"/>
+            <a:r>
+              <a:rPr lang="en-US" dirty="0" smtClean="0"/>
+              <a:t>Event Management System for the Missouri Student Unions</a:t>
+            </a:r>
+          </a:p>
+          <a:p>
+            <a:pPr lvl="1"/>
+            <a:r>
+              <a:rPr lang="en-US" dirty="0" smtClean="0"/>
+              <a:t>Event Spaces &amp; Meeting Times</a:t>
+            </a:r>
+          </a:p>
+          <a:p>
+            <a:r>
+              <a:rPr lang="en-US" dirty="0" err="1" smtClean="0"/>
+              <a:t>PostgresSQL</a:t>
+            </a:r>
+            <a:r>
+              <a:rPr lang="en-US" dirty="0" smtClean="0"/>
+              <a:t> Database</a:t>
+            </a:r>
+          </a:p>
+          <a:p>
+            <a:pPr lvl="1"/>
+            <a:r>
+              <a:rPr lang="en-US" dirty="0" smtClean="0"/>
+              <a:t>Lost &amp; Found</a:t>
+            </a:r>
+          </a:p>
+          <a:p>
+            <a:pPr lvl="1"/>
+            <a:r>
+              <a:rPr lang="en-US" dirty="0" smtClean="0"/>
+              <a:t>Policies &amp; Procedures</a:t>
+            </a:r>
+          </a:p>
+          <a:p>
+            <a:pPr lvl="1"/>
+            <a:r>
+              <a:rPr lang="en-US" dirty="0" smtClean="0"/>
+              <a:t>Event Space Features and Building Attractions</a:t>
+            </a:r>
+          </a:p>
+        </p:txBody>
+      </p:sp>
+    </p:spTree>
+    <p:extLst>
+      <p:ext uri="{BB962C8B-B14F-4D97-AF65-F5344CB8AC3E}">
+        <p14:creationId xmlns:p14="http://schemas.microsoft.com/office/powerpoint/2010/main" val="968368286"/>
+      </p:ext>
+    </p:extLst>
+  </p:cSld>
+  <p:clrMapOvr>
+    <a:masterClrMapping/>
+  </p:clrMapOvr>
+  <p:timing>
+    <p:tnLst>
+      <p:par>
+        <p:cTn xmlns:p14="http://schemas.microsoft.com/office/powerpoint/2010/main" id="1" dur="indefinite" restart="never" nodeType="tmRoot"/>
+      </p:par>
+    </p:tnLst>
+  </p:timing>
+</p:sld>
+</file>
+
+<file path=ppt/slides/slide5.xml><?xml version="1.0" encoding="utf-8"?>
+<p:sld xmlns:a="http://schemas.openxmlformats.org/drawingml/2006/main" xmlns:r="http://schemas.openxmlformats.org/officeDocument/2006/relationships" xmlns:p="http://schemas.openxmlformats.org/presentationml/2006/main">
+  <p:cSld>
+    <p:spTree>
+      <p:nvGrpSpPr>
+        <p:cNvPr id="1" name=""/>
+        <p:cNvGrpSpPr/>
+        <p:nvPr/>
+      </p:nvGrpSpPr>
+      <p:grpSpPr>
+        <a:xfrm>
+          <a:off x="0" y="0"/>
+          <a:ext cx="0" cy="0"/>
+          <a:chOff x="0" y="0"/>
+          <a:chExt cx="0" cy="0"/>
+        </a:xfrm>
+      </p:grpSpPr>
+      <p:pic>
+        <p:nvPicPr>
+          <p:cNvPr id="4" name="Content Placeholder 3" descr="erd.png"/>
+          <p:cNvPicPr>
+            <a:picLocks noGrp="1" noChangeAspect="1"/>
+          </p:cNvPicPr>
+          <p:nvPr>
+            <p:ph idx="1"/>
+          </p:nvPr>
+        </p:nvPicPr>
+        <p:blipFill rotWithShape="1">
+          <a:blip r:embed="rId2">
+            <a:extLst>
+              <a:ext uri="{28A0092B-C50C-407E-A947-70E740481C1C}">
+                <a14:useLocalDpi xmlns:a14="http://schemas.microsoft.com/office/drawing/2010/main" val="0"/>
+              </a:ext>
+            </a:extLst>
+          </a:blip>
+          <a:srcRect l="-10636" r="-3322" b="59"/>
+          <a:stretch/>
+        </p:blipFill>
+        <p:spPr>
+          <a:xfrm>
+            <a:off x="290007" y="1433667"/>
+            <a:ext cx="8066783" cy="5336827"/>
+          </a:xfrm>
+        </p:spPr>
+      </p:pic>
+    </p:spTree>
+    <p:extLst>
+      <p:ext uri="{BB962C8B-B14F-4D97-AF65-F5344CB8AC3E}">
+        <p14:creationId xmlns:p14="http://schemas.microsoft.com/office/powerpoint/2010/main" val="4135642186"/>
+      </p:ext>
+    </p:extLst>
+  </p:cSld>
+  <p:clrMapOvr>
+    <a:masterClrMapping/>
+  </p:clrMapOvr>
+  <p:timing>
+    <p:tnLst>
+      <p:par>
+        <p:cTn xmlns:p14="http://schemas.microsoft.com/office/powerpoint/2010/main" id="1" dur="indefinite" restart="never" nodeType="tmRoot"/>
+      </p:par>
+    </p:tnLst>
+  </p:timing>
+</p:sld>
+</file>
+
+<file path=ppt/slides/slide6.xml><?xml version="1.0" encoding="utf-8"?>
 <p:sld xmlns:a="http://schemas.openxmlformats.org/drawingml/2006/main" xmlns:r="http://schemas.openxmlformats.org/officeDocument/2006/relationships" xmlns:p="http://schemas.openxmlformats.org/presentationml/2006/main">
   <p:cSld>
     <p:spTree>
@@ -4390,7 +4953,7 @@
 </p:sld>
 </file>
 
-<file path=ppt/slides/slide4.xml><?xml version="1.0" encoding="utf-8"?>
+<file path=ppt/slides/slide7.xml><?xml version="1.0" encoding="utf-8"?>
 <p:sld xmlns:a="http://schemas.openxmlformats.org/drawingml/2006/main" xmlns:r="http://schemas.openxmlformats.org/officeDocument/2006/relationships" xmlns:p="http://schemas.openxmlformats.org/presentationml/2006/main">
   <p:cSld>
     <p:spTree>
@@ -4456,7 +5019,7 @@
 </p:sld>
 </file>
 
-<file path=ppt/slides/slide5.xml><?xml version="1.0" encoding="utf-8"?>
+<file path=ppt/slides/slide8.xml><?xml version="1.0" encoding="utf-8"?>
 <p:sld xmlns:a="http://schemas.openxmlformats.org/drawingml/2006/main" xmlns:r="http://schemas.openxmlformats.org/officeDocument/2006/relationships" xmlns:p="http://schemas.openxmlformats.org/presentationml/2006/main">
   <p:cSld>
     <p:spTree>
@@ -5642,6 +6205,617 @@
 </p:sld>
 </file>
 
+<file path=ppt/slides/slide9.xml><?xml version="1.0" encoding="utf-8"?>
+<p:sld xmlns:a="http://schemas.openxmlformats.org/drawingml/2006/main" xmlns:r="http://schemas.openxmlformats.org/officeDocument/2006/relationships" xmlns:p="http://schemas.openxmlformats.org/presentationml/2006/main">
+  <p:cSld>
+    <p:spTree>
+      <p:nvGrpSpPr>
+        <p:cNvPr id="1" name=""/>
+        <p:cNvGrpSpPr/>
+        <p:nvPr/>
+      </p:nvGrpSpPr>
+      <p:grpSpPr>
+        <a:xfrm>
+          <a:off x="0" y="0"/>
+          <a:ext cx="0" cy="0"/>
+          <a:chOff x="0" y="0"/>
+          <a:chExt cx="0" cy="0"/>
+        </a:xfrm>
+      </p:grpSpPr>
+      <p:sp>
+        <p:nvSpPr>
+          <p:cNvPr id="2" name="Title 1"/>
+          <p:cNvSpPr>
+            <a:spLocks noGrp="1"/>
+          </p:cNvSpPr>
+          <p:nvPr>
+            <p:ph type="title"/>
+          </p:nvPr>
+        </p:nvSpPr>
+        <p:spPr/>
+        <p:txBody>
+          <a:bodyPr>
+            <a:normAutofit/>
+          </a:bodyPr>
+          <a:lstStyle/>
+          <a:p>
+            <a:r>
+              <a:rPr lang="en-US" b="1" dirty="0"/>
+              <a:t>Lost and Found </a:t>
+            </a:r>
+            <a:r>
+              <a:rPr lang="en-US" b="1" dirty="0" smtClean="0"/>
+              <a:t>Module</a:t>
+            </a:r>
+            <a:endParaRPr lang="en-US" dirty="0"/>
+          </a:p>
+        </p:txBody>
+      </p:sp>
+      <p:sp>
+        <p:nvSpPr>
+          <p:cNvPr id="4" name="Text Placeholder 3"/>
+          <p:cNvSpPr>
+            <a:spLocks noGrp="1"/>
+          </p:cNvSpPr>
+          <p:nvPr>
+            <p:ph idx="1"/>
+          </p:nvPr>
+        </p:nvSpPr>
+        <p:spPr/>
+        <p:txBody>
+          <a:bodyPr>
+            <a:normAutofit lnSpcReduction="10000"/>
+          </a:bodyPr>
+          <a:lstStyle/>
+          <a:p>
+            <a:r>
+              <a:rPr lang="en-US" sz="2000" dirty="0" smtClean="0"/>
+              <a:t>Requested by the University</a:t>
+            </a:r>
+          </a:p>
+          <a:p>
+            <a:r>
+              <a:rPr lang="en-US" sz="2000" dirty="0" smtClean="0"/>
+              <a:t>LDAP credential connections</a:t>
+            </a:r>
+            <a:endParaRPr lang="en-US" sz="2000" dirty="0"/>
+          </a:p>
+          <a:p>
+            <a:r>
+              <a:rPr lang="en-US" sz="2000" dirty="0" smtClean="0"/>
+              <a:t>Cross referenced tables for item id and status’</a:t>
+            </a:r>
+          </a:p>
+          <a:p>
+            <a:r>
+              <a:rPr lang="en-US" sz="2000" dirty="0" smtClean="0"/>
+              <a:t>Item types became a challenge </a:t>
+            </a:r>
+          </a:p>
+          <a:p>
+            <a:r>
+              <a:rPr lang="en-US" sz="2000" dirty="0"/>
+              <a:t>Lost Item Types </a:t>
+            </a:r>
+            <a:endParaRPr lang="en-US" sz="2000" dirty="0" smtClean="0"/>
+          </a:p>
+          <a:p>
+            <a:pPr lvl="1"/>
+            <a:r>
+              <a:rPr lang="en-US" sz="1600" dirty="0" smtClean="0"/>
+              <a:t> </a:t>
+            </a:r>
+            <a:r>
+              <a:rPr lang="en-US" sz="2000" dirty="0"/>
+              <a:t>Common types (Phone, Laptop, Jacket</a:t>
+            </a:r>
+            <a:r>
+              <a:rPr lang="en-US" sz="2000" dirty="0" smtClean="0"/>
+              <a:t>)</a:t>
+            </a:r>
+          </a:p>
+          <a:p>
+            <a:pPr lvl="1"/>
+            <a:r>
+              <a:rPr lang="en-US" sz="2000" dirty="0" smtClean="0"/>
+              <a:t> </a:t>
+            </a:r>
+            <a:r>
+              <a:rPr lang="en-US" sz="2000" dirty="0"/>
+              <a:t>Uncommon (Food, Wife</a:t>
+            </a:r>
+            <a:r>
+              <a:rPr lang="en-US" sz="2000" dirty="0" smtClean="0"/>
+              <a:t>)</a:t>
+            </a:r>
+          </a:p>
+          <a:p>
+            <a:pPr lvl="2"/>
+            <a:r>
+              <a:rPr lang="en-US" sz="2000" dirty="0" smtClean="0"/>
+              <a:t>Option </a:t>
+            </a:r>
+            <a:r>
+              <a:rPr lang="en-US" sz="2000" dirty="0"/>
+              <a:t>for new </a:t>
+            </a:r>
+            <a:r>
+              <a:rPr lang="en-US" sz="2000" dirty="0" smtClean="0"/>
+              <a:t>types</a:t>
+            </a:r>
+          </a:p>
+          <a:p>
+            <a:pPr lvl="2"/>
+            <a:r>
+              <a:rPr lang="en-US" sz="2000" dirty="0" smtClean="0"/>
+              <a:t>Admin Approval</a:t>
+            </a:r>
+          </a:p>
+          <a:p>
+            <a:pPr lvl="2"/>
+            <a:r>
+              <a:rPr lang="en-US" sz="2000" dirty="0" smtClean="0"/>
+              <a:t>Admin </a:t>
+            </a:r>
+            <a:r>
+              <a:rPr lang="en-US" sz="2000" dirty="0"/>
+              <a:t>interface</a:t>
+            </a:r>
+          </a:p>
+          <a:p>
+            <a:endParaRPr lang="en-US" sz="2000" dirty="0" smtClean="0"/>
+          </a:p>
+        </p:txBody>
+      </p:sp>
+    </p:spTree>
+    <p:extLst>
+      <p:ext uri="{BB962C8B-B14F-4D97-AF65-F5344CB8AC3E}">
+        <p14:creationId xmlns:p14="http://schemas.microsoft.com/office/powerpoint/2010/main" val="2662477214"/>
+      </p:ext>
+    </p:extLst>
+  </p:cSld>
+  <p:clrMapOvr>
+    <a:masterClrMapping/>
+  </p:clrMapOvr>
+  <p:transition xmlns:p14="http://schemas.microsoft.com/office/powerpoint/2010/main">
+    <p:fade/>
+  </p:transition>
+  <p:timing>
+    <p:tnLst>
+      <p:par>
+        <p:cTn xmlns:p14="http://schemas.microsoft.com/office/powerpoint/2010/main" id="1" dur="indefinite" restart="never" nodeType="tmRoot">
+          <p:childTnLst>
+            <p:seq concurrent="1" nextAc="seek">
+              <p:cTn id="2" dur="indefinite" nodeType="mainSeq">
+                <p:childTnLst>
+                  <p:par>
+                    <p:cTn id="3" fill="hold">
+                      <p:stCondLst>
+                        <p:cond delay="indefinite"/>
+                      </p:stCondLst>
+                      <p:childTnLst>
+                        <p:par>
+                          <p:cTn id="4" fill="hold">
+                            <p:stCondLst>
+                              <p:cond delay="0"/>
+                            </p:stCondLst>
+                            <p:childTnLst>
+                              <p:par>
+                                <p:cTn id="5" presetID="1" presetClass="entr" presetSubtype="0" fill="hold" grpId="1" nodeType="clickEffect">
+                                  <p:stCondLst>
+                                    <p:cond delay="0"/>
+                                  </p:stCondLst>
+                                  <p:childTnLst>
+                                    <p:set>
+                                      <p:cBhvr>
+                                        <p:cTn id="6" dur="1" fill="hold">
+                                          <p:stCondLst>
+                                            <p:cond delay="0"/>
+                                          </p:stCondLst>
+                                        </p:cTn>
+                                        <p:tgtEl>
+                                          <p:spTgt spid="4">
+                                            <p:txEl>
+                                              <p:pRg st="0" end="0"/>
+                                            </p:txEl>
+                                          </p:spTgt>
+                                        </p:tgtEl>
+                                        <p:attrNameLst>
+                                          <p:attrName>style.visibility</p:attrName>
+                                        </p:attrNameLst>
+                                      </p:cBhvr>
+                                      <p:to>
+                                        <p:strVal val="visible"/>
+                                      </p:to>
+                                    </p:set>
+                                  </p:childTnLst>
+                                </p:cTn>
+                              </p:par>
+                            </p:childTnLst>
+                          </p:cTn>
+                        </p:par>
+                      </p:childTnLst>
+                    </p:cTn>
+                  </p:par>
+                  <p:par>
+                    <p:cTn id="7" fill="hold">
+                      <p:stCondLst>
+                        <p:cond delay="indefinite"/>
+                      </p:stCondLst>
+                      <p:childTnLst>
+                        <p:par>
+                          <p:cTn id="8" fill="hold">
+                            <p:stCondLst>
+                              <p:cond delay="0"/>
+                            </p:stCondLst>
+                            <p:childTnLst>
+                              <p:par>
+                                <p:cTn id="9" presetID="1" presetClass="entr" presetSubtype="0" fill="hold" grpId="1" nodeType="clickEffect">
+                                  <p:stCondLst>
+                                    <p:cond delay="0"/>
+                                  </p:stCondLst>
+                                  <p:childTnLst>
+                                    <p:set>
+                                      <p:cBhvr>
+                                        <p:cTn id="10" dur="1" fill="hold">
+                                          <p:stCondLst>
+                                            <p:cond delay="0"/>
+                                          </p:stCondLst>
+                                        </p:cTn>
+                                        <p:tgtEl>
+                                          <p:spTgt spid="4">
+                                            <p:txEl>
+                                              <p:pRg st="1" end="1"/>
+                                            </p:txEl>
+                                          </p:spTgt>
+                                        </p:tgtEl>
+                                        <p:attrNameLst>
+                                          <p:attrName>style.visibility</p:attrName>
+                                        </p:attrNameLst>
+                                      </p:cBhvr>
+                                      <p:to>
+                                        <p:strVal val="visible"/>
+                                      </p:to>
+                                    </p:set>
+                                  </p:childTnLst>
+                                </p:cTn>
+                              </p:par>
+                            </p:childTnLst>
+                          </p:cTn>
+                        </p:par>
+                      </p:childTnLst>
+                    </p:cTn>
+                  </p:par>
+                  <p:par>
+                    <p:cTn id="11" fill="hold">
+                      <p:stCondLst>
+                        <p:cond delay="indefinite"/>
+                      </p:stCondLst>
+                      <p:childTnLst>
+                        <p:par>
+                          <p:cTn id="12" fill="hold">
+                            <p:stCondLst>
+                              <p:cond delay="0"/>
+                            </p:stCondLst>
+                            <p:childTnLst>
+                              <p:par>
+                                <p:cTn id="13" presetID="1" presetClass="entr" presetSubtype="0" fill="hold" grpId="1" nodeType="clickEffect">
+                                  <p:stCondLst>
+                                    <p:cond delay="0"/>
+                                  </p:stCondLst>
+                                  <p:childTnLst>
+                                    <p:set>
+                                      <p:cBhvr>
+                                        <p:cTn id="14" dur="1" fill="hold">
+                                          <p:stCondLst>
+                                            <p:cond delay="0"/>
+                                          </p:stCondLst>
+                                        </p:cTn>
+                                        <p:tgtEl>
+                                          <p:spTgt spid="4">
+                                            <p:txEl>
+                                              <p:pRg st="2" end="2"/>
+                                            </p:txEl>
+                                          </p:spTgt>
+                                        </p:tgtEl>
+                                        <p:attrNameLst>
+                                          <p:attrName>style.visibility</p:attrName>
+                                        </p:attrNameLst>
+                                      </p:cBhvr>
+                                      <p:to>
+                                        <p:strVal val="visible"/>
+                                      </p:to>
+                                    </p:set>
+                                  </p:childTnLst>
+                                </p:cTn>
+                              </p:par>
+                            </p:childTnLst>
+                          </p:cTn>
+                        </p:par>
+                      </p:childTnLst>
+                    </p:cTn>
+                  </p:par>
+                  <p:par>
+                    <p:cTn id="15" fill="hold">
+                      <p:stCondLst>
+                        <p:cond delay="indefinite"/>
+                      </p:stCondLst>
+                      <p:childTnLst>
+                        <p:par>
+                          <p:cTn id="16" fill="hold">
+                            <p:stCondLst>
+                              <p:cond delay="0"/>
+                            </p:stCondLst>
+                            <p:childTnLst>
+                              <p:par>
+                                <p:cTn id="17" presetID="1" presetClass="entr" presetSubtype="0" fill="hold" grpId="1" nodeType="clickEffect">
+                                  <p:stCondLst>
+                                    <p:cond delay="0"/>
+                                  </p:stCondLst>
+                                  <p:childTnLst>
+                                    <p:set>
+                                      <p:cBhvr>
+                                        <p:cTn id="18" dur="1" fill="hold">
+                                          <p:stCondLst>
+                                            <p:cond delay="0"/>
+                                          </p:stCondLst>
+                                        </p:cTn>
+                                        <p:tgtEl>
+                                          <p:spTgt spid="4">
+                                            <p:txEl>
+                                              <p:pRg st="3" end="3"/>
+                                            </p:txEl>
+                                          </p:spTgt>
+                                        </p:tgtEl>
+                                        <p:attrNameLst>
+                                          <p:attrName>style.visibility</p:attrName>
+                                        </p:attrNameLst>
+                                      </p:cBhvr>
+                                      <p:to>
+                                        <p:strVal val="visible"/>
+                                      </p:to>
+                                    </p:set>
+                                  </p:childTnLst>
+                                </p:cTn>
+                              </p:par>
+                            </p:childTnLst>
+                          </p:cTn>
+                        </p:par>
+                      </p:childTnLst>
+                    </p:cTn>
+                  </p:par>
+                  <p:par>
+                    <p:cTn id="19" fill="hold">
+                      <p:stCondLst>
+                        <p:cond delay="indefinite"/>
+                      </p:stCondLst>
+                      <p:childTnLst>
+                        <p:par>
+                          <p:cTn id="20" fill="hold">
+                            <p:stCondLst>
+                              <p:cond delay="0"/>
+                            </p:stCondLst>
+                            <p:childTnLst>
+                              <p:par>
+                                <p:cTn id="21" presetID="1" presetClass="entr" presetSubtype="0" fill="hold" grpId="1" nodeType="clickEffect">
+                                  <p:stCondLst>
+                                    <p:cond delay="0"/>
+                                  </p:stCondLst>
+                                  <p:childTnLst>
+                                    <p:set>
+                                      <p:cBhvr>
+                                        <p:cTn id="22" dur="1" fill="hold">
+                                          <p:stCondLst>
+                                            <p:cond delay="0"/>
+                                          </p:stCondLst>
+                                        </p:cTn>
+                                        <p:tgtEl>
+                                          <p:spTgt spid="4">
+                                            <p:txEl>
+                                              <p:pRg st="4" end="4"/>
+                                            </p:txEl>
+                                          </p:spTgt>
+                                        </p:tgtEl>
+                                        <p:attrNameLst>
+                                          <p:attrName>style.visibility</p:attrName>
+                                        </p:attrNameLst>
+                                      </p:cBhvr>
+                                      <p:to>
+                                        <p:strVal val="visible"/>
+                                      </p:to>
+                                    </p:set>
+                                  </p:childTnLst>
+                                </p:cTn>
+                              </p:par>
+                              <p:par>
+                                <p:cTn id="23" presetID="1" presetClass="entr" presetSubtype="0" fill="hold" grpId="1" nodeType="withEffect">
+                                  <p:stCondLst>
+                                    <p:cond delay="0"/>
+                                  </p:stCondLst>
+                                  <p:childTnLst>
+                                    <p:set>
+                                      <p:cBhvr>
+                                        <p:cTn id="24" dur="1" fill="hold">
+                                          <p:stCondLst>
+                                            <p:cond delay="0"/>
+                                          </p:stCondLst>
+                                        </p:cTn>
+                                        <p:tgtEl>
+                                          <p:spTgt spid="4">
+                                            <p:txEl>
+                                              <p:pRg st="5" end="5"/>
+                                            </p:txEl>
+                                          </p:spTgt>
+                                        </p:tgtEl>
+                                        <p:attrNameLst>
+                                          <p:attrName>style.visibility</p:attrName>
+                                        </p:attrNameLst>
+                                      </p:cBhvr>
+                                      <p:to>
+                                        <p:strVal val="visible"/>
+                                      </p:to>
+                                    </p:set>
+                                  </p:childTnLst>
+                                </p:cTn>
+                              </p:par>
+                              <p:par>
+                                <p:cTn id="25" presetID="1" presetClass="entr" presetSubtype="0" fill="hold" grpId="1" nodeType="withEffect">
+                                  <p:stCondLst>
+                                    <p:cond delay="0"/>
+                                  </p:stCondLst>
+                                  <p:childTnLst>
+                                    <p:set>
+                                      <p:cBhvr>
+                                        <p:cTn id="26" dur="1" fill="hold">
+                                          <p:stCondLst>
+                                            <p:cond delay="0"/>
+                                          </p:stCondLst>
+                                        </p:cTn>
+                                        <p:tgtEl>
+                                          <p:spTgt spid="4">
+                                            <p:txEl>
+                                              <p:pRg st="6" end="6"/>
+                                            </p:txEl>
+                                          </p:spTgt>
+                                        </p:tgtEl>
+                                        <p:attrNameLst>
+                                          <p:attrName>style.visibility</p:attrName>
+                                        </p:attrNameLst>
+                                      </p:cBhvr>
+                                      <p:to>
+                                        <p:strVal val="visible"/>
+                                      </p:to>
+                                    </p:set>
+                                  </p:childTnLst>
+                                </p:cTn>
+                              </p:par>
+                              <p:par>
+                                <p:cTn id="27" presetID="1" presetClass="entr" presetSubtype="0" fill="hold" grpId="1" nodeType="withEffect">
+                                  <p:stCondLst>
+                                    <p:cond delay="0"/>
+                                  </p:stCondLst>
+                                  <p:childTnLst>
+                                    <p:set>
+                                      <p:cBhvr>
+                                        <p:cTn id="28" dur="1" fill="hold">
+                                          <p:stCondLst>
+                                            <p:cond delay="0"/>
+                                          </p:stCondLst>
+                                        </p:cTn>
+                                        <p:tgtEl>
+                                          <p:spTgt spid="4">
+                                            <p:txEl>
+                                              <p:pRg st="7" end="7"/>
+                                            </p:txEl>
+                                          </p:spTgt>
+                                        </p:tgtEl>
+                                        <p:attrNameLst>
+                                          <p:attrName>style.visibility</p:attrName>
+                                        </p:attrNameLst>
+                                      </p:cBhvr>
+                                      <p:to>
+                                        <p:strVal val="visible"/>
+                                      </p:to>
+                                    </p:set>
+                                  </p:childTnLst>
+                                </p:cTn>
+                              </p:par>
+                              <p:par>
+                                <p:cTn id="29" presetID="1" presetClass="entr" presetSubtype="0" fill="hold" grpId="1" nodeType="withEffect">
+                                  <p:stCondLst>
+                                    <p:cond delay="0"/>
+                                  </p:stCondLst>
+                                  <p:childTnLst>
+                                    <p:set>
+                                      <p:cBhvr>
+                                        <p:cTn id="30" dur="1" fill="hold">
+                                          <p:stCondLst>
+                                            <p:cond delay="0"/>
+                                          </p:stCondLst>
+                                        </p:cTn>
+                                        <p:tgtEl>
+                                          <p:spTgt spid="4">
+                                            <p:txEl>
+                                              <p:pRg st="8" end="8"/>
+                                            </p:txEl>
+                                          </p:spTgt>
+                                        </p:tgtEl>
+                                        <p:attrNameLst>
+                                          <p:attrName>style.visibility</p:attrName>
+                                        </p:attrNameLst>
+                                      </p:cBhvr>
+                                      <p:to>
+                                        <p:strVal val="visible"/>
+                                      </p:to>
+                                    </p:set>
+                                  </p:childTnLst>
+                                </p:cTn>
+                              </p:par>
+                              <p:par>
+                                <p:cTn id="31" presetID="1" presetClass="entr" presetSubtype="0" fill="hold" grpId="1" nodeType="withEffect">
+                                  <p:stCondLst>
+                                    <p:cond delay="0"/>
+                                  </p:stCondLst>
+                                  <p:childTnLst>
+                                    <p:set>
+                                      <p:cBhvr>
+                                        <p:cTn id="32" dur="1" fill="hold">
+                                          <p:stCondLst>
+                                            <p:cond delay="0"/>
+                                          </p:stCondLst>
+                                        </p:cTn>
+                                        <p:tgtEl>
+                                          <p:spTgt spid="4">
+                                            <p:txEl>
+                                              <p:pRg st="9" end="9"/>
+                                            </p:txEl>
+                                          </p:spTgt>
+                                        </p:tgtEl>
+                                        <p:attrNameLst>
+                                          <p:attrName>style.visibility</p:attrName>
+                                        </p:attrNameLst>
+                                      </p:cBhvr>
+                                      <p:to>
+                                        <p:strVal val="visible"/>
+                                      </p:to>
+                                    </p:set>
+                                  </p:childTnLst>
+                                </p:cTn>
+                              </p:par>
+                            </p:childTnLst>
+                          </p:cTn>
+                        </p:par>
+                      </p:childTnLst>
+                    </p:cTn>
+                  </p:par>
+                </p:childTnLst>
+              </p:cTn>
+              <p:prevCondLst>
+                <p:cond evt="onPrev" delay="0">
+                  <p:tgtEl>
+                    <p:sldTgt/>
+                  </p:tgtEl>
+                </p:cond>
+              </p:prevCondLst>
+              <p:nextCondLst>
+                <p:cond evt="onNext" delay="0">
+                  <p:tgtEl>
+                    <p:sldTgt/>
+                  </p:tgtEl>
+                </p:cond>
+              </p:nextCondLst>
+            </p:seq>
+          </p:childTnLst>
+        </p:cTn>
+      </p:par>
+    </p:tnLst>
+    <p:bldLst>
+      <p:bldP spid="4" grpId="1" build="p"/>
+    </p:bldLst>
+  </p:timing>
+</p:sld>
+</file>
+
 <file path=ppt/theme/theme1.xml><?xml version="1.0" encoding="utf-8"?>
 <a:theme xmlns:a="http://schemas.openxmlformats.org/drawingml/2006/main" name=" Black ">
   <a:themeElements>

</xml_diff>

<commit_message>
Added event space and admin portal slides
</commit_message>
<xml_diff>
--- a/babbage/powerpoint/Group18 Presentation.pptx
+++ b/babbage/powerpoint/Group18 Presentation.pptx
@@ -16,6 +16,8 @@
     <p:sldId id="264" r:id="rId10"/>
     <p:sldId id="265" r:id="rId11"/>
     <p:sldId id="266" r:id="rId12"/>
+    <p:sldId id="267" r:id="rId13"/>
+    <p:sldId id="268" r:id="rId14"/>
   </p:sldIdLst>
   <p:sldSz cx="9144000" cy="6858000" type="screen4x3"/>
   <p:notesSz cx="6858000" cy="9144000"/>
@@ -156,7 +158,27 @@
             <p14:sldId id="266"/>
           </p14:sldIdLst>
         </p14:section>
+        <p14:section name="Event Space &amp; Admin Portal" id="{5F739DEC-8AE5-4947-A046-49F3CA36A9C4}">
+          <p14:sldIdLst>
+            <p14:sldId id="267"/>
+            <p14:sldId id="268"/>
+          </p14:sldIdLst>
+        </p14:section>
       </p14:sectionLst>
+    </p:ext>
+    <p:ext uri="{EFAFB233-063F-42B5-8137-9DF3F51BA10A}">
+      <p15:sldGuideLst xmlns:p15="http://schemas.microsoft.com/office/powerpoint/2012/main">
+        <p15:guide id="1" orient="horz" pos="2160">
+          <p15:clr>
+            <a:srgbClr val="A4A3A4"/>
+          </p15:clr>
+        </p15:guide>
+        <p15:guide id="2" pos="2880">
+          <p15:clr>
+            <a:srgbClr val="A4A3A4"/>
+          </p15:clr>
+        </p15:guide>
+      </p15:sldGuideLst>
     </p:ext>
   </p:extLst>
 </p:presentation>
@@ -343,7 +365,7 @@
           <a:p>
             <a:fld id="{6BFECD78-3C8E-49F2-8FAB-59489D168ABB}" type="datetimeFigureOut">
               <a:rPr lang="en-US" smtClean="0"/>
-              <a:t>12/1/14</a:t>
+              <a:t>12/1/2014</a:t>
             </a:fld>
             <a:endParaRPr lang="en-US"/>
           </a:p>
@@ -513,7 +535,7 @@
           <a:p>
             <a:fld id="{6BFECD78-3C8E-49F2-8FAB-59489D168ABB}" type="datetimeFigureOut">
               <a:rPr lang="en-US" smtClean="0"/>
-              <a:t>12/1/14</a:t>
+              <a:t>12/1/2014</a:t>
             </a:fld>
             <a:endParaRPr lang="en-US"/>
           </a:p>
@@ -693,7 +715,7 @@
           <a:p>
             <a:fld id="{6BFECD78-3C8E-49F2-8FAB-59489D168ABB}" type="datetimeFigureOut">
               <a:rPr lang="en-US" smtClean="0"/>
-              <a:t>12/1/14</a:t>
+              <a:t>12/1/2014</a:t>
             </a:fld>
             <a:endParaRPr lang="en-US"/>
           </a:p>
@@ -863,7 +885,7 @@
           <a:p>
             <a:fld id="{6BFECD78-3C8E-49F2-8FAB-59489D168ABB}" type="datetimeFigureOut">
               <a:rPr lang="en-US" smtClean="0"/>
-              <a:t>12/1/14</a:t>
+              <a:t>12/1/2014</a:t>
             </a:fld>
             <a:endParaRPr lang="en-US"/>
           </a:p>
@@ -1109,7 +1131,7 @@
           <a:p>
             <a:fld id="{6BFECD78-3C8E-49F2-8FAB-59489D168ABB}" type="datetimeFigureOut">
               <a:rPr lang="en-US" smtClean="0"/>
-              <a:t>12/1/14</a:t>
+              <a:t>12/1/2014</a:t>
             </a:fld>
             <a:endParaRPr lang="en-US"/>
           </a:p>
@@ -1397,7 +1419,7 @@
           <a:p>
             <a:fld id="{6BFECD78-3C8E-49F2-8FAB-59489D168ABB}" type="datetimeFigureOut">
               <a:rPr lang="en-US" smtClean="0"/>
-              <a:t>12/1/14</a:t>
+              <a:t>12/1/2014</a:t>
             </a:fld>
             <a:endParaRPr lang="en-US"/>
           </a:p>
@@ -1819,7 +1841,7 @@
           <a:p>
             <a:fld id="{6BFECD78-3C8E-49F2-8FAB-59489D168ABB}" type="datetimeFigureOut">
               <a:rPr lang="en-US" smtClean="0"/>
-              <a:t>12/1/14</a:t>
+              <a:t>12/1/2014</a:t>
             </a:fld>
             <a:endParaRPr lang="en-US"/>
           </a:p>
@@ -1937,7 +1959,7 @@
           <a:p>
             <a:fld id="{6BFECD78-3C8E-49F2-8FAB-59489D168ABB}" type="datetimeFigureOut">
               <a:rPr lang="en-US" smtClean="0"/>
-              <a:t>12/1/14</a:t>
+              <a:t>12/1/2014</a:t>
             </a:fld>
             <a:endParaRPr lang="en-US"/>
           </a:p>
@@ -2032,7 +2054,7 @@
           <a:p>
             <a:fld id="{6BFECD78-3C8E-49F2-8FAB-59489D168ABB}" type="datetimeFigureOut">
               <a:rPr lang="en-US" smtClean="0"/>
-              <a:t>12/1/14</a:t>
+              <a:t>12/1/2014</a:t>
             </a:fld>
             <a:endParaRPr lang="en-US"/>
           </a:p>
@@ -2309,7 +2331,7 @@
           <a:p>
             <a:fld id="{6BFECD78-3C8E-49F2-8FAB-59489D168ABB}" type="datetimeFigureOut">
               <a:rPr lang="en-US" smtClean="0"/>
-              <a:t>12/1/14</a:t>
+              <a:t>12/1/2014</a:t>
             </a:fld>
             <a:endParaRPr lang="en-US"/>
           </a:p>
@@ -2566,7 +2588,7 @@
           <a:p>
             <a:fld id="{6BFECD78-3C8E-49F2-8FAB-59489D168ABB}" type="datetimeFigureOut">
               <a:rPr lang="en-US" smtClean="0"/>
-              <a:t>12/1/14</a:t>
+              <a:t>12/1/2014</a:t>
             </a:fld>
             <a:endParaRPr lang="en-US"/>
           </a:p>
@@ -2785,7 +2807,7 @@
             <a:fld id="{6BFECD78-3C8E-49F2-8FAB-59489D168ABB}" type="datetimeFigureOut">
               <a:rPr lang="en-US" smtClean="0"/>
               <a:pPr/>
-              <a:t>12/1/14</a:t>
+              <a:t>12/1/2014</a:t>
             </a:fld>
             <a:endParaRPr lang="en-US"/>
           </a:p>
@@ -3231,7 +3253,7 @@
   <p:timing>
     <p:tnLst>
       <p:par>
-        <p:cTn xmlns:p14="http://schemas.microsoft.com/office/powerpoint/2010/main" id="1" dur="indefinite" restart="never" nodeType="tmRoot"/>
+        <p:cTn id="1" dur="indefinite" restart="never" nodeType="tmRoot"/>
       </p:par>
     </p:tnLst>
   </p:timing>
@@ -3315,7 +3337,6 @@
               <a:rPr lang="en-US" sz="2400" dirty="0" smtClean="0"/>
               <a:t> </a:t>
             </a:r>
-            <a:endParaRPr lang="en-US" sz="2400" dirty="0" smtClean="0"/>
           </a:p>
           <a:p>
             <a:pPr lvl="1"/>
@@ -3357,6 +3378,13 @@
   <p:clrMapOvr>
     <a:masterClrMapping/>
   </p:clrMapOvr>
+  <p:timing>
+    <p:tnLst>
+      <p:par>
+        <p:cTn id="1" dur="indefinite" restart="never" nodeType="tmRoot"/>
+      </p:par>
+    </p:tnLst>
+  </p:timing>
 </p:sld>
 </file>
 
@@ -3437,24 +3465,14 @@
           <a:p>
             <a:r>
               <a:rPr lang="en-US" sz="2400" dirty="0" smtClean="0"/>
-              <a:t>Include links to view information or </a:t>
-            </a:r>
+              <a:t>Include links to view information or hours</a:t>
+            </a:r>
+          </a:p>
+          <a:p>
             <a:r>
               <a:rPr lang="en-US" sz="2400" dirty="0" smtClean="0"/>
-              <a:t>hours</a:t>
-            </a:r>
-            <a:endParaRPr lang="en-US" sz="2400" dirty="0" smtClean="0"/>
-          </a:p>
-          <a:p>
-            <a:r>
-              <a:rPr lang="en-US" sz="2400" dirty="0" smtClean="0"/>
-              <a:t>Make an administrator be able to </a:t>
-            </a:r>
-            <a:r>
-              <a:rPr lang="en-US" sz="2400" dirty="0" smtClean="0"/>
-              <a:t>edit </a:t>
-            </a:r>
-            <a:endParaRPr lang="en-US" sz="2400" dirty="0" smtClean="0"/>
+              <a:t>Make an administrator be able to edit </a:t>
+            </a:r>
           </a:p>
           <a:p>
             <a:pPr lvl="1"/>
@@ -3493,6 +3511,366 @@
   <p:clrMapOvr>
     <a:masterClrMapping/>
   </p:clrMapOvr>
+</p:sld>
+</file>
+
+<file path=ppt/slides/slide12.xml><?xml version="1.0" encoding="utf-8"?>
+<p:sld xmlns:a="http://schemas.openxmlformats.org/drawingml/2006/main" xmlns:r="http://schemas.openxmlformats.org/officeDocument/2006/relationships" xmlns:p="http://schemas.openxmlformats.org/presentationml/2006/main">
+  <p:cSld>
+    <p:spTree>
+      <p:nvGrpSpPr>
+        <p:cNvPr id="1" name=""/>
+        <p:cNvGrpSpPr/>
+        <p:nvPr/>
+      </p:nvGrpSpPr>
+      <p:grpSpPr>
+        <a:xfrm>
+          <a:off x="0" y="0"/>
+          <a:ext cx="0" cy="0"/>
+          <a:chOff x="0" y="0"/>
+          <a:chExt cx="0" cy="0"/>
+        </a:xfrm>
+      </p:grpSpPr>
+      <p:sp>
+        <p:nvSpPr>
+          <p:cNvPr id="2" name="Title 1"/>
+          <p:cNvSpPr>
+            <a:spLocks noGrp="1"/>
+          </p:cNvSpPr>
+          <p:nvPr>
+            <p:ph type="title"/>
+          </p:nvPr>
+        </p:nvSpPr>
+        <p:spPr/>
+        <p:txBody>
+          <a:bodyPr/>
+          <a:lstStyle/>
+          <a:p>
+            <a:r>
+              <a:rPr lang="en-US" dirty="0" smtClean="0"/>
+              <a:t>Admin Portal</a:t>
+            </a:r>
+            <a:endParaRPr lang="en-US" dirty="0"/>
+          </a:p>
+        </p:txBody>
+      </p:sp>
+      <p:sp>
+        <p:nvSpPr>
+          <p:cNvPr id="3" name="Content Placeholder 2"/>
+          <p:cNvSpPr>
+            <a:spLocks noGrp="1"/>
+          </p:cNvSpPr>
+          <p:nvPr>
+            <p:ph idx="1"/>
+          </p:nvPr>
+        </p:nvSpPr>
+        <p:spPr>
+          <a:xfrm>
+            <a:off x="457200" y="2661465"/>
+            <a:ext cx="4907280" cy="3464699"/>
+          </a:xfrm>
+        </p:spPr>
+        <p:txBody>
+          <a:bodyPr/>
+          <a:lstStyle/>
+          <a:p>
+            <a:r>
+              <a:rPr lang="en-US" sz="2400" dirty="0" smtClean="0"/>
+              <a:t>Group Name Change</a:t>
+            </a:r>
+          </a:p>
+          <a:p>
+            <a:pPr lvl="1"/>
+            <a:r>
+              <a:rPr lang="en-US" sz="1800" dirty="0" smtClean="0"/>
+              <a:t>Select2 using SQL Server dataset</a:t>
+            </a:r>
+          </a:p>
+          <a:p>
+            <a:pPr lvl="1"/>
+            <a:r>
+              <a:rPr lang="en-US" sz="1800" dirty="0" smtClean="0"/>
+              <a:t>Approval by Events Manager</a:t>
+            </a:r>
+          </a:p>
+          <a:p>
+            <a:r>
+              <a:rPr lang="en-US" sz="2400" dirty="0" smtClean="0"/>
+              <a:t>Department Request</a:t>
+            </a:r>
+          </a:p>
+          <a:p>
+            <a:pPr lvl="1"/>
+            <a:r>
+              <a:rPr lang="en-US" sz="1800" dirty="0" smtClean="0"/>
+              <a:t>Approval by Events Manager</a:t>
+            </a:r>
+          </a:p>
+          <a:p>
+            <a:r>
+              <a:rPr lang="en-US" sz="2200" dirty="0" smtClean="0"/>
+              <a:t>Special Areas/Services Request</a:t>
+            </a:r>
+          </a:p>
+          <a:p>
+            <a:pPr lvl="1"/>
+            <a:r>
+              <a:rPr lang="en-US" sz="1400" dirty="0" smtClean="0"/>
+              <a:t>Entered into EMS as a Web Request</a:t>
+            </a:r>
+          </a:p>
+          <a:p>
+            <a:endParaRPr lang="en-US" sz="2400" dirty="0" smtClean="0"/>
+          </a:p>
+          <a:p>
+            <a:endParaRPr lang="en-US" sz="2400" dirty="0" smtClean="0"/>
+          </a:p>
+        </p:txBody>
+      </p:sp>
+      <p:pic>
+        <p:nvPicPr>
+          <p:cNvPr id="5" name="Picture 4"/>
+          <p:cNvPicPr>
+            <a:picLocks noChangeAspect="1"/>
+          </p:cNvPicPr>
+          <p:nvPr/>
+        </p:nvPicPr>
+        <p:blipFill>
+          <a:blip r:embed="rId2"/>
+          <a:stretch>
+            <a:fillRect/>
+          </a:stretch>
+        </p:blipFill>
+        <p:spPr>
+          <a:xfrm>
+            <a:off x="5418772" y="2661465"/>
+            <a:ext cx="3268028" cy="1399306"/>
+          </a:xfrm>
+          <a:prstGeom prst="rect">
+            <a:avLst/>
+          </a:prstGeom>
+        </p:spPr>
+      </p:pic>
+      <p:pic>
+        <p:nvPicPr>
+          <p:cNvPr id="6" name="Picture 5"/>
+          <p:cNvPicPr>
+            <a:picLocks noChangeAspect="1"/>
+          </p:cNvPicPr>
+          <p:nvPr/>
+        </p:nvPicPr>
+        <p:blipFill>
+          <a:blip r:embed="rId3"/>
+          <a:stretch>
+            <a:fillRect/>
+          </a:stretch>
+        </p:blipFill>
+        <p:spPr>
+          <a:xfrm>
+            <a:off x="5464492" y="4184176"/>
+            <a:ext cx="2915038" cy="1440335"/>
+          </a:xfrm>
+          <a:prstGeom prst="rect">
+            <a:avLst/>
+          </a:prstGeom>
+        </p:spPr>
+      </p:pic>
+      <p:pic>
+        <p:nvPicPr>
+          <p:cNvPr id="7" name="Picture 6"/>
+          <p:cNvPicPr>
+            <a:picLocks noChangeAspect="1"/>
+          </p:cNvPicPr>
+          <p:nvPr/>
+        </p:nvPicPr>
+        <p:blipFill>
+          <a:blip r:embed="rId4"/>
+          <a:stretch>
+            <a:fillRect/>
+          </a:stretch>
+        </p:blipFill>
+        <p:spPr>
+          <a:xfrm>
+            <a:off x="594360" y="5747916"/>
+            <a:ext cx="7134743" cy="707208"/>
+          </a:xfrm>
+          <a:prstGeom prst="rect">
+            <a:avLst/>
+          </a:prstGeom>
+        </p:spPr>
+      </p:pic>
+    </p:spTree>
+    <p:extLst>
+      <p:ext uri="{BB962C8B-B14F-4D97-AF65-F5344CB8AC3E}">
+        <p14:creationId xmlns:p14="http://schemas.microsoft.com/office/powerpoint/2010/main" val="2817023872"/>
+      </p:ext>
+    </p:extLst>
+  </p:cSld>
+  <p:clrMapOvr>
+    <a:masterClrMapping/>
+  </p:clrMapOvr>
+  <p:timing>
+    <p:tnLst>
+      <p:par>
+        <p:cTn id="1" dur="indefinite" restart="never" nodeType="tmRoot"/>
+      </p:par>
+    </p:tnLst>
+  </p:timing>
+</p:sld>
+</file>
+
+<file path=ppt/slides/slide13.xml><?xml version="1.0" encoding="utf-8"?>
+<p:sld xmlns:a="http://schemas.openxmlformats.org/drawingml/2006/main" xmlns:r="http://schemas.openxmlformats.org/officeDocument/2006/relationships" xmlns:p="http://schemas.openxmlformats.org/presentationml/2006/main">
+  <p:cSld>
+    <p:spTree>
+      <p:nvGrpSpPr>
+        <p:cNvPr id="1" name=""/>
+        <p:cNvGrpSpPr/>
+        <p:nvPr/>
+      </p:nvGrpSpPr>
+      <p:grpSpPr>
+        <a:xfrm>
+          <a:off x="0" y="0"/>
+          <a:ext cx="0" cy="0"/>
+          <a:chOff x="0" y="0"/>
+          <a:chExt cx="0" cy="0"/>
+        </a:xfrm>
+      </p:grpSpPr>
+      <p:sp>
+        <p:nvSpPr>
+          <p:cNvPr id="2" name="Title 1"/>
+          <p:cNvSpPr>
+            <a:spLocks noGrp="1"/>
+          </p:cNvSpPr>
+          <p:nvPr>
+            <p:ph type="title"/>
+          </p:nvPr>
+        </p:nvSpPr>
+        <p:spPr/>
+        <p:txBody>
+          <a:bodyPr/>
+          <a:lstStyle/>
+          <a:p>
+            <a:r>
+              <a:rPr lang="en-US" dirty="0" smtClean="0"/>
+              <a:t>Event Space</a:t>
+            </a:r>
+            <a:endParaRPr lang="en-US" dirty="0"/>
+          </a:p>
+        </p:txBody>
+      </p:sp>
+      <p:sp>
+        <p:nvSpPr>
+          <p:cNvPr id="3" name="Content Placeholder 2"/>
+          <p:cNvSpPr>
+            <a:spLocks noGrp="1"/>
+          </p:cNvSpPr>
+          <p:nvPr>
+            <p:ph idx="1"/>
+          </p:nvPr>
+        </p:nvSpPr>
+        <p:spPr>
+          <a:xfrm>
+            <a:off x="457200" y="2661465"/>
+            <a:ext cx="8382586" cy="2261055"/>
+          </a:xfrm>
+        </p:spPr>
+        <p:txBody>
+          <a:bodyPr numCol="2"/>
+          <a:lstStyle/>
+          <a:p>
+            <a:r>
+              <a:rPr lang="en-US" sz="2800" dirty="0" smtClean="0"/>
+              <a:t>Filtering</a:t>
+            </a:r>
+            <a:endParaRPr lang="en-US" dirty="0" smtClean="0"/>
+          </a:p>
+          <a:p>
+            <a:r>
+              <a:rPr lang="en-US" sz="2800" dirty="0" smtClean="0"/>
+              <a:t>EMS Integration</a:t>
+            </a:r>
+          </a:p>
+          <a:p>
+            <a:pPr lvl="1"/>
+            <a:r>
+              <a:rPr lang="en-US" sz="2400" dirty="0" smtClean="0"/>
+              <a:t>EMS API pull the Name, Features, and Description</a:t>
+            </a:r>
+          </a:p>
+          <a:p>
+            <a:endParaRPr lang="en-US" dirty="0" smtClean="0"/>
+          </a:p>
+          <a:p>
+            <a:endParaRPr lang="en-US" dirty="0"/>
+          </a:p>
+        </p:txBody>
+      </p:sp>
+      <p:pic>
+        <p:nvPicPr>
+          <p:cNvPr id="4" name="Picture 3"/>
+          <p:cNvPicPr>
+            <a:picLocks noChangeAspect="1"/>
+          </p:cNvPicPr>
+          <p:nvPr/>
+        </p:nvPicPr>
+        <p:blipFill>
+          <a:blip r:embed="rId2"/>
+          <a:stretch>
+            <a:fillRect/>
+          </a:stretch>
+        </p:blipFill>
+        <p:spPr>
+          <a:xfrm>
+            <a:off x="503323" y="5013701"/>
+            <a:ext cx="8290743" cy="1416192"/>
+          </a:xfrm>
+          <a:prstGeom prst="rect">
+            <a:avLst/>
+          </a:prstGeom>
+        </p:spPr>
+      </p:pic>
+      <p:pic>
+        <p:nvPicPr>
+          <p:cNvPr id="5" name="Picture 4"/>
+          <p:cNvPicPr>
+            <a:picLocks noChangeAspect="1"/>
+          </p:cNvPicPr>
+          <p:nvPr/>
+        </p:nvPicPr>
+        <p:blipFill>
+          <a:blip r:embed="rId3"/>
+          <a:stretch>
+            <a:fillRect/>
+          </a:stretch>
+        </p:blipFill>
+        <p:spPr>
+          <a:xfrm>
+            <a:off x="5379302" y="2941320"/>
+            <a:ext cx="3307498" cy="1475422"/>
+          </a:xfrm>
+          <a:prstGeom prst="rect">
+            <a:avLst/>
+          </a:prstGeom>
+        </p:spPr>
+      </p:pic>
+    </p:spTree>
+    <p:extLst>
+      <p:ext uri="{BB962C8B-B14F-4D97-AF65-F5344CB8AC3E}">
+        <p14:creationId xmlns:p14="http://schemas.microsoft.com/office/powerpoint/2010/main" val="442039141"/>
+      </p:ext>
+    </p:extLst>
+  </p:cSld>
+  <p:clrMapOvr>
+    <a:masterClrMapping/>
+  </p:clrMapOvr>
+  <p:timing>
+    <p:tnLst>
+      <p:par>
+        <p:cTn id="1" dur="indefinite" restart="never" nodeType="tmRoot"/>
+      </p:par>
+    </p:tnLst>
+  </p:timing>
 </p:sld>
 </file>
 
@@ -3794,6 +4172,13 @@
   <p:clrMapOvr>
     <a:masterClrMapping/>
   </p:clrMapOvr>
+  <p:timing>
+    <p:tnLst>
+      <p:par>
+        <p:cTn id="1" dur="indefinite" restart="never" nodeType="tmRoot"/>
+      </p:par>
+    </p:tnLst>
+  </p:timing>
 </p:sld>
 </file>
 
@@ -3919,7 +4304,7 @@
   <p:timing>
     <p:tnLst>
       <p:par>
-        <p:cTn xmlns:p14="http://schemas.microsoft.com/office/powerpoint/2010/main" id="1" dur="indefinite" restart="never" nodeType="tmRoot"/>
+        <p:cTn id="1" dur="indefinite" restart="never" nodeType="tmRoot"/>
       </p:par>
     </p:tnLst>
   </p:timing>
@@ -3945,7 +4330,7 @@
       </p:grpSpPr>
       <p:pic>
         <p:nvPicPr>
-          <p:cNvPr id="4" name="Content Placeholder 3" descr="erd.png"/>
+          <p:cNvPr id="4" name="Content Placeholder 3"/>
           <p:cNvPicPr>
             <a:picLocks noGrp="1" noChangeAspect="1"/>
           </p:cNvPicPr>
@@ -3953,21 +4338,22 @@
             <p:ph idx="1"/>
           </p:nvPr>
         </p:nvPicPr>
-        <p:blipFill rotWithShape="1">
-          <a:blip r:embed="rId2">
+        <p:blipFill>
+          <a:blip r:embed="rId2" cstate="email">
             <a:extLst>
               <a:ext uri="{28A0092B-C50C-407E-A947-70E740481C1C}">
                 <a14:useLocalDpi xmlns:a14="http://schemas.microsoft.com/office/drawing/2010/main" val="0"/>
               </a:ext>
             </a:extLst>
           </a:blip>
-          <a:srcRect l="-10636" r="-3322" b="59"/>
-          <a:stretch/>
+          <a:stretch>
+            <a:fillRect/>
+          </a:stretch>
         </p:blipFill>
         <p:spPr>
           <a:xfrm>
-            <a:off x="290007" y="1433667"/>
-            <a:ext cx="8066783" cy="5336827"/>
+            <a:off x="871470" y="1433667"/>
+            <a:ext cx="6903857" cy="5336827"/>
           </a:xfrm>
         </p:spPr>
       </p:pic>
@@ -3984,7 +4370,7 @@
   <p:timing>
     <p:tnLst>
       <p:par>
-        <p:cTn xmlns:p14="http://schemas.microsoft.com/office/powerpoint/2010/main" id="1" dur="indefinite" restart="never" nodeType="tmRoot"/>
+        <p:cTn id="1" dur="indefinite" restart="never" nodeType="tmRoot"/>
       </p:par>
     </p:tnLst>
   </p:timing>
@@ -4257,7 +4643,7 @@
   <p:timing>
     <p:tnLst>
       <p:par>
-        <p:cTn xmlns:p14="http://schemas.microsoft.com/office/powerpoint/2010/main" id="1" dur="indefinite" restart="never" nodeType="tmRoot">
+        <p:cTn id="1" dur="indefinite" restart="never" nodeType="tmRoot">
           <p:childTnLst>
             <p:seq concurrent="1" nextAc="seek">
               <p:cTn id="2" dur="indefinite" nodeType="mainSeq">
@@ -4998,7 +5384,7 @@
           <p:nvPr/>
         </p:nvPicPr>
         <p:blipFill rotWithShape="1">
-          <a:blip r:embed="rId2" cstate="print">
+          <a:blip r:embed="rId2" cstate="email">
             <a:extLst>
               <a:ext uri="{28A0092B-C50C-407E-A947-70E740481C1C}">
                 <a14:useLocalDpi xmlns:a14="http://schemas.microsoft.com/office/drawing/2010/main" val="0"/>
@@ -5031,7 +5417,7 @@
   <p:timing>
     <p:tnLst>
       <p:par>
-        <p:cTn xmlns:p14="http://schemas.microsoft.com/office/powerpoint/2010/main" id="1" dur="indefinite" restart="never" nodeType="tmRoot"/>
+        <p:cTn id="1" dur="indefinite" restart="never" nodeType="tmRoot"/>
       </p:par>
     </p:tnLst>
   </p:timing>
@@ -5558,7 +5944,7 @@
   <p:timing>
     <p:tnLst>
       <p:par>
-        <p:cTn xmlns:p14="http://schemas.microsoft.com/office/powerpoint/2010/main" id="1" dur="indefinite" restart="never" nodeType="tmRoot">
+        <p:cTn id="1" dur="indefinite" restart="never" nodeType="tmRoot">
           <p:childTnLst>
             <p:seq concurrent="1" nextAc="seek">
               <p:cTn id="2" dur="indefinite" nodeType="mainSeq">
@@ -6396,13 +6782,13 @@
   <p:clrMapOvr>
     <a:masterClrMapping/>
   </p:clrMapOvr>
-  <p:transition xmlns:p14="http://schemas.microsoft.com/office/powerpoint/2010/main">
+  <p:transition>
     <p:fade/>
   </p:transition>
   <p:timing>
     <p:tnLst>
       <p:par>
-        <p:cTn xmlns:p14="http://schemas.microsoft.com/office/powerpoint/2010/main" id="1" dur="indefinite" restart="never" nodeType="tmRoot">
+        <p:cTn id="1" dur="indefinite" restart="never" nodeType="tmRoot">
           <p:childTnLst>
             <p:seq concurrent="1" nextAc="seek">
               <p:cTn id="2" dur="indefinite" nodeType="mainSeq">

</xml_diff>